<commit_message>
Update C1x to C11
</commit_message>
<xml_diff>
--- a/slides/advanced_outro.pptx
+++ b/slides/advanced_outro.pptx
@@ -257,7 +257,7 @@
             <a:fld id="{92597E5C-85BB-4669-9209-B5E04E6ED101}" type="datetimeFigureOut">
               <a:rPr lang="en-GB" smtClean="0"/>
               <a:pPr/>
-              <a:t>05/05/15</a:t>
+              <a:t>06/05/15</a:t>
             </a:fld>
             <a:endParaRPr lang="en-GB"/>
           </a:p>
@@ -797,7 +797,7 @@
             <a:fld id="{19E03964-7D59-4BF8-AE10-3A215A42C3E4}" type="datetime1">
               <a:rPr lang="en-GB" smtClean="0"/>
               <a:pPr/>
-              <a:t>05/05/15</a:t>
+              <a:t>06/05/15</a:t>
             </a:fld>
             <a:endParaRPr lang="en-GB"/>
           </a:p>
@@ -964,7 +964,7 @@
             <a:fld id="{8E5ADEB7-8139-4AC1-94DC-FE9E54B1CCD2}" type="datetime1">
               <a:rPr lang="en-GB" smtClean="0"/>
               <a:pPr/>
-              <a:t>05/05/15</a:t>
+              <a:t>06/05/15</a:t>
             </a:fld>
             <a:endParaRPr lang="en-GB"/>
           </a:p>
@@ -1141,7 +1141,7 @@
             <a:fld id="{9C77A686-1785-49A1-B4C9-55A3C7EEADE4}" type="datetime1">
               <a:rPr lang="en-GB" smtClean="0"/>
               <a:pPr/>
-              <a:t>05/05/15</a:t>
+              <a:t>06/05/15</a:t>
             </a:fld>
             <a:endParaRPr lang="en-GB"/>
           </a:p>
@@ -1615,7 +1615,7 @@
             <a:fld id="{D65327FA-D1E5-40CA-8941-3DD0B6730F8A}" type="datetime1">
               <a:rPr lang="en-GB" smtClean="0"/>
               <a:pPr/>
-              <a:t>05/05/15</a:t>
+              <a:t>06/05/15</a:t>
             </a:fld>
             <a:endParaRPr lang="en-GB"/>
           </a:p>
@@ -1858,7 +1858,7 @@
             <a:fld id="{DB33F153-90AC-449F-A303-26940247ABC8}" type="datetime1">
               <a:rPr lang="en-GB" smtClean="0"/>
               <a:pPr/>
-              <a:t>05/05/15</a:t>
+              <a:t>06/05/15</a:t>
             </a:fld>
             <a:endParaRPr lang="en-GB"/>
           </a:p>
@@ -2143,7 +2143,7 @@
             <a:fld id="{84E24492-3EA5-478D-9F72-7B8FF369DDEB}" type="datetime1">
               <a:rPr lang="en-GB" smtClean="0"/>
               <a:pPr/>
-              <a:t>05/05/15</a:t>
+              <a:t>06/05/15</a:t>
             </a:fld>
             <a:endParaRPr lang="en-GB"/>
           </a:p>
@@ -2562,7 +2562,7 @@
             <a:fld id="{43976A03-596E-4490-AE35-AFB744E08901}" type="datetime1">
               <a:rPr lang="en-GB" smtClean="0"/>
               <a:pPr/>
-              <a:t>05/05/15</a:t>
+              <a:t>06/05/15</a:t>
             </a:fld>
             <a:endParaRPr lang="en-GB"/>
           </a:p>
@@ -2677,7 +2677,7 @@
             <a:fld id="{4C8E3CB4-829C-4F19-9E86-B2AAEC36BD90}" type="datetime1">
               <a:rPr lang="en-GB" smtClean="0"/>
               <a:pPr/>
-              <a:t>05/05/15</a:t>
+              <a:t>06/05/15</a:t>
             </a:fld>
             <a:endParaRPr lang="en-GB"/>
           </a:p>
@@ -2769,7 +2769,7 @@
             <a:fld id="{D4A6FE01-96D8-461F-B1B2-1F0C16D98900}" type="datetime1">
               <a:rPr lang="en-GB" smtClean="0"/>
               <a:pPr/>
-              <a:t>05/05/15</a:t>
+              <a:t>06/05/15</a:t>
             </a:fld>
             <a:endParaRPr lang="en-GB"/>
           </a:p>
@@ -3043,7 +3043,7 @@
             <a:fld id="{B24CB088-CFF7-44C4-9CCE-18845754E6D4}" type="datetime1">
               <a:rPr lang="en-GB" smtClean="0"/>
               <a:pPr/>
-              <a:t>05/05/15</a:t>
+              <a:t>06/05/15</a:t>
             </a:fld>
             <a:endParaRPr lang="en-GB"/>
           </a:p>
@@ -3297,7 +3297,7 @@
             <a:fld id="{CD3A280C-4DEC-4EEC-BD59-A30886E06BA1}" type="datetime1">
               <a:rPr lang="en-GB" smtClean="0"/>
               <a:pPr/>
-              <a:t>05/05/15</a:t>
+              <a:t>06/05/15</a:t>
             </a:fld>
             <a:endParaRPr lang="en-GB"/>
           </a:p>
@@ -3507,7 +3507,7 @@
             <a:fld id="{E222BC38-3FAE-415B-AD1C-2D338E3D6B03}" type="datetime1">
               <a:rPr lang="en-GB" smtClean="0"/>
               <a:pPr/>
-              <a:t>05/05/15</a:t>
+              <a:t>06/05/15</a:t>
             </a:fld>
             <a:endParaRPr lang="en-GB"/>
           </a:p>
@@ -4939,11 +4939,7 @@
           <a:p>
             <a:r>
               <a:rPr lang="en-GB" dirty="0" smtClean="0"/>
-              <a:t>Lots </a:t>
-            </a:r>
-            <a:r>
-              <a:rPr lang="en-GB" dirty="0" smtClean="0"/>
-              <a:t>of OpenCL examples in the SDKs from the vendors:</a:t>
+              <a:t>Lots of OpenCL examples in the SDKs from the vendors:</a:t>
             </a:r>
           </a:p>
           <a:p>
@@ -5360,11 +5356,7 @@
             </a:r>
             <a:r>
               <a:rPr lang="en-GB" dirty="0" smtClean="0"/>
-              <a:t>and Python </a:t>
-            </a:r>
-            <a:r>
-              <a:rPr lang="en-GB" dirty="0" smtClean="0"/>
-              <a:t>make </a:t>
+              <a:t>and Python make </a:t>
             </a:r>
             <a:r>
               <a:rPr lang="en-GB" dirty="0"/>
@@ -6012,7 +6004,11 @@
             </a:pPr>
             <a:r>
               <a:rPr lang="en-GB" dirty="0" smtClean="0"/>
-              <a:t>C1x atomics</a:t>
+              <a:t>C11 </a:t>
+            </a:r>
+            <a:r>
+              <a:rPr lang="en-GB" dirty="0" smtClean="0"/>
+              <a:t>atomics</a:t>
             </a:r>
           </a:p>
           <a:p>
@@ -6207,7 +6203,11 @@
             <a:pPr lvl="1"/>
             <a:r>
               <a:rPr lang="en-GB" dirty="0" smtClean="0"/>
-              <a:t>C11 atomics</a:t>
+              <a:t>C11 </a:t>
+            </a:r>
+            <a:r>
+              <a:rPr lang="en-GB" dirty="0" smtClean="0"/>
+              <a:t>atomics</a:t>
             </a:r>
             <a:endParaRPr lang="en-GB" dirty="0"/>
           </a:p>
@@ -6320,6 +6320,13 @@
   <p:clrMapOvr>
     <a:masterClrMapping/>
   </p:clrMapOvr>
+  <p:timing>
+    <p:tnLst>
+      <p:par>
+        <p:cTn xmlns:p14="http://schemas.microsoft.com/office/powerpoint/2010/main" id="1" dur="indefinite" restart="never" nodeType="tmRoot"/>
+      </p:par>
+    </p:tnLst>
+  </p:timing>
 </p:sld>
 </file>
 
@@ -6455,23 +6462,7 @@
             </a:pPr>
             <a:r>
               <a:rPr lang="en-GB" dirty="0" smtClean="0"/>
-              <a:t>SPIR </a:t>
-            </a:r>
-            <a:r>
-              <a:rPr lang="en-GB" dirty="0" smtClean="0"/>
-              <a:t>1.2, </a:t>
-            </a:r>
-            <a:r>
-              <a:rPr lang="en-GB" dirty="0" smtClean="0"/>
-              <a:t>SPIR 2.0 </a:t>
-            </a:r>
-            <a:r>
-              <a:rPr lang="en-GB" dirty="0" smtClean="0"/>
-              <a:t>ratified SPIR-V provisional </a:t>
-            </a:r>
-            <a:r>
-              <a:rPr lang="en-GB" dirty="0" smtClean="0"/>
-              <a:t>available now</a:t>
+              <a:t>SPIR 1.2, SPIR 2.0 ratified SPIR-V provisional available now</a:t>
             </a:r>
           </a:p>
           <a:p>
@@ -6636,6 +6627,13 @@
   <p:clrMapOvr>
     <a:masterClrMapping/>
   </p:clrMapOvr>
+  <p:timing>
+    <p:tnLst>
+      <p:par>
+        <p:cTn xmlns:p14="http://schemas.microsoft.com/office/powerpoint/2010/main" id="1" dur="indefinite" restart="never" nodeType="tmRoot"/>
+      </p:par>
+    </p:tnLst>
+  </p:timing>
 </p:sld>
 </file>
 
@@ -6742,6 +6740,13 @@
   <p:clrMapOvr>
     <a:masterClrMapping/>
   </p:clrMapOvr>
+  <p:timing>
+    <p:tnLst>
+      <p:par>
+        <p:cTn xmlns:p14="http://schemas.microsoft.com/office/powerpoint/2010/main" id="1" dur="indefinite" restart="never" nodeType="tmRoot"/>
+      </p:par>
+    </p:tnLst>
+  </p:timing>
 </p:sld>
 </file>
 
@@ -7042,6 +7047,13 @@
   <p:clrMapOvr>
     <a:masterClrMapping/>
   </p:clrMapOvr>
+  <p:timing>
+    <p:tnLst>
+      <p:par>
+        <p:cTn xmlns:p14="http://schemas.microsoft.com/office/powerpoint/2010/main" id="1" dur="indefinite" restart="never" nodeType="tmRoot"/>
+      </p:par>
+    </p:tnLst>
+  </p:timing>
 </p:sld>
 </file>
 
@@ -7158,11 +7170,7 @@
           <a:p>
             <a:r>
               <a:rPr lang="en-GB" dirty="0" smtClean="0"/>
-              <a:t>Lots more - see the Khronos OpenCL </a:t>
-            </a:r>
-            <a:r>
-              <a:rPr lang="en-GB" dirty="0" smtClean="0"/>
-              <a:t>pages:</a:t>
+              <a:t>Lots more - see the Khronos OpenCL pages:</a:t>
             </a:r>
             <a:br>
               <a:rPr lang="en-GB" dirty="0" smtClean="0"/>
@@ -7194,7 +7202,6 @@
               <a:rPr lang="en-GB" dirty="0" smtClean="0"/>
               <a:t> </a:t>
             </a:r>
-            <a:endParaRPr lang="en-GB" dirty="0" smtClean="0"/>
           </a:p>
         </p:txBody>
       </p:sp>

</xml_diff>

<commit_message>
Added links to relevant IWOCL talks
Added links to the talks on OpenCL 2.x, SPIR and SYCL.
</commit_message>
<xml_diff>
--- a/slides/advanced_outro.pptx
+++ b/slides/advanced_outro.pptx
@@ -4905,57 +4905,41 @@
         <p:spPr/>
         <p:txBody>
           <a:bodyPr>
-            <a:normAutofit fontScale="85000" lnSpcReduction="10000"/>
+            <a:normAutofit/>
           </a:bodyPr>
           <a:lstStyle/>
           <a:p>
             <a:r>
+              <a:rPr lang="en-GB" dirty="0" smtClean="0"/>
+              <a:t>Lots </a:t>
+            </a:r>
+            <a:r>
+              <a:rPr lang="en-GB" dirty="0" smtClean="0"/>
+              <a:t>of OpenCL examples in the SDKs from the vendors:</a:t>
+            </a:r>
+          </a:p>
+          <a:p>
+            <a:pPr lvl="1"/>
+            <a:r>
+              <a:rPr lang="en-GB" dirty="0" smtClean="0"/>
+              <a:t> AMD, Intel, </a:t>
+            </a:r>
+            <a:r>
               <a:rPr lang="en-GB" dirty="0" err="1" smtClean="0"/>
-              <a:t>HandsOnOpenCL</a:t>
-            </a:r>
-            <a:r>
-              <a:rPr lang="en-GB" dirty="0" smtClean="0"/>
-              <a:t>!</a:t>
-            </a:r>
-          </a:p>
-          <a:p>
-            <a:pPr lvl="1"/>
-            <a:r>
-              <a:rPr lang="en-GB" dirty="0" smtClean="0"/>
-              <a:t>One of the most popular OpenCL training courses on the web</a:t>
-            </a:r>
-          </a:p>
-          <a:p>
-            <a:pPr lvl="1"/>
-            <a:r>
-              <a:rPr lang="en-GB" dirty="0" smtClean="0"/>
-              <a:t>Completely open source – creative commons license</a:t>
+              <a:t>Nvidia</a:t>
+            </a:r>
+            <a:r>
+              <a:rPr lang="en-GB" dirty="0" smtClean="0"/>
+              <a:t>, </a:t>
+            </a:r>
+            <a:r>
+              <a:rPr lang="en-GB" dirty="0" smtClean="0"/>
+              <a:t>…</a:t>
             </a:r>
           </a:p>
           <a:p>
             <a:pPr lvl="1"/>
             <a:endParaRPr lang="en-GB" dirty="0" smtClean="0"/>
-          </a:p>
-          <a:p>
-            <a:r>
-              <a:rPr lang="en-GB" dirty="0" smtClean="0"/>
-              <a:t>Lots of OpenCL examples in the SDKs from the vendors:</a:t>
-            </a:r>
-          </a:p>
-          <a:p>
-            <a:pPr lvl="1"/>
-            <a:r>
-              <a:rPr lang="en-GB" dirty="0" smtClean="0"/>
-              <a:t> AMD, Intel, </a:t>
-            </a:r>
-            <a:r>
-              <a:rPr lang="en-GB" dirty="0" err="1" smtClean="0"/>
-              <a:t>Nvidia</a:t>
-            </a:r>
-            <a:r>
-              <a:rPr lang="en-GB" dirty="0" smtClean="0"/>
-              <a:t>, …</a:t>
-            </a:r>
           </a:p>
           <a:p>
             <a:r>
@@ -6004,11 +5988,7 @@
             </a:pPr>
             <a:r>
               <a:rPr lang="en-GB" dirty="0" smtClean="0"/>
-              <a:t>C11 </a:t>
-            </a:r>
-            <a:r>
-              <a:rPr lang="en-GB" dirty="0" smtClean="0"/>
-              <a:t>atomics</a:t>
+              <a:t>C11 atomics</a:t>
             </a:r>
           </a:p>
           <a:p>
@@ -6203,11 +6183,7 @@
             <a:pPr lvl="1"/>
             <a:r>
               <a:rPr lang="en-GB" dirty="0" smtClean="0"/>
-              <a:t>C11 </a:t>
-            </a:r>
-            <a:r>
-              <a:rPr lang="en-GB" dirty="0" smtClean="0"/>
-              <a:t>atomics</a:t>
+              <a:t>C11 atomics</a:t>
             </a:r>
             <a:endParaRPr lang="en-GB" dirty="0"/>
           </a:p>
@@ -6296,13 +6272,60 @@
         </p:nvSpPr>
         <p:spPr/>
         <p:txBody>
-          <a:bodyPr/>
-          <a:lstStyle/>
-          <a:p>
-            <a:r>
-              <a:rPr lang="en-GB" dirty="0" smtClean="0"/>
-              <a:t>Lots of OpenCL 2.0 and 2.1 related sessions at IWOCL:</a:t>
-            </a:r>
+          <a:bodyPr>
+            <a:normAutofit fontScale="92500" lnSpcReduction="20000"/>
+          </a:bodyPr>
+          <a:lstStyle/>
+          <a:p>
+            <a:r>
+              <a:rPr lang="en-GB" dirty="0" err="1" smtClean="0"/>
+              <a:t>OpenCL.next</a:t>
+            </a:r>
+            <a:r>
+              <a:rPr lang="en-GB" dirty="0" smtClean="0"/>
+              <a:t> Overview (Tuesday 3.30pm)</a:t>
+            </a:r>
+          </a:p>
+          <a:p>
+            <a:r>
+              <a:rPr lang="en-GB" dirty="0"/>
+              <a:t>Developer Feedback Session on OpenCL </a:t>
+            </a:r>
+            <a:r>
+              <a:rPr lang="en-GB" dirty="0" smtClean="0"/>
+              <a:t>2.1 with Khronos OpenCL WG (Tuesday 4pm)</a:t>
+            </a:r>
+          </a:p>
+          <a:p>
+            <a:r>
+              <a:rPr lang="en-GB" dirty="0"/>
+              <a:t>A Look at the OpenCL 2.0 Execution </a:t>
+            </a:r>
+            <a:r>
+              <a:rPr lang="en-GB" dirty="0" smtClean="0"/>
+              <a:t>Model (Wednesday 10am)</a:t>
+            </a:r>
+          </a:p>
+          <a:p>
+            <a:r>
+              <a:rPr lang="en-GB" dirty="0"/>
+              <a:t>Exploring the Features of OpenCL </a:t>
+            </a:r>
+            <a:r>
+              <a:rPr lang="en-GB" dirty="0" smtClean="0"/>
+              <a:t>2.0 (Wednesday 10.20am)</a:t>
+            </a:r>
+          </a:p>
+          <a:p>
+            <a:r>
+              <a:rPr lang="en-GB" dirty="0"/>
+              <a:t>Achieving Performance with OpenCL 2.0 on Intel Processor </a:t>
+            </a:r>
+            <a:r>
+              <a:rPr lang="en-GB" dirty="0" smtClean="0"/>
+              <a:t>Graphics (Wednesday 10.40am)</a:t>
+            </a:r>
+            <a:endParaRPr lang="en-GB" dirty="0" smtClean="0"/>
           </a:p>
           <a:p>
             <a:pPr lvl="1"/>
@@ -6671,7 +6694,11 @@
           <a:p>
             <a:r>
               <a:rPr lang="en-GB" dirty="0" smtClean="0"/>
-              <a:t>SPIR talks</a:t>
+              <a:t>SPIR </a:t>
+            </a:r>
+            <a:r>
+              <a:rPr lang="en-GB" dirty="0" smtClean="0"/>
+              <a:t>talks at IWOCL</a:t>
             </a:r>
             <a:endParaRPr lang="en-GB" dirty="0"/>
           </a:p>
@@ -6692,13 +6719,58 @@
           <a:bodyPr/>
           <a:lstStyle/>
           <a:p>
-            <a:r>
-              <a:rPr lang="en-GB" dirty="0" smtClean="0"/>
-              <a:t>Several SPIR-related sessions at IWOCL:</a:t>
-            </a:r>
-          </a:p>
-          <a:p>
-            <a:pPr lvl="1"/>
+            <a:endParaRPr lang="en-GB" dirty="0" smtClean="0"/>
+          </a:p>
+          <a:p>
+            <a:r>
+              <a:rPr lang="en-GB" dirty="0" smtClean="0"/>
+              <a:t>Developer </a:t>
+            </a:r>
+            <a:r>
+              <a:rPr lang="en-GB" dirty="0"/>
+              <a:t>Feedback Session on OpenCL </a:t>
+            </a:r>
+            <a:r>
+              <a:rPr lang="en-GB" dirty="0" smtClean="0"/>
+              <a:t>2.1, SYCL and SPIR </a:t>
+            </a:r>
+            <a:r>
+              <a:rPr lang="en-GB" dirty="0"/>
+              <a:t>with </a:t>
+            </a:r>
+            <a:r>
+              <a:rPr lang="en-GB" dirty="0" smtClean="0"/>
+              <a:t>the Khronos </a:t>
+            </a:r>
+            <a:r>
+              <a:rPr lang="en-GB" dirty="0"/>
+              <a:t>OpenCL </a:t>
+            </a:r>
+            <a:r>
+              <a:rPr lang="en-GB" dirty="0" smtClean="0"/>
+              <a:t>working group (</a:t>
+            </a:r>
+            <a:r>
+              <a:rPr lang="en-GB" dirty="0"/>
+              <a:t>Tuesday 4pm)</a:t>
+            </a:r>
+          </a:p>
+          <a:p>
+            <a:endParaRPr lang="en-GB" dirty="0" smtClean="0"/>
+          </a:p>
+          <a:p>
+            <a:r>
+              <a:rPr lang="en-GB" dirty="0" smtClean="0"/>
+              <a:t>Mapping </a:t>
+            </a:r>
+            <a:r>
+              <a:rPr lang="en-GB" dirty="0"/>
+              <a:t>C++ AMP to OpenCL / </a:t>
+            </a:r>
+            <a:r>
+              <a:rPr lang="en-GB" dirty="0" smtClean="0"/>
+              <a:t>HSA (Wednesday 11.50am)</a:t>
+            </a:r>
             <a:endParaRPr lang="en-GB" dirty="0"/>
           </a:p>
         </p:txBody>
@@ -6719,7 +6791,7 @@
         </p:blipFill>
         <p:spPr>
           <a:xfrm>
-            <a:off x="2339752" y="332656"/>
+            <a:off x="1115616" y="332656"/>
             <a:ext cx="2160240" cy="1080120"/>
           </a:xfrm>
           <a:prstGeom prst="rect">
@@ -6996,16 +7068,57 @@
         </p:nvSpPr>
         <p:spPr/>
         <p:txBody>
-          <a:bodyPr/>
-          <a:lstStyle/>
-          <a:p>
-            <a:r>
-              <a:rPr lang="en-GB" dirty="0" smtClean="0"/>
-              <a:t>Several SYCL related sessions at IWOCL:</a:t>
-            </a:r>
-          </a:p>
-          <a:p>
-            <a:pPr lvl="1"/>
+          <a:bodyPr>
+            <a:normAutofit fontScale="92500" lnSpcReduction="10000"/>
+          </a:bodyPr>
+          <a:lstStyle/>
+          <a:p>
+            <a:r>
+              <a:rPr lang="en-GB" dirty="0"/>
+              <a:t>Khronos SYCL for </a:t>
+            </a:r>
+            <a:r>
+              <a:rPr lang="en-GB" dirty="0" smtClean="0"/>
+              <a:t>OpenCL tutorial (Tuesday at 9.30am)</a:t>
+            </a:r>
+            <a:endParaRPr lang="en-GB" dirty="0"/>
+          </a:p>
+          <a:p>
+            <a:r>
+              <a:rPr lang="en-GB" dirty="0" smtClean="0"/>
+              <a:t>Developer </a:t>
+            </a:r>
+            <a:r>
+              <a:rPr lang="en-GB" dirty="0"/>
+              <a:t>Feedback Session on OpenCL 2.1, SYCL and SPIR with the Khronos OpenCL working group (Tuesday 4pm</a:t>
+            </a:r>
+            <a:r>
+              <a:rPr lang="en-GB" dirty="0" smtClean="0"/>
+              <a:t>)</a:t>
+            </a:r>
+          </a:p>
+          <a:p>
+            <a:r>
+              <a:rPr lang="en-GB" dirty="0"/>
+              <a:t>Update on the SYCL for OpenCL Open Standard to Enable C++ Meta Programming on Top of </a:t>
+            </a:r>
+            <a:r>
+              <a:rPr lang="en-GB" dirty="0" smtClean="0"/>
+              <a:t>OpenCL (Wednesday 12.10pm)</a:t>
+            </a:r>
+          </a:p>
+          <a:p>
+            <a:r>
+              <a:rPr lang="en-GB" dirty="0"/>
+              <a:t>Kernel Composition in </a:t>
+            </a:r>
+            <a:r>
+              <a:rPr lang="en-GB" dirty="0" smtClean="0"/>
+              <a:t>SYCL (Wednesday 12.30pm)</a:t>
+            </a:r>
+            <a:endParaRPr lang="en-GB" dirty="0"/>
+          </a:p>
+          <a:p>
             <a:endParaRPr lang="en-GB" dirty="0"/>
           </a:p>
         </p:txBody>

</xml_diff>

<commit_message>
Added ref to clRNG
</commit_message>
<xml_diff>
--- a/slides/advanced_outro.pptx
+++ b/slides/advanced_outro.pptx
@@ -4911,11 +4911,7 @@
           <a:p>
             <a:r>
               <a:rPr lang="en-GB" dirty="0" smtClean="0"/>
-              <a:t>Lots </a:t>
-            </a:r>
-            <a:r>
-              <a:rPr lang="en-GB" dirty="0" smtClean="0"/>
-              <a:t>of OpenCL examples in the SDKs from the vendors:</a:t>
+              <a:t>Lots of OpenCL examples in the SDKs from the vendors:</a:t>
             </a:r>
           </a:p>
           <a:p>
@@ -4930,11 +4926,7 @@
             </a:r>
             <a:r>
               <a:rPr lang="en-GB" dirty="0" smtClean="0"/>
-              <a:t>, </a:t>
-            </a:r>
-            <a:r>
-              <a:rPr lang="en-GB" dirty="0" smtClean="0"/>
-              <a:t>…</a:t>
+              <a:t>, …</a:t>
             </a:r>
           </a:p>
           <a:p>
@@ -6325,7 +6317,6 @@
               <a:rPr lang="en-GB" dirty="0" smtClean="0"/>
               <a:t>Graphics (Wednesday 10.40am)</a:t>
             </a:r>
-            <a:endParaRPr lang="en-GB" dirty="0" smtClean="0"/>
           </a:p>
           <a:p>
             <a:pPr lvl="1"/>
@@ -6694,11 +6685,7 @@
           <a:p>
             <a:r>
               <a:rPr lang="en-GB" dirty="0" smtClean="0"/>
-              <a:t>SPIR </a:t>
-            </a:r>
-            <a:r>
-              <a:rPr lang="en-GB" dirty="0" smtClean="0"/>
-              <a:t>talks at IWOCL</a:t>
+              <a:t>SPIR talks at IWOCL</a:t>
             </a:r>
             <a:endParaRPr lang="en-GB" dirty="0"/>
           </a:p>
@@ -7277,6 +7264,26 @@
             <a:r>
               <a:rPr lang="en-GB" dirty="0" err="1" smtClean="0"/>
               <a:t>clBLAS</a:t>
+            </a:r>
+            <a:r>
+              <a:rPr lang="en-GB" dirty="0" smtClean="0"/>
+              <a:t> / </a:t>
+            </a:r>
+            <a:r>
+              <a:rPr lang="en-GB" dirty="0" err="1" smtClean="0"/>
+              <a:t>clRNG</a:t>
+            </a:r>
+            <a:r>
+              <a:rPr lang="en-GB" dirty="0" smtClean="0"/>
+              <a:t> (all on </a:t>
+            </a:r>
+            <a:r>
+              <a:rPr lang="en-GB" dirty="0" err="1" smtClean="0"/>
+              <a:t>github</a:t>
+            </a:r>
+            <a:r>
+              <a:rPr lang="en-GB" smtClean="0"/>
+              <a:t>)</a:t>
             </a:r>
             <a:endParaRPr lang="en-GB" dirty="0" smtClean="0"/>
           </a:p>

</xml_diff>

<commit_message>
Minor typo fixes and updates
</commit_message>
<xml_diff>
--- a/slides/advanced_outro.pptx
+++ b/slides/advanced_outro.pptx
@@ -257,7 +257,7 @@
             <a:fld id="{92597E5C-85BB-4669-9209-B5E04E6ED101}" type="datetimeFigureOut">
               <a:rPr lang="en-GB" smtClean="0"/>
               <a:pPr/>
-              <a:t>06/05/15</a:t>
+              <a:t>08/05/15</a:t>
             </a:fld>
             <a:endParaRPr lang="en-GB"/>
           </a:p>
@@ -797,7 +797,7 @@
             <a:fld id="{19E03964-7D59-4BF8-AE10-3A215A42C3E4}" type="datetime1">
               <a:rPr lang="en-GB" smtClean="0"/>
               <a:pPr/>
-              <a:t>06/05/15</a:t>
+              <a:t>08/05/15</a:t>
             </a:fld>
             <a:endParaRPr lang="en-GB"/>
           </a:p>
@@ -964,7 +964,7 @@
             <a:fld id="{8E5ADEB7-8139-4AC1-94DC-FE9E54B1CCD2}" type="datetime1">
               <a:rPr lang="en-GB" smtClean="0"/>
               <a:pPr/>
-              <a:t>06/05/15</a:t>
+              <a:t>08/05/15</a:t>
             </a:fld>
             <a:endParaRPr lang="en-GB"/>
           </a:p>
@@ -1141,7 +1141,7 @@
             <a:fld id="{9C77A686-1785-49A1-B4C9-55A3C7EEADE4}" type="datetime1">
               <a:rPr lang="en-GB" smtClean="0"/>
               <a:pPr/>
-              <a:t>06/05/15</a:t>
+              <a:t>08/05/15</a:t>
             </a:fld>
             <a:endParaRPr lang="en-GB"/>
           </a:p>
@@ -1615,7 +1615,7 @@
             <a:fld id="{D65327FA-D1E5-40CA-8941-3DD0B6730F8A}" type="datetime1">
               <a:rPr lang="en-GB" smtClean="0"/>
               <a:pPr/>
-              <a:t>06/05/15</a:t>
+              <a:t>08/05/15</a:t>
             </a:fld>
             <a:endParaRPr lang="en-GB"/>
           </a:p>
@@ -1858,7 +1858,7 @@
             <a:fld id="{DB33F153-90AC-449F-A303-26940247ABC8}" type="datetime1">
               <a:rPr lang="en-GB" smtClean="0"/>
               <a:pPr/>
-              <a:t>06/05/15</a:t>
+              <a:t>08/05/15</a:t>
             </a:fld>
             <a:endParaRPr lang="en-GB"/>
           </a:p>
@@ -2143,7 +2143,7 @@
             <a:fld id="{84E24492-3EA5-478D-9F72-7B8FF369DDEB}" type="datetime1">
               <a:rPr lang="en-GB" smtClean="0"/>
               <a:pPr/>
-              <a:t>06/05/15</a:t>
+              <a:t>08/05/15</a:t>
             </a:fld>
             <a:endParaRPr lang="en-GB"/>
           </a:p>
@@ -2562,7 +2562,7 @@
             <a:fld id="{43976A03-596E-4490-AE35-AFB744E08901}" type="datetime1">
               <a:rPr lang="en-GB" smtClean="0"/>
               <a:pPr/>
-              <a:t>06/05/15</a:t>
+              <a:t>08/05/15</a:t>
             </a:fld>
             <a:endParaRPr lang="en-GB"/>
           </a:p>
@@ -2677,7 +2677,7 @@
             <a:fld id="{4C8E3CB4-829C-4F19-9E86-B2AAEC36BD90}" type="datetime1">
               <a:rPr lang="en-GB" smtClean="0"/>
               <a:pPr/>
-              <a:t>06/05/15</a:t>
+              <a:t>08/05/15</a:t>
             </a:fld>
             <a:endParaRPr lang="en-GB"/>
           </a:p>
@@ -2769,7 +2769,7 @@
             <a:fld id="{D4A6FE01-96D8-461F-B1B2-1F0C16D98900}" type="datetime1">
               <a:rPr lang="en-GB" smtClean="0"/>
               <a:pPr/>
-              <a:t>06/05/15</a:t>
+              <a:t>08/05/15</a:t>
             </a:fld>
             <a:endParaRPr lang="en-GB"/>
           </a:p>
@@ -3043,7 +3043,7 @@
             <a:fld id="{B24CB088-CFF7-44C4-9CCE-18845754E6D4}" type="datetime1">
               <a:rPr lang="en-GB" smtClean="0"/>
               <a:pPr/>
-              <a:t>06/05/15</a:t>
+              <a:t>08/05/15</a:t>
             </a:fld>
             <a:endParaRPr lang="en-GB"/>
           </a:p>
@@ -3297,7 +3297,7 @@
             <a:fld id="{CD3A280C-4DEC-4EEC-BD59-A30886E06BA1}" type="datetime1">
               <a:rPr lang="en-GB" smtClean="0"/>
               <a:pPr/>
-              <a:t>06/05/15</a:t>
+              <a:t>08/05/15</a:t>
             </a:fld>
             <a:endParaRPr lang="en-GB"/>
           </a:p>
@@ -3507,7 +3507,7 @@
             <a:fld id="{E222BC38-3FAE-415B-AD1C-2D338E3D6B03}" type="datetime1">
               <a:rPr lang="en-GB" smtClean="0"/>
               <a:pPr/>
-              <a:t>06/05/15</a:t>
+              <a:t>08/05/15</a:t>
             </a:fld>
             <a:endParaRPr lang="en-GB"/>
           </a:p>
@@ -3899,7 +3899,22 @@
           <a:p>
             <a:r>
               <a:rPr lang="en-GB" dirty="0" smtClean="0"/>
-              <a:t>Advanced OpenCL Topics - The OPENCL ECOSYSTEM</a:t>
+              <a:t>Advanced OpenCL </a:t>
+            </a:r>
+            <a:r>
+              <a:rPr lang="en-GB" dirty="0" smtClean="0"/>
+              <a:t>Topics:</a:t>
+            </a:r>
+            <a:br>
+              <a:rPr lang="en-GB" dirty="0" smtClean="0"/>
+            </a:br>
+            <a:r>
+              <a:rPr lang="en-GB" dirty="0" smtClean="0"/>
+              <a:t>The </a:t>
+            </a:r>
+            <a:r>
+              <a:rPr lang="en-GB" dirty="0" smtClean="0"/>
+              <a:t>OPENCL ECOSYSTEM</a:t>
             </a:r>
             <a:r>
               <a:rPr lang="en-GB" dirty="0"/>
@@ -5270,7 +5285,11 @@
             </a:r>
             <a:r>
               <a:rPr lang="en-GB" dirty="0" smtClean="0"/>
-              <a:t>computing, </a:t>
+              <a:t>parallel computing</a:t>
+            </a:r>
+            <a:r>
+              <a:rPr lang="en-GB" dirty="0" smtClean="0"/>
+              <a:t>, </a:t>
             </a:r>
             <a:r>
               <a:rPr lang="en-GB" dirty="0"/>
@@ -6262,10 +6281,15 @@
             <p:ph idx="1"/>
           </p:nvPr>
         </p:nvSpPr>
-        <p:spPr/>
+        <p:spPr>
+          <a:xfrm>
+            <a:off x="457200" y="1600200"/>
+            <a:ext cx="8229600" cy="5141168"/>
+          </a:xfrm>
+        </p:spPr>
         <p:txBody>
           <a:bodyPr>
-            <a:normAutofit fontScale="92500" lnSpcReduction="20000"/>
+            <a:normAutofit fontScale="92500"/>
           </a:bodyPr>
           <a:lstStyle/>
           <a:p>
@@ -6427,7 +6451,15 @@
             </a:pPr>
             <a:r>
               <a:rPr lang="en-GB" dirty="0" smtClean="0"/>
-              <a:t>Defines an LLVM-derived IR for OpenCL programs</a:t>
+              <a:t>Defines an </a:t>
+            </a:r>
+            <a:r>
+              <a:rPr lang="en-GB" dirty="0" smtClean="0"/>
+              <a:t>IR </a:t>
+            </a:r>
+            <a:r>
+              <a:rPr lang="en-GB" dirty="0" smtClean="0"/>
+              <a:t>for OpenCL programs</a:t>
             </a:r>
           </a:p>
           <a:p>
@@ -6438,15 +6470,15 @@
             </a:pPr>
             <a:r>
               <a:rPr lang="en-GB" dirty="0" smtClean="0"/>
-              <a:t>Means that developers can ship portable binaries (LLVM </a:t>
-            </a:r>
-            <a:r>
-              <a:rPr lang="en-GB" dirty="0" err="1" smtClean="0"/>
-              <a:t>bitcode</a:t>
-            </a:r>
-            <a:r>
-              <a:rPr lang="en-GB" dirty="0" smtClean="0"/>
-              <a:t>), instead of their OpenCL source</a:t>
+              <a:t>Means that developers can ship portable </a:t>
+            </a:r>
+            <a:r>
+              <a:rPr lang="en-GB" dirty="0" smtClean="0"/>
+              <a:t>binaries </a:t>
+            </a:r>
+            <a:r>
+              <a:rPr lang="en-GB" dirty="0" smtClean="0"/>
+              <a:t>instead of their OpenCL source</a:t>
             </a:r>
           </a:p>
           <a:p>
@@ -6476,7 +6508,23 @@
             </a:pPr>
             <a:r>
               <a:rPr lang="en-GB" dirty="0" smtClean="0"/>
-              <a:t>SPIR 1.2, SPIR 2.0 ratified SPIR-V provisional available now</a:t>
+              <a:t>SPIR </a:t>
+            </a:r>
+            <a:r>
+              <a:rPr lang="en-GB" dirty="0" smtClean="0"/>
+              <a:t>1.2 &amp; </a:t>
+            </a:r>
+            <a:r>
+              <a:rPr lang="en-GB" dirty="0" smtClean="0"/>
+              <a:t>SPIR 2.0 </a:t>
+            </a:r>
+            <a:r>
+              <a:rPr lang="en-GB" dirty="0" smtClean="0"/>
+              <a:t>ratified, </a:t>
+            </a:r>
+            <a:r>
+              <a:rPr lang="en-GB" dirty="0" smtClean="0"/>
+              <a:t>SPIR-V provisional available now</a:t>
             </a:r>
           </a:p>
           <a:p>
@@ -7215,12 +7263,50 @@
           <a:lstStyle/>
           <a:p>
             <a:r>
+              <a:rPr lang="en-GB" dirty="0" err="1"/>
+              <a:t>clFFT</a:t>
+            </a:r>
+            <a:r>
+              <a:rPr lang="en-GB" dirty="0"/>
+              <a:t>/</a:t>
+            </a:r>
+            <a:r>
+              <a:rPr lang="en-GB" dirty="0" err="1"/>
+              <a:t>clBLAS</a:t>
+            </a:r>
+            <a:r>
+              <a:rPr lang="en-GB" dirty="0"/>
+              <a:t> / </a:t>
+            </a:r>
+            <a:r>
+              <a:rPr lang="en-GB" dirty="0" err="1"/>
+              <a:t>clRNG</a:t>
+            </a:r>
+            <a:r>
+              <a:rPr lang="en-GB" dirty="0"/>
+              <a:t> (all on </a:t>
+            </a:r>
+            <a:r>
+              <a:rPr lang="en-GB" dirty="0" err="1"/>
+              <a:t>github</a:t>
+            </a:r>
+            <a:r>
+              <a:rPr lang="en-GB" dirty="0"/>
+              <a:t>)</a:t>
+            </a:r>
+          </a:p>
+          <a:p>
+            <a:r>
               <a:rPr lang="en-GB" dirty="0" err="1" smtClean="0"/>
               <a:t>Arrayfire</a:t>
             </a:r>
             <a:r>
               <a:rPr lang="en-GB" dirty="0" smtClean="0"/>
-              <a:t> (open source soon)</a:t>
+              <a:t> </a:t>
+            </a:r>
+            <a:r>
+              <a:rPr lang="en-GB" dirty="0" smtClean="0"/>
+              <a:t>(open source soon)</a:t>
             </a:r>
           </a:p>
           <a:p>
@@ -7254,43 +7340,12 @@
           </a:p>
           <a:p>
             <a:r>
-              <a:rPr lang="en-GB" dirty="0" err="1" smtClean="0"/>
-              <a:t>clFFT</a:t>
-            </a:r>
-            <a:r>
-              <a:rPr lang="en-GB" dirty="0" smtClean="0"/>
-              <a:t>/</a:t>
-            </a:r>
-            <a:r>
-              <a:rPr lang="en-GB" dirty="0" err="1" smtClean="0"/>
-              <a:t>clBLAS</a:t>
-            </a:r>
-            <a:r>
-              <a:rPr lang="en-GB" dirty="0" smtClean="0"/>
-              <a:t> / </a:t>
-            </a:r>
-            <a:r>
-              <a:rPr lang="en-GB" dirty="0" err="1" smtClean="0"/>
-              <a:t>clRNG</a:t>
-            </a:r>
-            <a:r>
-              <a:rPr lang="en-GB" dirty="0" smtClean="0"/>
-              <a:t> (all on </a:t>
-            </a:r>
-            <a:r>
-              <a:rPr lang="en-GB" dirty="0" err="1" smtClean="0"/>
-              <a:t>github</a:t>
-            </a:r>
-            <a:r>
-              <a:rPr lang="en-GB" smtClean="0"/>
-              <a:t>)</a:t>
-            </a:r>
-            <a:endParaRPr lang="en-GB" dirty="0" smtClean="0"/>
-          </a:p>
-          <a:p>
-            <a:r>
-              <a:rPr lang="en-GB" dirty="0" smtClean="0"/>
-              <a:t>Lots more - see the Khronos OpenCL pages:</a:t>
+              <a:rPr lang="en-GB" dirty="0" smtClean="0"/>
+              <a:t>Lots </a:t>
+            </a:r>
+            <a:r>
+              <a:rPr lang="en-GB" dirty="0" smtClean="0"/>
+              <a:t>more - see the Khronos OpenCL pages:</a:t>
             </a:r>
             <a:br>
               <a:rPr lang="en-GB" dirty="0" smtClean="0"/>

</xml_diff>

<commit_message>
Updated outro for IWOCL 2016
Updated to OpenCL 2.1, SPIR-V, other relevant updates.
</commit_message>
<xml_diff>
--- a/slides/advanced_outro.pptx
+++ b/slides/advanced_outro.pptx
@@ -10,10 +10,10 @@
   <p:sldIdLst>
     <p:sldId id="703" r:id="rId2"/>
     <p:sldId id="677" r:id="rId3"/>
-    <p:sldId id="769" r:id="rId4"/>
-    <p:sldId id="678" r:id="rId5"/>
-    <p:sldId id="770" r:id="rId6"/>
-    <p:sldId id="771" r:id="rId7"/>
+    <p:sldId id="774" r:id="rId4"/>
+    <p:sldId id="769" r:id="rId5"/>
+    <p:sldId id="678" r:id="rId6"/>
+    <p:sldId id="770" r:id="rId7"/>
     <p:sldId id="679" r:id="rId8"/>
     <p:sldId id="772" r:id="rId9"/>
     <p:sldId id="682" r:id="rId10"/>
@@ -133,10 +133,10 @@
           <p14:sldIdLst>
             <p14:sldId id="703"/>
             <p14:sldId id="677"/>
+            <p14:sldId id="774"/>
             <p14:sldId id="769"/>
             <p14:sldId id="678"/>
             <p14:sldId id="770"/>
-            <p14:sldId id="771"/>
             <p14:sldId id="679"/>
             <p14:sldId id="772"/>
             <p14:sldId id="682"/>
@@ -257,7 +257,7 @@
             <a:fld id="{92597E5C-85BB-4669-9209-B5E04E6ED101}" type="datetimeFigureOut">
               <a:rPr lang="en-GB" smtClean="0"/>
               <a:pPr/>
-              <a:t>08/05/15</a:t>
+              <a:t>14/04/16</a:t>
             </a:fld>
             <a:endParaRPr lang="en-GB"/>
           </a:p>
@@ -797,7 +797,7 @@
             <a:fld id="{19E03964-7D59-4BF8-AE10-3A215A42C3E4}" type="datetime1">
               <a:rPr lang="en-GB" smtClean="0"/>
               <a:pPr/>
-              <a:t>08/05/15</a:t>
+              <a:t>14/04/16</a:t>
             </a:fld>
             <a:endParaRPr lang="en-GB"/>
           </a:p>
@@ -964,7 +964,7 @@
             <a:fld id="{8E5ADEB7-8139-4AC1-94DC-FE9E54B1CCD2}" type="datetime1">
               <a:rPr lang="en-GB" smtClean="0"/>
               <a:pPr/>
-              <a:t>08/05/15</a:t>
+              <a:t>14/04/16</a:t>
             </a:fld>
             <a:endParaRPr lang="en-GB"/>
           </a:p>
@@ -1141,7 +1141,7 @@
             <a:fld id="{9C77A686-1785-49A1-B4C9-55A3C7EEADE4}" type="datetime1">
               <a:rPr lang="en-GB" smtClean="0"/>
               <a:pPr/>
-              <a:t>08/05/15</a:t>
+              <a:t>14/04/16</a:t>
             </a:fld>
             <a:endParaRPr lang="en-GB"/>
           </a:p>
@@ -1615,7 +1615,7 @@
             <a:fld id="{D65327FA-D1E5-40CA-8941-3DD0B6730F8A}" type="datetime1">
               <a:rPr lang="en-GB" smtClean="0"/>
               <a:pPr/>
-              <a:t>08/05/15</a:t>
+              <a:t>14/04/16</a:t>
             </a:fld>
             <a:endParaRPr lang="en-GB"/>
           </a:p>
@@ -1858,7 +1858,7 @@
             <a:fld id="{DB33F153-90AC-449F-A303-26940247ABC8}" type="datetime1">
               <a:rPr lang="en-GB" smtClean="0"/>
               <a:pPr/>
-              <a:t>08/05/15</a:t>
+              <a:t>14/04/16</a:t>
             </a:fld>
             <a:endParaRPr lang="en-GB"/>
           </a:p>
@@ -2143,7 +2143,7 @@
             <a:fld id="{84E24492-3EA5-478D-9F72-7B8FF369DDEB}" type="datetime1">
               <a:rPr lang="en-GB" smtClean="0"/>
               <a:pPr/>
-              <a:t>08/05/15</a:t>
+              <a:t>14/04/16</a:t>
             </a:fld>
             <a:endParaRPr lang="en-GB"/>
           </a:p>
@@ -2562,7 +2562,7 @@
             <a:fld id="{43976A03-596E-4490-AE35-AFB744E08901}" type="datetime1">
               <a:rPr lang="en-GB" smtClean="0"/>
               <a:pPr/>
-              <a:t>08/05/15</a:t>
+              <a:t>14/04/16</a:t>
             </a:fld>
             <a:endParaRPr lang="en-GB"/>
           </a:p>
@@ -2677,7 +2677,7 @@
             <a:fld id="{4C8E3CB4-829C-4F19-9E86-B2AAEC36BD90}" type="datetime1">
               <a:rPr lang="en-GB" smtClean="0"/>
               <a:pPr/>
-              <a:t>08/05/15</a:t>
+              <a:t>14/04/16</a:t>
             </a:fld>
             <a:endParaRPr lang="en-GB"/>
           </a:p>
@@ -2769,7 +2769,7 @@
             <a:fld id="{D4A6FE01-96D8-461F-B1B2-1F0C16D98900}" type="datetime1">
               <a:rPr lang="en-GB" smtClean="0"/>
               <a:pPr/>
-              <a:t>08/05/15</a:t>
+              <a:t>14/04/16</a:t>
             </a:fld>
             <a:endParaRPr lang="en-GB"/>
           </a:p>
@@ -3043,7 +3043,7 @@
             <a:fld id="{B24CB088-CFF7-44C4-9CCE-18845754E6D4}" type="datetime1">
               <a:rPr lang="en-GB" smtClean="0"/>
               <a:pPr/>
-              <a:t>08/05/15</a:t>
+              <a:t>14/04/16</a:t>
             </a:fld>
             <a:endParaRPr lang="en-GB"/>
           </a:p>
@@ -3297,7 +3297,7 @@
             <a:fld id="{CD3A280C-4DEC-4EEC-BD59-A30886E06BA1}" type="datetime1">
               <a:rPr lang="en-GB" smtClean="0"/>
               <a:pPr/>
-              <a:t>08/05/15</a:t>
+              <a:t>14/04/16</a:t>
             </a:fld>
             <a:endParaRPr lang="en-GB"/>
           </a:p>
@@ -3507,7 +3507,7 @@
             <a:fld id="{E222BC38-3FAE-415B-AD1C-2D338E3D6B03}" type="datetime1">
               <a:rPr lang="en-GB" smtClean="0"/>
               <a:pPr/>
-              <a:t>08/05/15</a:t>
+              <a:t>14/04/16</a:t>
             </a:fld>
             <a:endParaRPr lang="en-GB"/>
           </a:p>
@@ -3899,22 +3899,14 @@
           <a:p>
             <a:r>
               <a:rPr lang="en-GB" dirty="0" smtClean="0"/>
-              <a:t>Advanced OpenCL </a:t>
-            </a:r>
-            <a:r>
-              <a:rPr lang="en-GB" dirty="0" smtClean="0"/>
-              <a:t>Topics:</a:t>
+              <a:t>Advanced OpenCL Topics:</a:t>
             </a:r>
             <a:br>
               <a:rPr lang="en-GB" dirty="0" smtClean="0"/>
             </a:br>
             <a:r>
               <a:rPr lang="en-GB" dirty="0" smtClean="0"/>
-              <a:t>The </a:t>
-            </a:r>
-            <a:r>
-              <a:rPr lang="en-GB" dirty="0" smtClean="0"/>
-              <a:t>OPENCL ECOSYSTEM</a:t>
+              <a:t>The OPENCL ECOSYSTEM</a:t>
             </a:r>
             <a:r>
               <a:rPr lang="en-GB" dirty="0"/>
@@ -4776,7 +4768,15 @@
           <a:p>
             <a:r>
               <a:rPr lang="en-GB" dirty="0" smtClean="0"/>
-              <a:t>Downloaded over 4,200 times so far!</a:t>
+              <a:t>Downloaded over </a:t>
+            </a:r>
+            <a:r>
+              <a:rPr lang="en-GB" dirty="0" smtClean="0"/>
+              <a:t>7,300 </a:t>
+            </a:r>
+            <a:r>
+              <a:rPr lang="en-GB" dirty="0" smtClean="0"/>
+              <a:t>times so far!</a:t>
             </a:r>
           </a:p>
           <a:p>
@@ -4920,7 +4920,7 @@
         <p:spPr/>
         <p:txBody>
           <a:bodyPr>
-            <a:normAutofit/>
+            <a:normAutofit fontScale="92500" lnSpcReduction="20000"/>
           </a:bodyPr>
           <a:lstStyle/>
           <a:p>
@@ -4951,7 +4951,7 @@
           <a:p>
             <a:r>
               <a:rPr lang="en-GB" dirty="0" smtClean="0"/>
-              <a:t>The SHOC OpenCL/CUDA benchmark suite (available as source code):</a:t>
+              <a:t>The GPU-STREAM benchmark:</a:t>
             </a:r>
           </a:p>
           <a:p>
@@ -4960,11 +4960,37 @@
               <a:rPr lang="en-GB" dirty="0">
                 <a:hlinkClick r:id="rId2"/>
               </a:rPr>
-              <a:t>https://github.com/vetter/shoc/</a:t>
+              <a:t>https://github.com/UoB-HPC/GPU-STREAM/wiki/</a:t>
             </a:r>
             <a:r>
               <a:rPr lang="en-GB" dirty="0" smtClean="0">
                 <a:hlinkClick r:id="rId2"/>
+              </a:rPr>
+              <a:t>Results</a:t>
+            </a:r>
+            <a:endParaRPr lang="en-GB" dirty="0" smtClean="0"/>
+          </a:p>
+          <a:p>
+            <a:pPr lvl="1"/>
+            <a:endParaRPr lang="en-GB" dirty="0" smtClean="0"/>
+          </a:p>
+          <a:p>
+            <a:r>
+              <a:rPr lang="en-GB" dirty="0" smtClean="0"/>
+              <a:t>The SHOC OpenCL/CUDA benchmark suite (available as source code):</a:t>
+            </a:r>
+          </a:p>
+          <a:p>
+            <a:pPr lvl="1"/>
+            <a:r>
+              <a:rPr lang="en-GB" dirty="0">
+                <a:hlinkClick r:id="rId3"/>
+              </a:rPr>
+              <a:t>https://github.com/vetter/shoc/</a:t>
+            </a:r>
+            <a:r>
+              <a:rPr lang="en-GB" dirty="0" smtClean="0">
+                <a:hlinkClick r:id="rId3"/>
               </a:rPr>
               <a:t>wiki</a:t>
             </a:r>
@@ -5101,7 +5127,11 @@
             <a:pPr lvl="1"/>
             <a:r>
               <a:rPr lang="en-GB" dirty="0" smtClean="0"/>
-              <a:t>Mid May each year</a:t>
+              <a:t>April or </a:t>
+            </a:r>
+            <a:r>
+              <a:rPr lang="en-GB" dirty="0" smtClean="0"/>
+              <a:t>May each year</a:t>
             </a:r>
           </a:p>
           <a:p>
@@ -5285,11 +5315,7 @@
             </a:r>
             <a:r>
               <a:rPr lang="en-GB" dirty="0" smtClean="0"/>
-              <a:t>parallel computing</a:t>
-            </a:r>
-            <a:r>
-              <a:rPr lang="en-GB" dirty="0" smtClean="0"/>
-              <a:t>, </a:t>
+              <a:t>parallel computing, </a:t>
             </a:r>
             <a:r>
               <a:rPr lang="en-GB" dirty="0"/>
@@ -5887,7 +5913,11 @@
           <a:p>
             <a:r>
               <a:rPr lang="en-GB" dirty="0" smtClean="0"/>
-              <a:t>OpenCL 2.0</a:t>
+              <a:t>OpenCL </a:t>
+            </a:r>
+            <a:r>
+              <a:rPr lang="en-GB" dirty="0" smtClean="0"/>
+              <a:t>2.1</a:t>
             </a:r>
             <a:endParaRPr lang="en-GB" dirty="0"/>
           </a:p>
@@ -5911,7 +5941,7 @@
         </p:spPr>
         <p:txBody>
           <a:bodyPr>
-            <a:normAutofit fontScale="85000" lnSpcReduction="20000"/>
+            <a:normAutofit fontScale="92500" lnSpcReduction="10000"/>
           </a:bodyPr>
           <a:lstStyle/>
           <a:p>
@@ -5922,8 +5952,29 @@
             </a:pPr>
             <a:r>
               <a:rPr lang="en-GB" dirty="0" smtClean="0"/>
-              <a:t>OpenCL 2.0 was ratified in Nov’13</a:t>
-            </a:r>
+              <a:t>OpenCL </a:t>
+            </a:r>
+            <a:r>
+              <a:rPr lang="en-GB" dirty="0" smtClean="0"/>
+              <a:t>2.1 </a:t>
+            </a:r>
+            <a:r>
+              <a:rPr lang="en-GB" dirty="0" smtClean="0"/>
+              <a:t>was </a:t>
+            </a:r>
+            <a:r>
+              <a:rPr lang="en-GB" dirty="0" smtClean="0"/>
+              <a:t>released in </a:t>
+            </a:r>
+            <a:r>
+              <a:rPr lang="en-GB" dirty="0" smtClean="0"/>
+              <a:t>Nov’</a:t>
+            </a:r>
+            <a:r>
+              <a:rPr lang="en-GB" dirty="0" smtClean="0"/>
+              <a:t>15</a:t>
+            </a:r>
+            <a:endParaRPr lang="en-GB" dirty="0" smtClean="0"/>
           </a:p>
           <a:p>
             <a:pPr>
@@ -5944,8 +5995,9 @@
             </a:pPr>
             <a:r>
               <a:rPr lang="en-GB" dirty="0" smtClean="0"/>
-              <a:t>Shared Virtual Memory</a:t>
-            </a:r>
+              <a:t>SPIR-V in core</a:t>
+            </a:r>
+            <a:endParaRPr lang="en-GB" dirty="0" smtClean="0"/>
           </a:p>
           <a:p>
             <a:pPr lvl="1">
@@ -5955,8 +6007,9 @@
             </a:pPr>
             <a:r>
               <a:rPr lang="en-GB" dirty="0" smtClean="0"/>
-              <a:t>Nested parallelism</a:t>
-            </a:r>
+              <a:t>Subgroups in core</a:t>
+            </a:r>
+            <a:endParaRPr lang="en-GB" dirty="0" smtClean="0"/>
           </a:p>
           <a:p>
             <a:pPr lvl="1">
@@ -5965,9 +6018,10 @@
               </a:lnSpc>
             </a:pPr>
             <a:r>
-              <a:rPr lang="en-GB" dirty="0" smtClean="0"/>
-              <a:t>Built-in work-group reductions</a:t>
-            </a:r>
+              <a:rPr lang="en-GB" dirty="0" err="1" smtClean="0"/>
+              <a:t>clCloneKernel</a:t>
+            </a:r>
+            <a:endParaRPr lang="en-GB" dirty="0" smtClean="0"/>
           </a:p>
           <a:p>
             <a:pPr lvl="1">
@@ -5977,30 +6031,9 @@
             </a:pPr>
             <a:r>
               <a:rPr lang="en-GB" dirty="0" smtClean="0"/>
-              <a:t>Generic address space</a:t>
-            </a:r>
-          </a:p>
-          <a:p>
-            <a:pPr lvl="1">
-              <a:lnSpc>
-                <a:spcPct val="110000"/>
-              </a:lnSpc>
-            </a:pPr>
-            <a:r>
-              <a:rPr lang="en-GB" dirty="0" smtClean="0"/>
-              <a:t>Pipes</a:t>
-            </a:r>
-          </a:p>
-          <a:p>
-            <a:pPr lvl="1">
-              <a:lnSpc>
-                <a:spcPct val="110000"/>
-              </a:lnSpc>
-            </a:pPr>
-            <a:r>
-              <a:rPr lang="en-GB" dirty="0" smtClean="0"/>
-              <a:t>C11 atomics</a:t>
-            </a:r>
+              <a:t>Low-latency device timers</a:t>
+            </a:r>
+            <a:endParaRPr lang="en-GB" dirty="0" smtClean="0"/>
           </a:p>
           <a:p>
             <a:pPr>
@@ -6028,7 +6061,11 @@
             </a:pPr>
             <a:r>
               <a:rPr lang="en-GB" dirty="0" smtClean="0"/>
-              <a:t>Production drivers now available from Intel and AMD, with more expected to follow</a:t>
+              <a:t>Drivers starting to appear, </a:t>
+            </a:r>
+            <a:r>
+              <a:rPr lang="en-GB" dirty="0" smtClean="0"/>
+              <a:t>with more expected to follow</a:t>
             </a:r>
           </a:p>
         </p:txBody>
@@ -6265,7 +6302,92 @@
           <a:p>
             <a:r>
               <a:rPr lang="en-GB" dirty="0" smtClean="0"/>
-              <a:t>OpenCL 2.0 (and 2.1) talks</a:t>
+              <a:t>OpenCL progression</a:t>
+            </a:r>
+            <a:endParaRPr lang="en-GB" dirty="0"/>
+          </a:p>
+        </p:txBody>
+      </p:sp>
+      <p:pic>
+        <p:nvPicPr>
+          <p:cNvPr id="4" name="Picture 3"/>
+          <p:cNvPicPr>
+            <a:picLocks noChangeAspect="1"/>
+          </p:cNvPicPr>
+          <p:nvPr/>
+        </p:nvPicPr>
+        <p:blipFill>
+          <a:blip r:embed="rId2"/>
+          <a:stretch>
+            <a:fillRect/>
+          </a:stretch>
+        </p:blipFill>
+        <p:spPr>
+          <a:xfrm>
+            <a:off x="127000" y="1955800"/>
+            <a:ext cx="8890000" cy="2946400"/>
+          </a:xfrm>
+          <a:prstGeom prst="rect">
+            <a:avLst/>
+          </a:prstGeom>
+        </p:spPr>
+      </p:pic>
+    </p:spTree>
+    <p:extLst>
+      <p:ext uri="{BB962C8B-B14F-4D97-AF65-F5344CB8AC3E}">
+        <p14:creationId xmlns:p14="http://schemas.microsoft.com/office/powerpoint/2010/main" val="2255476863"/>
+      </p:ext>
+    </p:extLst>
+  </p:cSld>
+  <p:clrMapOvr>
+    <a:masterClrMapping/>
+  </p:clrMapOvr>
+</p:sld>
+</file>
+
+<file path=ppt/slides/slide4.xml><?xml version="1.0" encoding="utf-8"?>
+<p:sld xmlns:a="http://schemas.openxmlformats.org/drawingml/2006/main" xmlns:r="http://schemas.openxmlformats.org/officeDocument/2006/relationships" xmlns:p="http://schemas.openxmlformats.org/presentationml/2006/main">
+  <p:cSld>
+    <p:spTree>
+      <p:nvGrpSpPr>
+        <p:cNvPr id="1" name=""/>
+        <p:cNvGrpSpPr/>
+        <p:nvPr/>
+      </p:nvGrpSpPr>
+      <p:grpSpPr>
+        <a:xfrm>
+          <a:off x="0" y="0"/>
+          <a:ext cx="0" cy="0"/>
+          <a:chOff x="0" y="0"/>
+          <a:chExt cx="0" cy="0"/>
+        </a:xfrm>
+      </p:grpSpPr>
+      <p:sp>
+        <p:nvSpPr>
+          <p:cNvPr id="2" name="Title 1"/>
+          <p:cNvSpPr>
+            <a:spLocks noGrp="1"/>
+          </p:cNvSpPr>
+          <p:nvPr>
+            <p:ph type="title"/>
+          </p:nvPr>
+        </p:nvSpPr>
+        <p:spPr/>
+        <p:txBody>
+          <a:bodyPr/>
+          <a:lstStyle/>
+          <a:p>
+            <a:r>
+              <a:rPr lang="en-GB" dirty="0" smtClean="0"/>
+              <a:t>OpenCL </a:t>
+            </a:r>
+            <a:r>
+              <a:rPr lang="en-GB" dirty="0" smtClean="0"/>
+              <a:t>2.x </a:t>
+            </a:r>
+            <a:r>
+              <a:rPr lang="en-GB" dirty="0" smtClean="0"/>
+              <a:t>talks</a:t>
             </a:r>
             <a:endParaRPr lang="en-GB" dirty="0"/>
           </a:p>
@@ -6289,62 +6411,60 @@
         </p:spPr>
         <p:txBody>
           <a:bodyPr>
-            <a:normAutofit fontScale="92500"/>
+            <a:normAutofit/>
           </a:bodyPr>
           <a:lstStyle/>
           <a:p>
             <a:r>
-              <a:rPr lang="en-GB" dirty="0" err="1" smtClean="0"/>
-              <a:t>OpenCL.next</a:t>
-            </a:r>
-            <a:r>
-              <a:rPr lang="en-GB" dirty="0" smtClean="0"/>
-              <a:t> Overview (Tuesday 3.30pm)</a:t>
-            </a:r>
+              <a:rPr lang="en-GB" dirty="0" smtClean="0"/>
+              <a:t>OpenCL C++ tutorial (Wednesday 9am)</a:t>
+            </a:r>
+            <a:endParaRPr lang="en-GB" dirty="0" smtClean="0"/>
           </a:p>
           <a:p>
             <a:r>
               <a:rPr lang="en-GB" dirty="0"/>
-              <a:t>Developer Feedback Session on OpenCL </a:t>
-            </a:r>
-            <a:r>
-              <a:rPr lang="en-GB" dirty="0" smtClean="0"/>
-              <a:t>2.1 with Khronos OpenCL WG (Tuesday 4pm)</a:t>
-            </a:r>
-          </a:p>
-          <a:p>
+              <a:t>OpenCL – A State of the </a:t>
+            </a:r>
+            <a:r>
+              <a:rPr lang="en-GB" dirty="0" smtClean="0"/>
+              <a:t>Union</a:t>
+            </a:r>
             <a:r>
               <a:rPr lang="en-GB" dirty="0"/>
-              <a:t>A Look at the OpenCL 2.0 Execution </a:t>
-            </a:r>
-            <a:r>
-              <a:rPr lang="en-GB" dirty="0" smtClean="0"/>
-              <a:t>Model (Wednesday 10am)</a:t>
+              <a:t> (Wednesday </a:t>
+            </a:r>
+            <a:r>
+              <a:rPr lang="en-GB" dirty="0" smtClean="0"/>
+              <a:t>2pm</a:t>
+            </a:r>
+            <a:r>
+              <a:rPr lang="en-GB" dirty="0" smtClean="0"/>
+              <a:t>)</a:t>
             </a:r>
           </a:p>
           <a:p>
             <a:r>
               <a:rPr lang="en-GB" dirty="0"/>
-              <a:t>Exploring the Features of OpenCL </a:t>
-            </a:r>
-            <a:r>
-              <a:rPr lang="en-GB" dirty="0" smtClean="0"/>
-              <a:t>2.0 (Wednesday 10.20am)</a:t>
-            </a:r>
-          </a:p>
-          <a:p>
-            <a:r>
-              <a:rPr lang="en-GB" dirty="0"/>
-              <a:t>Achieving Performance with OpenCL 2.0 on Intel Processor </a:t>
-            </a:r>
-            <a:r>
-              <a:rPr lang="en-GB" dirty="0" smtClean="0"/>
-              <a:t>Graphics (Wednesday 10.40am)</a:t>
-            </a:r>
-          </a:p>
-          <a:p>
-            <a:pPr lvl="1"/>
-            <a:endParaRPr lang="en-GB" dirty="0"/>
+              <a:t>What Next for </a:t>
+            </a:r>
+            <a:r>
+              <a:rPr lang="en-GB" dirty="0" smtClean="0"/>
+              <a:t>OpenCL – a session with the Khronos OpenCL WG </a:t>
+            </a:r>
+            <a:r>
+              <a:rPr lang="en-GB" dirty="0" smtClean="0"/>
+              <a:t>(</a:t>
+            </a:r>
+            <a:r>
+              <a:rPr lang="en-GB" dirty="0" smtClean="0"/>
+              <a:t>Wednesday </a:t>
+            </a:r>
+            <a:r>
+              <a:rPr lang="en-GB" dirty="0" smtClean="0"/>
+              <a:t>4.30pm)</a:t>
+            </a:r>
+            <a:endParaRPr lang="en-GB" dirty="0" smtClean="0"/>
           </a:p>
         </p:txBody>
       </p:sp>
@@ -6368,7 +6488,7 @@
 </p:sld>
 </file>
 
-<file path=ppt/slides/slide4.xml><?xml version="1.0" encoding="utf-8"?>
+<file path=ppt/slides/slide5.xml><?xml version="1.0" encoding="utf-8"?>
 <p:sld xmlns:a="http://schemas.openxmlformats.org/drawingml/2006/main" xmlns:r="http://schemas.openxmlformats.org/officeDocument/2006/relationships" xmlns:p="http://schemas.openxmlformats.org/presentationml/2006/main">
   <p:cSld>
     <p:spTree>
@@ -6426,7 +6546,7 @@
         </p:spPr>
         <p:txBody>
           <a:bodyPr>
-            <a:normAutofit fontScale="85000" lnSpcReduction="20000"/>
+            <a:normAutofit fontScale="92500" lnSpcReduction="20000"/>
           </a:bodyPr>
           <a:lstStyle/>
           <a:p>
@@ -6451,15 +6571,7 @@
             </a:pPr>
             <a:r>
               <a:rPr lang="en-GB" dirty="0" smtClean="0"/>
-              <a:t>Defines an </a:t>
-            </a:r>
-            <a:r>
-              <a:rPr lang="en-GB" dirty="0" smtClean="0"/>
-              <a:t>IR </a:t>
-            </a:r>
-            <a:r>
-              <a:rPr lang="en-GB" dirty="0" smtClean="0"/>
-              <a:t>for OpenCL programs</a:t>
+              <a:t>Defines an IR for OpenCL programs</a:t>
             </a:r>
           </a:p>
           <a:p>
@@ -6470,15 +6582,7 @@
             </a:pPr>
             <a:r>
               <a:rPr lang="en-GB" dirty="0" smtClean="0"/>
-              <a:t>Means that developers can ship portable </a:t>
-            </a:r>
-            <a:r>
-              <a:rPr lang="en-GB" dirty="0" smtClean="0"/>
-              <a:t>binaries </a:t>
-            </a:r>
-            <a:r>
-              <a:rPr lang="en-GB" dirty="0" smtClean="0"/>
-              <a:t>instead of their OpenCL source</a:t>
+              <a:t>Means that developers can ship portable binaries instead of their OpenCL source</a:t>
             </a:r>
           </a:p>
           <a:p>
@@ -6508,24 +6612,17 @@
             </a:pPr>
             <a:r>
               <a:rPr lang="en-GB" dirty="0" smtClean="0"/>
-              <a:t>SPIR </a:t>
-            </a:r>
-            <a:r>
-              <a:rPr lang="en-GB" dirty="0" smtClean="0"/>
-              <a:t>1.2 &amp; </a:t>
-            </a:r>
-            <a:r>
-              <a:rPr lang="en-GB" dirty="0" smtClean="0"/>
-              <a:t>SPIR 2.0 </a:t>
-            </a:r>
-            <a:r>
-              <a:rPr lang="en-GB" dirty="0" smtClean="0"/>
-              <a:t>ratified, </a:t>
-            </a:r>
-            <a:r>
-              <a:rPr lang="en-GB" dirty="0" smtClean="0"/>
-              <a:t>SPIR-V provisional available now</a:t>
-            </a:r>
+              <a:t>SPIR</a:t>
+            </a:r>
+            <a:r>
+              <a:rPr lang="en-GB" dirty="0" smtClean="0"/>
+              <a:t>-V </a:t>
+            </a:r>
+            <a:r>
+              <a:rPr lang="en-GB" dirty="0" smtClean="0"/>
+              <a:t>ratified March 2016</a:t>
+            </a:r>
+            <a:endParaRPr lang="en-GB" dirty="0" smtClean="0"/>
           </a:p>
           <a:p>
             <a:pPr>
@@ -6535,7 +6632,7 @@
             </a:pPr>
             <a:r>
               <a:rPr lang="en-GB" dirty="0" smtClean="0"/>
-              <a:t>Implementations available from Intel and AMD, with more on the way</a:t>
+              <a:t>Open source SPIR-V tools on Khronos website</a:t>
             </a:r>
             <a:endParaRPr lang="en-GB" dirty="0"/>
           </a:p>
@@ -6588,7 +6685,7 @@
 </p:sld>
 </file>
 
-<file path=ppt/slides/slide5.xml><?xml version="1.0" encoding="utf-8"?>
+<file path=ppt/slides/slide6.xml><?xml version="1.0" encoding="utf-8"?>
 <p:sld xmlns:a="http://schemas.openxmlformats.org/drawingml/2006/main" xmlns:r="http://schemas.openxmlformats.org/officeDocument/2006/relationships" xmlns:p="http://schemas.openxmlformats.org/presentationml/2006/main">
   <p:cSld>
     <p:spTree>
@@ -6699,164 +6796,6 @@
 </p:sld>
 </file>
 
-<file path=ppt/slides/slide6.xml><?xml version="1.0" encoding="utf-8"?>
-<p:sld xmlns:a="http://schemas.openxmlformats.org/drawingml/2006/main" xmlns:r="http://schemas.openxmlformats.org/officeDocument/2006/relationships" xmlns:p="http://schemas.openxmlformats.org/presentationml/2006/main">
-  <p:cSld>
-    <p:spTree>
-      <p:nvGrpSpPr>
-        <p:cNvPr id="1" name=""/>
-        <p:cNvGrpSpPr/>
-        <p:nvPr/>
-      </p:nvGrpSpPr>
-      <p:grpSpPr>
-        <a:xfrm>
-          <a:off x="0" y="0"/>
-          <a:ext cx="0" cy="0"/>
-          <a:chOff x="0" y="0"/>
-          <a:chExt cx="0" cy="0"/>
-        </a:xfrm>
-      </p:grpSpPr>
-      <p:sp>
-        <p:nvSpPr>
-          <p:cNvPr id="2" name="Title 1"/>
-          <p:cNvSpPr>
-            <a:spLocks noGrp="1"/>
-          </p:cNvSpPr>
-          <p:nvPr>
-            <p:ph type="title"/>
-          </p:nvPr>
-        </p:nvSpPr>
-        <p:spPr/>
-        <p:txBody>
-          <a:bodyPr/>
-          <a:lstStyle/>
-          <a:p>
-            <a:r>
-              <a:rPr lang="en-GB" dirty="0" smtClean="0"/>
-              <a:t>SPIR talks at IWOCL</a:t>
-            </a:r>
-            <a:endParaRPr lang="en-GB" dirty="0"/>
-          </a:p>
-        </p:txBody>
-      </p:sp>
-      <p:sp>
-        <p:nvSpPr>
-          <p:cNvPr id="3" name="Content Placeholder 2"/>
-          <p:cNvSpPr>
-            <a:spLocks noGrp="1"/>
-          </p:cNvSpPr>
-          <p:nvPr>
-            <p:ph idx="1"/>
-          </p:nvPr>
-        </p:nvSpPr>
-        <p:spPr/>
-        <p:txBody>
-          <a:bodyPr/>
-          <a:lstStyle/>
-          <a:p>
-            <a:endParaRPr lang="en-GB" dirty="0" smtClean="0"/>
-          </a:p>
-          <a:p>
-            <a:r>
-              <a:rPr lang="en-GB" dirty="0" smtClean="0"/>
-              <a:t>Developer </a:t>
-            </a:r>
-            <a:r>
-              <a:rPr lang="en-GB" dirty="0"/>
-              <a:t>Feedback Session on OpenCL </a:t>
-            </a:r>
-            <a:r>
-              <a:rPr lang="en-GB" dirty="0" smtClean="0"/>
-              <a:t>2.1, SYCL and SPIR </a:t>
-            </a:r>
-            <a:r>
-              <a:rPr lang="en-GB" dirty="0"/>
-              <a:t>with </a:t>
-            </a:r>
-            <a:r>
-              <a:rPr lang="en-GB" dirty="0" smtClean="0"/>
-              <a:t>the Khronos </a:t>
-            </a:r>
-            <a:r>
-              <a:rPr lang="en-GB" dirty="0"/>
-              <a:t>OpenCL </a:t>
-            </a:r>
-            <a:r>
-              <a:rPr lang="en-GB" dirty="0" smtClean="0"/>
-              <a:t>working group (</a:t>
-            </a:r>
-            <a:r>
-              <a:rPr lang="en-GB" dirty="0"/>
-              <a:t>Tuesday 4pm)</a:t>
-            </a:r>
-          </a:p>
-          <a:p>
-            <a:endParaRPr lang="en-GB" dirty="0" smtClean="0"/>
-          </a:p>
-          <a:p>
-            <a:r>
-              <a:rPr lang="en-GB" dirty="0" smtClean="0"/>
-              <a:t>Mapping </a:t>
-            </a:r>
-            <a:r>
-              <a:rPr lang="en-GB" dirty="0"/>
-              <a:t>C++ AMP to OpenCL / </a:t>
-            </a:r>
-            <a:r>
-              <a:rPr lang="en-GB" dirty="0" smtClean="0"/>
-              <a:t>HSA (Wednesday 11.50am)</a:t>
-            </a:r>
-            <a:endParaRPr lang="en-GB" dirty="0"/>
-          </a:p>
-        </p:txBody>
-      </p:sp>
-      <p:pic>
-        <p:nvPicPr>
-          <p:cNvPr id="4" name="Picture 3"/>
-          <p:cNvPicPr>
-            <a:picLocks noChangeAspect="1"/>
-          </p:cNvPicPr>
-          <p:nvPr/>
-        </p:nvPicPr>
-        <p:blipFill>
-          <a:blip r:embed="rId2"/>
-          <a:stretch>
-            <a:fillRect/>
-          </a:stretch>
-        </p:blipFill>
-        <p:spPr>
-          <a:xfrm>
-            <a:off x="1115616" y="332656"/>
-            <a:ext cx="2160240" cy="1080120"/>
-          </a:xfrm>
-          <a:prstGeom prst="rect">
-            <a:avLst/>
-          </a:prstGeom>
-          <a:solidFill>
-            <a:schemeClr val="bg1"/>
-          </a:solidFill>
-        </p:spPr>
-      </p:pic>
-    </p:spTree>
-    <p:extLst>
-      <p:ext uri="{BB962C8B-B14F-4D97-AF65-F5344CB8AC3E}">
-        <p14:creationId xmlns:p14="http://schemas.microsoft.com/office/powerpoint/2010/main" val="3588650336"/>
-      </p:ext>
-    </p:extLst>
-  </p:cSld>
-  <p:clrMapOvr>
-    <a:masterClrMapping/>
-  </p:clrMapOvr>
-  <p:timing>
-    <p:tnLst>
-      <p:par>
-        <p:cTn xmlns:p14="http://schemas.microsoft.com/office/powerpoint/2010/main" id="1" dur="indefinite" restart="never" nodeType="tmRoot"/>
-      </p:par>
-    </p:tnLst>
-  </p:timing>
-</p:sld>
-</file>
-
 <file path=ppt/slides/slide7.xml><?xml version="1.0" encoding="utf-8"?>
 <p:sld xmlns:a="http://schemas.openxmlformats.org/drawingml/2006/main" xmlns:r="http://schemas.openxmlformats.org/officeDocument/2006/relationships" xmlns:p="http://schemas.openxmlformats.org/presentationml/2006/main">
   <p:cSld>
@@ -6915,7 +6854,7 @@
         </p:spPr>
         <p:txBody>
           <a:bodyPr>
-            <a:normAutofit fontScale="92500" lnSpcReduction="20000"/>
+            <a:normAutofit fontScale="85000" lnSpcReduction="10000"/>
           </a:bodyPr>
           <a:lstStyle/>
           <a:p>
@@ -6984,8 +6923,13 @@
             </a:r>
             <a:r>
               <a:rPr lang="en-GB" dirty="0" smtClean="0"/>
-              <a:t> released Mar’14</a:t>
-            </a:r>
+              <a:t> released Mar’</a:t>
+            </a:r>
+            <a:r>
+              <a:rPr lang="en-GB" dirty="0" smtClean="0"/>
+              <a:t>14, v1.2 final released at IWOCL 2015</a:t>
+            </a:r>
+            <a:endParaRPr lang="en-GB" dirty="0" smtClean="0"/>
           </a:p>
           <a:p>
             <a:pPr>
@@ -7104,17 +7048,25 @@
         <p:spPr/>
         <p:txBody>
           <a:bodyPr>
-            <a:normAutofit fontScale="92500" lnSpcReduction="10000"/>
+            <a:normAutofit/>
           </a:bodyPr>
           <a:lstStyle/>
           <a:p>
             <a:r>
+              <a:rPr lang="en-GB" dirty="0" smtClean="0"/>
+              <a:t>OpenCL C++ </a:t>
+            </a:r>
+            <a:r>
               <a:rPr lang="en-GB" dirty="0"/>
-              <a:t>Khronos SYCL for </a:t>
-            </a:r>
-            <a:r>
-              <a:rPr lang="en-GB" dirty="0" smtClean="0"/>
-              <a:t>OpenCL tutorial (Tuesday at 9.30am)</a:t>
+              <a:t>tutorial (Wednesday at </a:t>
+            </a:r>
+            <a:r>
+              <a:rPr lang="en-GB" dirty="0" smtClean="0"/>
+              <a:t>9am</a:t>
+            </a:r>
+            <a:r>
+              <a:rPr lang="en-GB" dirty="0" smtClean="0"/>
+              <a:t>)</a:t>
             </a:r>
             <a:endParaRPr lang="en-GB" dirty="0"/>
           </a:p>
@@ -7125,7 +7077,23 @@
             </a:r>
             <a:r>
               <a:rPr lang="en-GB" dirty="0"/>
-              <a:t>Feedback Session on OpenCL 2.1, SYCL and SPIR with the Khronos OpenCL working group (Tuesday 4pm</a:t>
+              <a:t>Feedback Session on OpenCL 2</a:t>
+            </a:r>
+            <a:r>
+              <a:rPr lang="en-GB" dirty="0" smtClean="0"/>
+              <a:t>.x, </a:t>
+            </a:r>
+            <a:r>
+              <a:rPr lang="en-GB" dirty="0"/>
+              <a:t>SYCL and SPIR with the Khronos OpenCL working group </a:t>
+            </a:r>
+            <a:r>
+              <a:rPr lang="en-GB" dirty="0"/>
+              <a:t>(Wednesday </a:t>
+            </a:r>
+            <a:r>
+              <a:rPr lang="en-GB" dirty="0" smtClean="0"/>
+              <a:t>4.30pm</a:t>
             </a:r>
             <a:r>
               <a:rPr lang="en-GB" dirty="0" smtClean="0"/>
@@ -7135,25 +7103,12 @@
           <a:p>
             <a:r>
               <a:rPr lang="en-GB" dirty="0"/>
-              <a:t>Update on the SYCL for OpenCL Open Standard to Enable C++ Meta Programming on Top of </a:t>
-            </a:r>
-            <a:r>
-              <a:rPr lang="en-GB" dirty="0" smtClean="0"/>
-              <a:t>OpenCL (Wednesday 12.10pm)</a:t>
-            </a:r>
-          </a:p>
-          <a:p>
-            <a:r>
-              <a:rPr lang="en-GB" dirty="0"/>
-              <a:t>Kernel Composition in </a:t>
-            </a:r>
-            <a:r>
-              <a:rPr lang="en-GB" dirty="0" smtClean="0"/>
-              <a:t>SYCL (Wednesday 12.30pm)</a:t>
-            </a:r>
-            <a:endParaRPr lang="en-GB" dirty="0"/>
-          </a:p>
-          <a:p>
+              <a:t>Envisioning the Future – Using SYCL to Develop Vision </a:t>
+            </a:r>
+            <a:r>
+              <a:rPr lang="en-GB" dirty="0" smtClean="0"/>
+              <a:t>Tools (Wednesday 2.30pm)</a:t>
+            </a:r>
             <a:endParaRPr lang="en-GB" dirty="0"/>
           </a:p>
         </p:txBody>
@@ -7258,7 +7213,7 @@
         <p:spPr/>
         <p:txBody>
           <a:bodyPr>
-            <a:normAutofit fontScale="92500"/>
+            <a:normAutofit fontScale="92500" lnSpcReduction="10000"/>
           </a:bodyPr>
           <a:lstStyle/>
           <a:p>
@@ -7302,11 +7257,7 @@
             </a:r>
             <a:r>
               <a:rPr lang="en-GB" dirty="0" smtClean="0"/>
-              <a:t> </a:t>
-            </a:r>
-            <a:r>
-              <a:rPr lang="en-GB" dirty="0" smtClean="0"/>
-              <a:t>(open source soon)</a:t>
+              <a:t> (open source soon)</a:t>
             </a:r>
           </a:p>
           <a:p>
@@ -7341,31 +7292,26 @@
           <a:p>
             <a:r>
               <a:rPr lang="en-GB" dirty="0" smtClean="0"/>
-              <a:t>Lots </a:t>
-            </a:r>
-            <a:r>
-              <a:rPr lang="en-GB" dirty="0" smtClean="0"/>
-              <a:t>more - see the Khronos OpenCL pages:</a:t>
-            </a:r>
-            <a:br>
-              <a:rPr lang="en-GB" dirty="0" smtClean="0"/>
-            </a:br>
-            <a:r>
-              <a:rPr lang="en-GB" dirty="0"/>
-              <a:t/>
-            </a:r>
-            <a:br>
-              <a:rPr lang="en-GB" dirty="0"/>
-            </a:br>
-            <a:r>
-              <a:rPr lang="en-GB" dirty="0"/>
-              <a:t>     </a:t>
+              <a:t>Lots more - see the Khronos OpenCL </a:t>
+            </a:r>
+            <a:r>
+              <a:rPr lang="en-GB" dirty="0" smtClean="0"/>
+              <a:t>pages: </a:t>
+            </a:r>
+          </a:p>
+          <a:p>
+            <a:pPr lvl="1"/>
+            <a:r>
+              <a:rPr lang="en-GB" dirty="0" smtClean="0">
+                <a:hlinkClick r:id="rId3"/>
+              </a:rPr>
+              <a:t>https</a:t>
             </a:r>
             <a:r>
               <a:rPr lang="en-GB" dirty="0">
                 <a:hlinkClick r:id="rId3"/>
               </a:rPr>
-              <a:t>https://www.khronos.org/opencl/</a:t>
+              <a:t>://www.khronos.org/opencl/</a:t>
             </a:r>
             <a:r>
               <a:rPr lang="en-GB" dirty="0" smtClean="0">
@@ -7377,6 +7323,22 @@
               <a:rPr lang="en-GB" dirty="0" smtClean="0"/>
               <a:t> </a:t>
             </a:r>
+            <a:endParaRPr lang="en-GB" dirty="0" smtClean="0"/>
+          </a:p>
+          <a:p>
+            <a:r>
+              <a:rPr lang="en-GB" dirty="0" smtClean="0"/>
+              <a:t>Also see Karl Rupp's talk at 9am on Thursday: </a:t>
+            </a:r>
+            <a:r>
+              <a:rPr lang="en-GB" dirty="0"/>
+              <a:t>The OpenCL Library Ecosystem: Current Status and Future </a:t>
+            </a:r>
+            <a:r>
+              <a:rPr lang="en-GB" dirty="0" smtClean="0"/>
+              <a:t>Perspectives</a:t>
+            </a:r>
+            <a:endParaRPr lang="en-GB" dirty="0" smtClean="0"/>
           </a:p>
         </p:txBody>
       </p:sp>

</xml_diff>

<commit_message>
Minor tweaks to outro
- Update SYCL slide with current implementation status
- Add link to new SYCL ecosystem website
- Update libraries slide
</commit_message>
<xml_diff>
--- a/slides/advanced_outro.pptx
+++ b/slides/advanced_outro.pptx
@@ -168,7 +168,7 @@
       </p14:sectionLst>
     </p:ext>
     <p:ext uri="{EFAFB233-063F-42B5-8137-9DF3F51BA10A}">
-      <p15:sldGuideLst xmlns:p15="http://schemas.microsoft.com/office/powerpoint/2012/main">
+      <p15:sldGuideLst xmlns:p15="http://schemas.microsoft.com/office/powerpoint/2012/main" xmlns="">
         <p15:guide id="1" orient="horz" pos="2160">
           <p15:clr>
             <a:srgbClr val="A4A3A4"/>
@@ -188,7 +188,6 @@
 <file path=ppt/commentAuthors.xml><?xml version="1.0" encoding="utf-8"?>
 <p:cmAuthorLst xmlns:a="http://schemas.openxmlformats.org/drawingml/2006/main" xmlns:r="http://schemas.openxmlformats.org/officeDocument/2006/relationships" xmlns:p="http://schemas.openxmlformats.org/presentationml/2006/main">
   <p:cmAuthor id="0" name="Tom Deakin" initials="T" lastIdx="25" clrIdx="0"/>
-  <p:cmAuthor id="1" name="Simon McIntosh-Smith" initials="" lastIdx="0" clrIdx="1"/>
 </p:cmAuthorLst>
 </file>
 
@@ -275,7 +274,7 @@
             <a:fld id="{92597E5C-85BB-4669-9209-B5E04E6ED101}" type="datetimeFigureOut">
               <a:rPr lang="en-GB" smtClean="0"/>
               <a:pPr/>
-              <a:t>13/05/2017</a:t>
+              <a:t>14/05/17</a:t>
             </a:fld>
             <a:endParaRPr lang="en-GB"/>
           </a:p>
@@ -905,7 +904,7 @@
             <a:fld id="{19E03964-7D59-4BF8-AE10-3A215A42C3E4}" type="datetime1">
               <a:rPr lang="en-GB" smtClean="0"/>
               <a:pPr/>
-              <a:t>13/05/2017</a:t>
+              <a:t>14/05/17</a:t>
             </a:fld>
             <a:endParaRPr lang="en-GB"/>
           </a:p>
@@ -1072,7 +1071,7 @@
             <a:fld id="{8E5ADEB7-8139-4AC1-94DC-FE9E54B1CCD2}" type="datetime1">
               <a:rPr lang="en-GB" smtClean="0"/>
               <a:pPr/>
-              <a:t>13/05/2017</a:t>
+              <a:t>14/05/17</a:t>
             </a:fld>
             <a:endParaRPr lang="en-GB"/>
           </a:p>
@@ -1249,7 +1248,7 @@
             <a:fld id="{9C77A686-1785-49A1-B4C9-55A3C7EEADE4}" type="datetime1">
               <a:rPr lang="en-GB" smtClean="0"/>
               <a:pPr/>
-              <a:t>13/05/2017</a:t>
+              <a:t>14/05/17</a:t>
             </a:fld>
             <a:endParaRPr lang="en-GB"/>
           </a:p>
@@ -1600,13 +1599,13 @@
   <p:clrMapOvr>
     <a:masterClrMapping/>
   </p:clrMapOvr>
-  <p:transition>
+  <p:transition xmlns:p14="http://schemas.microsoft.com/office/powerpoint/2010/main">
     <p:fade/>
   </p:transition>
   <p:timing>
     <p:tnLst>
       <p:par>
-        <p:cTn id="1" dur="indefinite" restart="never" nodeType="tmRoot"/>
+        <p:cTn xmlns:p14="http://schemas.microsoft.com/office/powerpoint/2010/main" id="1" dur="indefinite" restart="never" nodeType="tmRoot"/>
       </p:par>
     </p:tnLst>
   </p:timing>
@@ -1723,7 +1722,7 @@
             <a:fld id="{D65327FA-D1E5-40CA-8941-3DD0B6730F8A}" type="datetime1">
               <a:rPr lang="en-GB" smtClean="0"/>
               <a:pPr/>
-              <a:t>13/05/2017</a:t>
+              <a:t>14/05/17</a:t>
             </a:fld>
             <a:endParaRPr lang="en-GB"/>
           </a:p>
@@ -1966,7 +1965,7 @@
             <a:fld id="{DB33F153-90AC-449F-A303-26940247ABC8}" type="datetime1">
               <a:rPr lang="en-GB" smtClean="0"/>
               <a:pPr/>
-              <a:t>13/05/2017</a:t>
+              <a:t>14/05/17</a:t>
             </a:fld>
             <a:endParaRPr lang="en-GB"/>
           </a:p>
@@ -2251,7 +2250,7 @@
             <a:fld id="{84E24492-3EA5-478D-9F72-7B8FF369DDEB}" type="datetime1">
               <a:rPr lang="en-GB" smtClean="0"/>
               <a:pPr/>
-              <a:t>13/05/2017</a:t>
+              <a:t>14/05/17</a:t>
             </a:fld>
             <a:endParaRPr lang="en-GB"/>
           </a:p>
@@ -2670,7 +2669,7 @@
             <a:fld id="{43976A03-596E-4490-AE35-AFB744E08901}" type="datetime1">
               <a:rPr lang="en-GB" smtClean="0"/>
               <a:pPr/>
-              <a:t>13/05/2017</a:t>
+              <a:t>14/05/17</a:t>
             </a:fld>
             <a:endParaRPr lang="en-GB"/>
           </a:p>
@@ -2785,7 +2784,7 @@
             <a:fld id="{4C8E3CB4-829C-4F19-9E86-B2AAEC36BD90}" type="datetime1">
               <a:rPr lang="en-GB" smtClean="0"/>
               <a:pPr/>
-              <a:t>13/05/2017</a:t>
+              <a:t>14/05/17</a:t>
             </a:fld>
             <a:endParaRPr lang="en-GB"/>
           </a:p>
@@ -2877,7 +2876,7 @@
             <a:fld id="{D4A6FE01-96D8-461F-B1B2-1F0C16D98900}" type="datetime1">
               <a:rPr lang="en-GB" smtClean="0"/>
               <a:pPr/>
-              <a:t>13/05/2017</a:t>
+              <a:t>14/05/17</a:t>
             </a:fld>
             <a:endParaRPr lang="en-GB"/>
           </a:p>
@@ -3151,7 +3150,7 @@
             <a:fld id="{B24CB088-CFF7-44C4-9CCE-18845754E6D4}" type="datetime1">
               <a:rPr lang="en-GB" smtClean="0"/>
               <a:pPr/>
-              <a:t>13/05/2017</a:t>
+              <a:t>14/05/17</a:t>
             </a:fld>
             <a:endParaRPr lang="en-GB"/>
           </a:p>
@@ -3405,7 +3404,7 @@
             <a:fld id="{CD3A280C-4DEC-4EEC-BD59-A30886E06BA1}" type="datetime1">
               <a:rPr lang="en-GB" smtClean="0"/>
               <a:pPr/>
-              <a:t>13/05/2017</a:t>
+              <a:t>14/05/17</a:t>
             </a:fld>
             <a:endParaRPr lang="en-GB"/>
           </a:p>
@@ -3615,7 +3614,7 @@
             <a:fld id="{E222BC38-3FAE-415B-AD1C-2D338E3D6B03}" type="datetime1">
               <a:rPr lang="en-GB" smtClean="0"/>
               <a:pPr/>
-              <a:t>13/05/2017</a:t>
+              <a:t>14/05/17</a:t>
             </a:fld>
             <a:endParaRPr lang="en-GB"/>
           </a:p>
@@ -4063,7 +4062,7 @@
   <p:timing>
     <p:tnLst>
       <p:par>
-        <p:cTn id="1" dur="indefinite" restart="never" nodeType="tmRoot"/>
+        <p:cTn xmlns:p14="http://schemas.microsoft.com/office/powerpoint/2010/main" id="1" dur="indefinite" restart="never" nodeType="tmRoot"/>
       </p:par>
     </p:tnLst>
   </p:timing>
@@ -4788,7 +4787,7 @@
   <p:timing>
     <p:tnLst>
       <p:par>
-        <p:cTn id="1" dur="indefinite" restart="never" nodeType="tmRoot"/>
+        <p:cTn xmlns:p14="http://schemas.microsoft.com/office/powerpoint/2010/main" id="1" dur="indefinite" restart="never" nodeType="tmRoot"/>
       </p:par>
     </p:tnLst>
   </p:timing>
@@ -4876,31 +4875,14 @@
           <a:p>
             <a:r>
               <a:rPr lang="en-GB" dirty="0" smtClean="0"/>
-              <a:t>Downloaded over </a:t>
-            </a:r>
-            <a:r>
-              <a:rPr lang="en-GB" dirty="0" smtClean="0"/>
-              <a:t>11,0</a:t>
-            </a:r>
-            <a:r>
-              <a:rPr lang="en-GB" dirty="0" smtClean="0"/>
-              <a:t>00 </a:t>
-            </a:r>
-            <a:r>
-              <a:rPr lang="en-GB" dirty="0" smtClean="0"/>
-              <a:t>times so far!</a:t>
-            </a:r>
-          </a:p>
-          <a:p>
-            <a:r>
-              <a:rPr lang="en-GB" dirty="0" smtClean="0"/>
-              <a:t>Lots of training material, examples and solutions, source code </a:t>
-            </a:r>
-            <a:r>
-              <a:rPr lang="en-GB" dirty="0" smtClean="0"/>
-              <a:t>etc.</a:t>
-            </a:r>
-            <a:endParaRPr lang="en-GB" dirty="0" smtClean="0"/>
+              <a:t>Downloaded over 11,000 times so far!</a:t>
+            </a:r>
+          </a:p>
+          <a:p>
+            <a:r>
+              <a:rPr lang="en-GB" dirty="0" smtClean="0"/>
+              <a:t>Lots of training material, examples and solutions, source code etc.</a:t>
+            </a:r>
           </a:p>
           <a:p>
             <a:r>
@@ -4972,7 +4954,7 @@
   <p:timing>
     <p:tnLst>
       <p:par>
-        <p:cTn id="1" dur="indefinite" restart="never" nodeType="tmRoot"/>
+        <p:cTn xmlns:p14="http://schemas.microsoft.com/office/powerpoint/2010/main" id="1" dur="indefinite" restart="never" nodeType="tmRoot"/>
       </p:par>
     </p:tnLst>
   </p:timing>
@@ -5126,7 +5108,7 @@
   <p:timing>
     <p:tnLst>
       <p:par>
-        <p:cTn id="1" dur="indefinite" restart="never" nodeType="tmRoot"/>
+        <p:cTn xmlns:p14="http://schemas.microsoft.com/office/powerpoint/2010/main" id="1" dur="indefinite" restart="never" nodeType="tmRoot"/>
       </p:par>
     </p:tnLst>
   </p:timing>
@@ -5239,11 +5221,7 @@
             <a:pPr lvl="1"/>
             <a:r>
               <a:rPr lang="en-GB" dirty="0" smtClean="0"/>
-              <a:t>May </a:t>
-            </a:r>
-            <a:r>
-              <a:rPr lang="en-GB" dirty="0" smtClean="0"/>
-              <a:t>each year</a:t>
+              <a:t>May each year</a:t>
             </a:r>
           </a:p>
           <a:p>
@@ -5264,7 +5242,7 @@
   <p:timing>
     <p:tnLst>
       <p:par>
-        <p:cTn id="1" dur="indefinite" restart="never" nodeType="tmRoot"/>
+        <p:cTn xmlns:p14="http://schemas.microsoft.com/office/powerpoint/2010/main" id="1" dur="indefinite" restart="never" nodeType="tmRoot"/>
       </p:par>
     </p:tnLst>
   </p:timing>
@@ -5324,7 +5302,7 @@
   <p:timing>
     <p:tnLst>
       <p:par>
-        <p:cTn id="1" dur="indefinite" restart="never" nodeType="tmRoot"/>
+        <p:cTn xmlns:p14="http://schemas.microsoft.com/office/powerpoint/2010/main" id="1" dur="indefinite" restart="never" nodeType="tmRoot"/>
       </p:par>
     </p:tnLst>
   </p:timing>
@@ -5572,7 +5550,7 @@
   <p:timing>
     <p:tnLst>
       <p:par>
-        <p:cTn id="1" dur="indefinite" restart="never" nodeType="tmRoot"/>
+        <p:cTn xmlns:p14="http://schemas.microsoft.com/office/powerpoint/2010/main" id="1" dur="indefinite" restart="never" nodeType="tmRoot"/>
       </p:par>
     </p:tnLst>
   </p:timing>
@@ -5655,7 +5633,7 @@
   <p:timing>
     <p:tnLst>
       <p:par>
-        <p:cTn id="1" dur="indefinite" restart="never" nodeType="tmRoot"/>
+        <p:cTn xmlns:p14="http://schemas.microsoft.com/office/powerpoint/2010/main" id="1" dur="indefinite" restart="never" nodeType="tmRoot"/>
       </p:par>
     </p:tnLst>
   </p:timing>
@@ -5738,7 +5716,7 @@
   <p:timing>
     <p:tnLst>
       <p:par>
-        <p:cTn id="1" dur="indefinite" restart="never" nodeType="tmRoot"/>
+        <p:cTn xmlns:p14="http://schemas.microsoft.com/office/powerpoint/2010/main" id="1" dur="indefinite" restart="never" nodeType="tmRoot"/>
       </p:par>
     </p:tnLst>
   </p:timing>
@@ -5858,7 +5836,7 @@
   <p:timing>
     <p:tnLst>
       <p:par>
-        <p:cTn id="1" dur="indefinite" restart="never" nodeType="tmRoot"/>
+        <p:cTn xmlns:p14="http://schemas.microsoft.com/office/powerpoint/2010/main" id="1" dur="indefinite" restart="never" nodeType="tmRoot"/>
       </p:par>
     </p:tnLst>
   </p:timing>
@@ -5984,7 +5962,7 @@
   <p:timing>
     <p:tnLst>
       <p:par>
-        <p:cTn id="1" dur="indefinite" restart="never" nodeType="tmRoot"/>
+        <p:cTn xmlns:p14="http://schemas.microsoft.com/office/powerpoint/2010/main" id="1" dur="indefinite" restart="never" nodeType="tmRoot"/>
       </p:par>
     </p:tnLst>
   </p:timing>
@@ -7904,14 +7882,14 @@
           </a:ln>
           <a:effectLst/>
           <a:extLst>
-            <a:ext uri="{909E8E84-426E-40DD-AFC4-6F175D3DCCD1}">
+            <a:ext uri="{909E8E84-426E-40dd-AFC4-6F175D3DCCD1}">
               <a14:hiddenFill xmlns:a14="http://schemas.microsoft.com/office/drawing/2010/main">
                 <a:solidFill>
                   <a:schemeClr val="accent1"/>
                 </a:solidFill>
               </a14:hiddenFill>
             </a:ext>
-            <a:ext uri="{91240B29-F687-4F45-9708-019B960494DF}">
+            <a:ext uri="{91240B29-F687-4f45-9708-019B960494DF}">
               <a14:hiddenLine xmlns:a14="http://schemas.microsoft.com/office/drawing/2010/main" w="9525">
                 <a:solidFill>
                   <a:schemeClr val="tx1"/>
@@ -7921,7 +7899,7 @@
                 <a:tailEnd/>
               </a14:hiddenLine>
             </a:ext>
-            <a:ext uri="{AF507438-7753-43E0-B8FC-AC1667EBCBE1}">
+            <a:ext uri="{AF507438-7753-43e0-B8FC-AC1667EBCBE1}">
               <a14:hiddenEffects xmlns:a14="http://schemas.microsoft.com/office/drawing/2010/main">
                 <a:effectLst>
                   <a:outerShdw dist="35921" dir="2700000" algn="ctr" rotWithShape="0">
@@ -8058,13 +8036,13 @@
   <p:clrMapOvr>
     <a:masterClrMapping/>
   </p:clrMapOvr>
-  <p:transition spd="slow">
+  <p:transition xmlns:p14="http://schemas.microsoft.com/office/powerpoint/2010/main" spd="slow">
     <p:strips dir="rd"/>
   </p:transition>
   <p:timing>
     <p:tnLst>
       <p:par>
-        <p:cTn id="1" dur="indefinite" restart="never" nodeType="tmRoot"/>
+        <p:cTn xmlns:p14="http://schemas.microsoft.com/office/powerpoint/2010/main" id="1" dur="indefinite" restart="never" nodeType="tmRoot"/>
       </p:par>
     </p:tnLst>
   </p:timing>
@@ -8242,7 +8220,7 @@
   <p:timing>
     <p:tnLst>
       <p:par>
-        <p:cTn id="1" dur="indefinite" restart="never" nodeType="tmRoot"/>
+        <p:cTn xmlns:p14="http://schemas.microsoft.com/office/powerpoint/2010/main" id="1" dur="indefinite" restart="never" nodeType="tmRoot"/>
       </p:par>
     </p:tnLst>
   </p:timing>
@@ -8421,7 +8399,7 @@
   <p:timing>
     <p:tnLst>
       <p:par>
-        <p:cTn id="1" dur="indefinite" restart="never" nodeType="tmRoot"/>
+        <p:cTn xmlns:p14="http://schemas.microsoft.com/office/powerpoint/2010/main" id="1" dur="indefinite" restart="never" nodeType="tmRoot"/>
       </p:par>
     </p:tnLst>
   </p:timing>
@@ -8724,26 +8702,14 @@
             </a:r>
             <a:r>
               <a:rPr lang="en-GB" dirty="0" smtClean="0"/>
-              <a:t>OpenCL? A session </a:t>
-            </a:r>
-            <a:r>
-              <a:rPr lang="en-GB" dirty="0" smtClean="0"/>
-              <a:t>with the Khronos OpenCL </a:t>
-            </a:r>
-            <a:r>
-              <a:rPr lang="en-GB" dirty="0" smtClean="0"/>
-              <a:t>WG</a:t>
+              <a:t>OpenCL? A session with the Khronos OpenCL WG</a:t>
             </a:r>
             <a:br>
               <a:rPr lang="en-GB" dirty="0" smtClean="0"/>
             </a:br>
             <a:r>
               <a:rPr lang="en-GB" dirty="0" smtClean="0"/>
-              <a:t>(Wednesday 5pm</a:t>
-            </a:r>
-            <a:r>
-              <a:rPr lang="en-GB" dirty="0" smtClean="0"/>
-              <a:t>)</a:t>
+              <a:t>(Wednesday 5pm)</a:t>
             </a:r>
           </a:p>
         </p:txBody>
@@ -8761,7 +8727,7 @@
   <p:timing>
     <p:tnLst>
       <p:par>
-        <p:cTn id="1" dur="indefinite" restart="never" nodeType="tmRoot"/>
+        <p:cTn xmlns:p14="http://schemas.microsoft.com/office/powerpoint/2010/main" id="1" dur="indefinite" restart="never" nodeType="tmRoot"/>
       </p:par>
     </p:tnLst>
   </p:timing>
@@ -8949,7 +8915,7 @@
   <p:timing>
     <p:tnLst>
       <p:par>
-        <p:cTn id="1" dur="indefinite" restart="never" nodeType="tmRoot"/>
+        <p:cTn xmlns:p14="http://schemas.microsoft.com/office/powerpoint/2010/main" id="1" dur="indefinite" restart="never" nodeType="tmRoot"/>
       </p:par>
     </p:tnLst>
   </p:timing>
@@ -9060,7 +9026,7 @@
   <p:timing>
     <p:tnLst>
       <p:par>
-        <p:cTn id="1" dur="indefinite" restart="never" nodeType="tmRoot"/>
+        <p:cTn xmlns:p14="http://schemas.microsoft.com/office/powerpoint/2010/main" id="1" dur="indefinite" restart="never" nodeType="tmRoot"/>
       </p:par>
     </p:tnLst>
   </p:timing>
@@ -9125,7 +9091,7 @@
         </p:spPr>
         <p:txBody>
           <a:bodyPr>
-            <a:normAutofit fontScale="85000" lnSpcReduction="10000"/>
+            <a:normAutofit fontScale="85000" lnSpcReduction="20000"/>
           </a:bodyPr>
           <a:lstStyle/>
           <a:p>
@@ -9204,13 +9170,64 @@
               </a:lnSpc>
             </a:pPr>
             <a:r>
+              <a:rPr lang="en-GB" dirty="0" smtClean="0"/>
+              <a:t>Implementations:</a:t>
+            </a:r>
+          </a:p>
+          <a:p>
+            <a:pPr lvl="1">
+              <a:lnSpc>
+                <a:spcPct val="110000"/>
+              </a:lnSpc>
+            </a:pPr>
+            <a:r>
               <a:rPr lang="en-GB" dirty="0" err="1" smtClean="0"/>
               <a:t>Codeplay</a:t>
             </a:r>
             <a:r>
               <a:rPr lang="en-GB" dirty="0" smtClean="0"/>
-              <a:t> and AMD working on implementations</a:t>
-            </a:r>
+              <a:t> </a:t>
+            </a:r>
+            <a:r>
+              <a:rPr lang="en-GB" dirty="0" err="1" smtClean="0"/>
+              <a:t>ComputeCpp</a:t>
+            </a:r>
+            <a:r>
+              <a:rPr lang="en-GB" dirty="0" smtClean="0"/>
+              <a:t> Communit</a:t>
+            </a:r>
+            <a:r>
+              <a:rPr lang="en-GB" dirty="0" smtClean="0"/>
+              <a:t>y Edition (free)</a:t>
+            </a:r>
+          </a:p>
+          <a:p>
+            <a:pPr lvl="1">
+              <a:lnSpc>
+                <a:spcPct val="110000"/>
+              </a:lnSpc>
+            </a:pPr>
+            <a:r>
+              <a:rPr lang="en-GB" dirty="0" err="1" smtClean="0"/>
+              <a:t>t</a:t>
+            </a:r>
+            <a:r>
+              <a:rPr lang="en-GB" dirty="0" err="1" smtClean="0"/>
+              <a:t>riSYCL</a:t>
+            </a:r>
+            <a:r>
+              <a:rPr lang="en-GB" dirty="0" smtClean="0"/>
+              <a:t> (open source on </a:t>
+            </a:r>
+            <a:r>
+              <a:rPr lang="en-GB" dirty="0" err="1" smtClean="0"/>
+              <a:t>GitHub</a:t>
+            </a:r>
+            <a:r>
+              <a:rPr lang="en-GB" dirty="0" smtClean="0"/>
+              <a:t>)</a:t>
+            </a:r>
+            <a:endParaRPr lang="en-GB" dirty="0" smtClean="0"/>
           </a:p>
         </p:txBody>
       </p:sp>
@@ -9241,6 +9258,53 @@
           </a:solidFill>
         </p:spPr>
       </p:pic>
+      <p:sp>
+        <p:nvSpPr>
+          <p:cNvPr id="4" name="Rectangle 3"/>
+          <p:cNvSpPr/>
+          <p:nvPr/>
+        </p:nvSpPr>
+        <p:spPr>
+          <a:xfrm>
+            <a:off x="3131840" y="6381328"/>
+            <a:ext cx="3009771" cy="369332"/>
+          </a:xfrm>
+          <a:prstGeom prst="rect">
+            <a:avLst/>
+          </a:prstGeom>
+        </p:spPr>
+        <p:txBody>
+          <a:bodyPr wrap="none">
+            <a:spAutoFit/>
+          </a:bodyPr>
+          <a:lstStyle/>
+          <a:p>
+            <a:r>
+              <a:rPr lang="en-GB" dirty="0" smtClean="0"/>
+              <a:t>More info: </a:t>
+            </a:r>
+            <a:r>
+              <a:rPr lang="en-GB" dirty="0" smtClean="0">
+                <a:hlinkClick r:id="rId4"/>
+              </a:rPr>
+              <a:t>http</a:t>
+            </a:r>
+            <a:r>
+              <a:rPr lang="en-GB" dirty="0">
+                <a:hlinkClick r:id="rId4"/>
+              </a:rPr>
+              <a:t>://</a:t>
+            </a:r>
+            <a:r>
+              <a:rPr lang="en-GB" dirty="0" err="1">
+                <a:hlinkClick r:id="rId4"/>
+              </a:rPr>
+              <a:t>sycl.tech</a:t>
+            </a:r>
+            <a:endParaRPr lang="en-GB" dirty="0"/>
+          </a:p>
+        </p:txBody>
+      </p:sp>
     </p:spTree>
     <p:extLst>
       <p:ext uri="{BB962C8B-B14F-4D97-AF65-F5344CB8AC3E}">
@@ -9254,7 +9318,7 @@
   <p:timing>
     <p:tnLst>
       <p:par>
-        <p:cTn id="1" dur="indefinite" restart="never" nodeType="tmRoot"/>
+        <p:cTn xmlns:p14="http://schemas.microsoft.com/office/powerpoint/2010/main" id="1" dur="indefinite" restart="never" nodeType="tmRoot"/>
       </p:par>
     </p:tnLst>
   </p:timing>
@@ -9404,18 +9468,18 @@
   <p:clrMapOvr>
     <a:masterClrMapping/>
   </p:clrMapOvr>
-  <mc:AlternateContent xmlns:mc="http://schemas.openxmlformats.org/markup-compatibility/2006">
-    <mc:Choice xmlns:p14="http://schemas.microsoft.com/office/powerpoint/2010/main" Requires="p14">
+  <mc:AlternateContent xmlns:mc="http://schemas.openxmlformats.org/markup-compatibility/2006" xmlns:p14="http://schemas.microsoft.com/office/powerpoint/2010/main">
+    <mc:Choice Requires="p14">
       <p:transition spd="slow" p14:dur="2000"/>
     </mc:Choice>
-    <mc:Fallback>
+    <mc:Fallback xmlns="">
       <p:transition spd="slow"/>
     </mc:Fallback>
   </mc:AlternateContent>
   <p:timing>
     <p:tnLst>
       <p:par>
-        <p:cTn id="1" dur="indefinite" restart="never" nodeType="tmRoot"/>
+        <p:cTn xmlns:p14="http://schemas.microsoft.com/office/powerpoint/2010/main" id="1" dur="indefinite" restart="never" nodeType="tmRoot"/>
       </p:par>
     </p:tnLst>
   </p:timing>
@@ -9475,7 +9539,7 @@
         <p:spPr/>
         <p:txBody>
           <a:bodyPr>
-            <a:normAutofit fontScale="92500" lnSpcReduction="10000"/>
+            <a:normAutofit/>
           </a:bodyPr>
           <a:lstStyle/>
           <a:p>
@@ -9488,24 +9552,32 @@
               <a:t>/</a:t>
             </a:r>
             <a:r>
-              <a:rPr lang="en-GB" dirty="0" err="1"/>
+              <a:rPr lang="en-GB" dirty="0" err="1" smtClean="0"/>
               <a:t>clBLAS</a:t>
             </a:r>
             <a:r>
+              <a:rPr lang="en-GB" dirty="0" smtClean="0"/>
+              <a:t>/</a:t>
+            </a:r>
+            <a:r>
+              <a:rPr lang="en-GB" dirty="0" err="1" smtClean="0"/>
+              <a:t>clRNG</a:t>
+            </a:r>
+            <a:r>
+              <a:rPr lang="en-GB" dirty="0" smtClean="0"/>
+              <a:t> </a:t>
+            </a:r>
+            <a:r>
               <a:rPr lang="en-GB" dirty="0"/>
-              <a:t> / </a:t>
-            </a:r>
-            <a:r>
-              <a:rPr lang="en-GB" dirty="0" err="1"/>
-              <a:t>clRNG</a:t>
-            </a:r>
-            <a:r>
-              <a:rPr lang="en-GB" dirty="0"/>
-              <a:t> (all on </a:t>
-            </a:r>
-            <a:r>
-              <a:rPr lang="en-GB" dirty="0" err="1"/>
-              <a:t>github</a:t>
+              <a:t>(all on </a:t>
+            </a:r>
+            <a:r>
+              <a:rPr lang="en-GB" dirty="0" err="1" smtClean="0"/>
+              <a:t>G</a:t>
+            </a:r>
+            <a:r>
+              <a:rPr lang="en-GB" dirty="0" err="1" smtClean="0"/>
+              <a:t>itHub</a:t>
             </a:r>
             <a:r>
               <a:rPr lang="en-GB" dirty="0"/>
@@ -9519,8 +9591,21 @@
             </a:r>
             <a:r>
               <a:rPr lang="en-GB" dirty="0" smtClean="0"/>
-              <a:t> (open source soon)</a:t>
-            </a:r>
+              <a:t> (</a:t>
+            </a:r>
+            <a:r>
+              <a:rPr lang="en-GB" dirty="0" smtClean="0"/>
+              <a:t>on </a:t>
+            </a:r>
+            <a:r>
+              <a:rPr lang="en-GB" dirty="0" err="1" smtClean="0"/>
+              <a:t>GitHub</a:t>
+            </a:r>
+            <a:r>
+              <a:rPr lang="en-GB" dirty="0" smtClean="0"/>
+              <a:t>)</a:t>
+            </a:r>
+            <a:endParaRPr lang="en-GB" dirty="0" smtClean="0"/>
           </a:p>
           <a:p>
             <a:r>
@@ -9580,20 +9665,6 @@
             <a:r>
               <a:rPr lang="en-GB" dirty="0" smtClean="0"/>
               <a:t> </a:t>
-            </a:r>
-          </a:p>
-          <a:p>
-            <a:r>
-              <a:rPr lang="en-GB" dirty="0" smtClean="0"/>
-              <a:t>Also see Karl Rupp's talk at 9am on Thursday: </a:t>
-            </a:r>
-            <a:r>
-              <a:rPr lang="en-GB" dirty="0"/>
-              <a:t>The OpenCL Library Ecosystem: Current Status and Future </a:t>
-            </a:r>
-            <a:r>
-              <a:rPr lang="en-GB" dirty="0" smtClean="0"/>
-              <a:t>Perspectives</a:t>
             </a:r>
           </a:p>
         </p:txBody>
@@ -9611,7 +9682,7 @@
   <p:timing>
     <p:tnLst>
       <p:par>
-        <p:cTn id="1" dur="indefinite" restart="never" nodeType="tmRoot"/>
+        <p:cTn xmlns:p14="http://schemas.microsoft.com/office/powerpoint/2010/main" id="1" dur="indefinite" restart="never" nodeType="tmRoot"/>
       </p:par>
     </p:tnLst>
   </p:timing>

</xml_diff>

<commit_message>
Add note about open source spec and tests for 2.2
</commit_message>
<xml_diff>
--- a/slides/advanced_outro.pptx
+++ b/slides/advanced_outro.pptx
@@ -168,7 +168,7 @@
       </p14:sectionLst>
     </p:ext>
     <p:ext uri="{EFAFB233-063F-42B5-8137-9DF3F51BA10A}">
-      <p15:sldGuideLst xmlns:p15="http://schemas.microsoft.com/office/powerpoint/2012/main">
+      <p15:sldGuideLst xmlns:p15="http://schemas.microsoft.com/office/powerpoint/2012/main" xmlns="">
         <p15:guide id="1" orient="horz" pos="2160">
           <p15:clr>
             <a:srgbClr val="A4A3A4"/>
@@ -274,7 +274,7 @@
             <a:fld id="{92597E5C-85BB-4669-9209-B5E04E6ED101}" type="datetimeFigureOut">
               <a:rPr lang="en-GB" smtClean="0"/>
               <a:pPr/>
-              <a:t>15/05/2017</a:t>
+              <a:t>16/05/17</a:t>
             </a:fld>
             <a:endParaRPr lang="en-GB"/>
           </a:p>
@@ -904,7 +904,7 @@
             <a:fld id="{19E03964-7D59-4BF8-AE10-3A215A42C3E4}" type="datetime1">
               <a:rPr lang="en-GB" smtClean="0"/>
               <a:pPr/>
-              <a:t>15/05/2017</a:t>
+              <a:t>16/05/17</a:t>
             </a:fld>
             <a:endParaRPr lang="en-GB"/>
           </a:p>
@@ -1071,7 +1071,7 @@
             <a:fld id="{8E5ADEB7-8139-4AC1-94DC-FE9E54B1CCD2}" type="datetime1">
               <a:rPr lang="en-GB" smtClean="0"/>
               <a:pPr/>
-              <a:t>15/05/2017</a:t>
+              <a:t>16/05/17</a:t>
             </a:fld>
             <a:endParaRPr lang="en-GB"/>
           </a:p>
@@ -1248,7 +1248,7 @@
             <a:fld id="{9C77A686-1785-49A1-B4C9-55A3C7EEADE4}" type="datetime1">
               <a:rPr lang="en-GB" smtClean="0"/>
               <a:pPr/>
-              <a:t>15/05/2017</a:t>
+              <a:t>16/05/17</a:t>
             </a:fld>
             <a:endParaRPr lang="en-GB"/>
           </a:p>
@@ -1599,13 +1599,13 @@
   <p:clrMapOvr>
     <a:masterClrMapping/>
   </p:clrMapOvr>
-  <p:transition>
+  <p:transition xmlns:p14="http://schemas.microsoft.com/office/powerpoint/2010/main">
     <p:fade/>
   </p:transition>
   <p:timing>
     <p:tnLst>
       <p:par>
-        <p:cTn id="1" dur="indefinite" restart="never" nodeType="tmRoot"/>
+        <p:cTn xmlns:p14="http://schemas.microsoft.com/office/powerpoint/2010/main" id="1" dur="indefinite" restart="never" nodeType="tmRoot"/>
       </p:par>
     </p:tnLst>
   </p:timing>
@@ -1722,7 +1722,7 @@
             <a:fld id="{D65327FA-D1E5-40CA-8941-3DD0B6730F8A}" type="datetime1">
               <a:rPr lang="en-GB" smtClean="0"/>
               <a:pPr/>
-              <a:t>15/05/2017</a:t>
+              <a:t>16/05/17</a:t>
             </a:fld>
             <a:endParaRPr lang="en-GB"/>
           </a:p>
@@ -1965,7 +1965,7 @@
             <a:fld id="{DB33F153-90AC-449F-A303-26940247ABC8}" type="datetime1">
               <a:rPr lang="en-GB" smtClean="0"/>
               <a:pPr/>
-              <a:t>15/05/2017</a:t>
+              <a:t>16/05/17</a:t>
             </a:fld>
             <a:endParaRPr lang="en-GB"/>
           </a:p>
@@ -2250,7 +2250,7 @@
             <a:fld id="{84E24492-3EA5-478D-9F72-7B8FF369DDEB}" type="datetime1">
               <a:rPr lang="en-GB" smtClean="0"/>
               <a:pPr/>
-              <a:t>15/05/2017</a:t>
+              <a:t>16/05/17</a:t>
             </a:fld>
             <a:endParaRPr lang="en-GB"/>
           </a:p>
@@ -2669,7 +2669,7 @@
             <a:fld id="{43976A03-596E-4490-AE35-AFB744E08901}" type="datetime1">
               <a:rPr lang="en-GB" smtClean="0"/>
               <a:pPr/>
-              <a:t>15/05/2017</a:t>
+              <a:t>16/05/17</a:t>
             </a:fld>
             <a:endParaRPr lang="en-GB"/>
           </a:p>
@@ -2784,7 +2784,7 @@
             <a:fld id="{4C8E3CB4-829C-4F19-9E86-B2AAEC36BD90}" type="datetime1">
               <a:rPr lang="en-GB" smtClean="0"/>
               <a:pPr/>
-              <a:t>15/05/2017</a:t>
+              <a:t>16/05/17</a:t>
             </a:fld>
             <a:endParaRPr lang="en-GB"/>
           </a:p>
@@ -2876,7 +2876,7 @@
             <a:fld id="{D4A6FE01-96D8-461F-B1B2-1F0C16D98900}" type="datetime1">
               <a:rPr lang="en-GB" smtClean="0"/>
               <a:pPr/>
-              <a:t>15/05/2017</a:t>
+              <a:t>16/05/17</a:t>
             </a:fld>
             <a:endParaRPr lang="en-GB"/>
           </a:p>
@@ -3150,7 +3150,7 @@
             <a:fld id="{B24CB088-CFF7-44C4-9CCE-18845754E6D4}" type="datetime1">
               <a:rPr lang="en-GB" smtClean="0"/>
               <a:pPr/>
-              <a:t>15/05/2017</a:t>
+              <a:t>16/05/17</a:t>
             </a:fld>
             <a:endParaRPr lang="en-GB"/>
           </a:p>
@@ -3404,7 +3404,7 @@
             <a:fld id="{CD3A280C-4DEC-4EEC-BD59-A30886E06BA1}" type="datetime1">
               <a:rPr lang="en-GB" smtClean="0"/>
               <a:pPr/>
-              <a:t>15/05/2017</a:t>
+              <a:t>16/05/17</a:t>
             </a:fld>
             <a:endParaRPr lang="en-GB"/>
           </a:p>
@@ -3614,7 +3614,7 @@
             <a:fld id="{E222BC38-3FAE-415B-AD1C-2D338E3D6B03}" type="datetime1">
               <a:rPr lang="en-GB" smtClean="0"/>
               <a:pPr/>
-              <a:t>15/05/2017</a:t>
+              <a:t>16/05/17</a:t>
             </a:fld>
             <a:endParaRPr lang="en-GB"/>
           </a:p>
@@ -4062,7 +4062,7 @@
   <p:timing>
     <p:tnLst>
       <p:par>
-        <p:cTn id="1" dur="indefinite" restart="never" nodeType="tmRoot"/>
+        <p:cTn xmlns:p14="http://schemas.microsoft.com/office/powerpoint/2010/main" id="1" dur="indefinite" restart="never" nodeType="tmRoot"/>
       </p:par>
     </p:tnLst>
   </p:timing>
@@ -4787,7 +4787,7 @@
   <p:timing>
     <p:tnLst>
       <p:par>
-        <p:cTn id="1" dur="indefinite" restart="never" nodeType="tmRoot"/>
+        <p:cTn xmlns:p14="http://schemas.microsoft.com/office/powerpoint/2010/main" id="1" dur="indefinite" restart="never" nodeType="tmRoot"/>
       </p:par>
     </p:tnLst>
   </p:timing>
@@ -4954,7 +4954,7 @@
   <p:timing>
     <p:tnLst>
       <p:par>
-        <p:cTn id="1" dur="indefinite" restart="never" nodeType="tmRoot"/>
+        <p:cTn xmlns:p14="http://schemas.microsoft.com/office/powerpoint/2010/main" id="1" dur="indefinite" restart="never" nodeType="tmRoot"/>
       </p:par>
     </p:tnLst>
   </p:timing>
@@ -5053,11 +5053,7 @@
             </a:r>
             <a:r>
               <a:rPr lang="en-GB" dirty="0" smtClean="0"/>
-              <a:t> </a:t>
-            </a:r>
-            <a:r>
-              <a:rPr lang="en-GB" dirty="0" smtClean="0"/>
-              <a:t>benchmark:</a:t>
+              <a:t> benchmark:</a:t>
             </a:r>
           </a:p>
           <a:p>
@@ -5120,7 +5116,7 @@
   <p:timing>
     <p:tnLst>
       <p:par>
-        <p:cTn id="1" dur="indefinite" restart="never" nodeType="tmRoot"/>
+        <p:cTn xmlns:p14="http://schemas.microsoft.com/office/powerpoint/2010/main" id="1" dur="indefinite" restart="never" nodeType="tmRoot"/>
       </p:par>
     </p:tnLst>
   </p:timing>
@@ -5254,7 +5250,7 @@
   <p:timing>
     <p:tnLst>
       <p:par>
-        <p:cTn id="1" dur="indefinite" restart="never" nodeType="tmRoot"/>
+        <p:cTn xmlns:p14="http://schemas.microsoft.com/office/powerpoint/2010/main" id="1" dur="indefinite" restart="never" nodeType="tmRoot"/>
       </p:par>
     </p:tnLst>
   </p:timing>
@@ -5314,7 +5310,7 @@
   <p:timing>
     <p:tnLst>
       <p:par>
-        <p:cTn id="1" dur="indefinite" restart="never" nodeType="tmRoot"/>
+        <p:cTn xmlns:p14="http://schemas.microsoft.com/office/powerpoint/2010/main" id="1" dur="indefinite" restart="never" nodeType="tmRoot"/>
       </p:par>
     </p:tnLst>
   </p:timing>
@@ -5562,7 +5558,7 @@
   <p:timing>
     <p:tnLst>
       <p:par>
-        <p:cTn id="1" dur="indefinite" restart="never" nodeType="tmRoot"/>
+        <p:cTn xmlns:p14="http://schemas.microsoft.com/office/powerpoint/2010/main" id="1" dur="indefinite" restart="never" nodeType="tmRoot"/>
       </p:par>
     </p:tnLst>
   </p:timing>
@@ -5645,7 +5641,7 @@
   <p:timing>
     <p:tnLst>
       <p:par>
-        <p:cTn id="1" dur="indefinite" restart="never" nodeType="tmRoot"/>
+        <p:cTn xmlns:p14="http://schemas.microsoft.com/office/powerpoint/2010/main" id="1" dur="indefinite" restart="never" nodeType="tmRoot"/>
       </p:par>
     </p:tnLst>
   </p:timing>
@@ -5728,7 +5724,7 @@
   <p:timing>
     <p:tnLst>
       <p:par>
-        <p:cTn id="1" dur="indefinite" restart="never" nodeType="tmRoot"/>
+        <p:cTn xmlns:p14="http://schemas.microsoft.com/office/powerpoint/2010/main" id="1" dur="indefinite" restart="never" nodeType="tmRoot"/>
       </p:par>
     </p:tnLst>
   </p:timing>
@@ -5848,7 +5844,7 @@
   <p:timing>
     <p:tnLst>
       <p:par>
-        <p:cTn id="1" dur="indefinite" restart="never" nodeType="tmRoot"/>
+        <p:cTn xmlns:p14="http://schemas.microsoft.com/office/powerpoint/2010/main" id="1" dur="indefinite" restart="never" nodeType="tmRoot"/>
       </p:par>
     </p:tnLst>
   </p:timing>
@@ -5974,7 +5970,7 @@
   <p:timing>
     <p:tnLst>
       <p:par>
-        <p:cTn id="1" dur="indefinite" restart="never" nodeType="tmRoot"/>
+        <p:cTn xmlns:p14="http://schemas.microsoft.com/office/powerpoint/2010/main" id="1" dur="indefinite" restart="never" nodeType="tmRoot"/>
       </p:par>
     </p:tnLst>
   </p:timing>
@@ -7895,14 +7891,14 @@
           <a:effectLst/>
           <a:extLst>
             <a:ext uri="{909E8E84-426E-40dd-AFC4-6F175D3DCCD1}">
-              <a14:hiddenFill xmlns:a14="http://schemas.microsoft.com/office/drawing/2010/main" xmlns="">
+              <a14:hiddenFill xmlns:a14="http://schemas.microsoft.com/office/drawing/2010/main">
                 <a:solidFill>
                   <a:schemeClr val="accent1"/>
                 </a:solidFill>
               </a14:hiddenFill>
             </a:ext>
             <a:ext uri="{91240B29-F687-4f45-9708-019B960494DF}">
-              <a14:hiddenLine xmlns:a14="http://schemas.microsoft.com/office/drawing/2010/main" xmlns="" w="9525">
+              <a14:hiddenLine xmlns:a14="http://schemas.microsoft.com/office/drawing/2010/main" w="9525">
                 <a:solidFill>
                   <a:schemeClr val="tx1"/>
                 </a:solidFill>
@@ -7912,7 +7908,7 @@
               </a14:hiddenLine>
             </a:ext>
             <a:ext uri="{AF507438-7753-43e0-B8FC-AC1667EBCBE1}">
-              <a14:hiddenEffects xmlns:a14="http://schemas.microsoft.com/office/drawing/2010/main" xmlns="">
+              <a14:hiddenEffects xmlns:a14="http://schemas.microsoft.com/office/drawing/2010/main">
                 <a:effectLst>
                   <a:outerShdw dist="35921" dir="2700000" algn="ctr" rotWithShape="0">
                     <a:schemeClr val="bg2"/>
@@ -8048,13 +8044,13 @@
   <p:clrMapOvr>
     <a:masterClrMapping/>
   </p:clrMapOvr>
-  <p:transition spd="slow">
+  <p:transition xmlns:p14="http://schemas.microsoft.com/office/powerpoint/2010/main" spd="slow">
     <p:strips dir="rd"/>
   </p:transition>
   <p:timing>
     <p:tnLst>
       <p:par>
-        <p:cTn id="1" dur="indefinite" restart="never" nodeType="tmRoot"/>
+        <p:cTn xmlns:p14="http://schemas.microsoft.com/office/powerpoint/2010/main" id="1" dur="indefinite" restart="never" nodeType="tmRoot"/>
       </p:par>
     </p:tnLst>
   </p:timing>
@@ -8232,7 +8228,7 @@
   <p:timing>
     <p:tnLst>
       <p:par>
-        <p:cTn id="1" dur="indefinite" restart="never" nodeType="tmRoot"/>
+        <p:cTn xmlns:p14="http://schemas.microsoft.com/office/powerpoint/2010/main" id="1" dur="indefinite" restart="never" nodeType="tmRoot"/>
       </p:par>
     </p:tnLst>
   </p:timing>
@@ -8411,7 +8407,7 @@
   <p:timing>
     <p:tnLst>
       <p:par>
-        <p:cTn id="1" dur="indefinite" restart="never" nodeType="tmRoot"/>
+        <p:cTn xmlns:p14="http://schemas.microsoft.com/office/powerpoint/2010/main" id="1" dur="indefinite" restart="never" nodeType="tmRoot"/>
       </p:par>
     </p:tnLst>
   </p:timing>
@@ -8547,7 +8543,9 @@
         </p:nvSpPr>
         <p:spPr/>
         <p:txBody>
-          <a:bodyPr/>
+          <a:bodyPr>
+            <a:normAutofit lnSpcReduction="10000"/>
+          </a:bodyPr>
           <a:lstStyle/>
           <a:p>
             <a:r>
@@ -8581,11 +8579,30 @@
           <a:p>
             <a:pPr lvl="1"/>
             <a:r>
+              <a:rPr lang="en-US" dirty="0" smtClean="0"/>
+              <a:t>SYCL </a:t>
+            </a:r>
+            <a:r>
               <a:rPr lang="en-US" dirty="0"/>
-              <a:t>SYCL 2.2 for single source C++ </a:t>
-            </a:r>
-          </a:p>
-          <a:p>
+              <a:t>2.2 for single source C+</a:t>
+            </a:r>
+            <a:r>
+              <a:rPr lang="en-US" dirty="0" smtClean="0"/>
+              <a:t>+</a:t>
+            </a:r>
+          </a:p>
+          <a:p>
+            <a:endParaRPr lang="en-US" dirty="0"/>
+          </a:p>
+          <a:p>
+            <a:r>
+              <a:rPr lang="en-US" dirty="0" smtClean="0"/>
+              <a:t>Specification and conformance tests now available on </a:t>
+            </a:r>
+            <a:r>
+              <a:rPr lang="en-US" dirty="0" err="1" smtClean="0"/>
+              <a:t>GitHub</a:t>
+            </a:r>
             <a:endParaRPr lang="en-US" dirty="0" smtClean="0"/>
           </a:p>
           <a:p>
@@ -8739,7 +8756,7 @@
   <p:timing>
     <p:tnLst>
       <p:par>
-        <p:cTn id="1" dur="indefinite" restart="never" nodeType="tmRoot"/>
+        <p:cTn xmlns:p14="http://schemas.microsoft.com/office/powerpoint/2010/main" id="1" dur="indefinite" restart="never" nodeType="tmRoot"/>
       </p:par>
     </p:tnLst>
   </p:timing>
@@ -8924,18 +8941,18 @@
   <p:clrMapOvr>
     <a:masterClrMapping/>
   </p:clrMapOvr>
-  <mc:AlternateContent xmlns:mc="http://schemas.openxmlformats.org/markup-compatibility/2006">
-    <mc:Choice xmlns:p14="http://schemas.microsoft.com/office/powerpoint/2010/main" Requires="p14">
+  <mc:AlternateContent xmlns:mc="http://schemas.openxmlformats.org/markup-compatibility/2006" xmlns:p14="http://schemas.microsoft.com/office/powerpoint/2010/main">
+    <mc:Choice Requires="p14">
       <p:transition spd="slow" p14:dur="2000"/>
     </mc:Choice>
-    <mc:Fallback>
+    <mc:Fallback xmlns="">
       <p:transition spd="slow"/>
     </mc:Fallback>
   </mc:AlternateContent>
   <p:timing>
     <p:tnLst>
       <p:par>
-        <p:cTn id="1" dur="indefinite" restart="never" nodeType="tmRoot"/>
+        <p:cTn xmlns:p14="http://schemas.microsoft.com/office/powerpoint/2010/main" id="1" dur="indefinite" restart="never" nodeType="tmRoot"/>
       </p:par>
     </p:tnLst>
   </p:timing>
@@ -9043,18 +9060,18 @@
   <p:clrMapOvr>
     <a:masterClrMapping/>
   </p:clrMapOvr>
-  <mc:AlternateContent xmlns:mc="http://schemas.openxmlformats.org/markup-compatibility/2006">
-    <mc:Choice xmlns:p14="http://schemas.microsoft.com/office/powerpoint/2010/main" Requires="p14">
+  <mc:AlternateContent xmlns:mc="http://schemas.openxmlformats.org/markup-compatibility/2006" xmlns:p14="http://schemas.microsoft.com/office/powerpoint/2010/main">
+    <mc:Choice Requires="p14">
       <p:transition spd="slow" p14:dur="2000"/>
     </mc:Choice>
-    <mc:Fallback>
+    <mc:Fallback xmlns="">
       <p:transition spd="slow"/>
     </mc:Fallback>
   </mc:AlternateContent>
   <p:timing>
     <p:tnLst>
       <p:par>
-        <p:cTn id="1" dur="indefinite" restart="never" nodeType="tmRoot"/>
+        <p:cTn xmlns:p14="http://schemas.microsoft.com/office/powerpoint/2010/main" id="1" dur="indefinite" restart="never" nodeType="tmRoot"/>
       </p:par>
     </p:tnLst>
   </p:timing>
@@ -9337,7 +9354,7 @@
   <p:timing>
     <p:tnLst>
       <p:par>
-        <p:cTn id="1" dur="indefinite" restart="never" nodeType="tmRoot"/>
+        <p:cTn xmlns:p14="http://schemas.microsoft.com/office/powerpoint/2010/main" id="1" dur="indefinite" restart="never" nodeType="tmRoot"/>
       </p:par>
     </p:tnLst>
   </p:timing>
@@ -9411,11 +9428,7 @@
             </a:r>
             <a:r>
               <a:rPr lang="en-GB" dirty="0"/>
-              <a:t>Wednesday </a:t>
-            </a:r>
-            <a:r>
-              <a:rPr lang="en-GB" dirty="0"/>
-              <a:t>at </a:t>
+              <a:t>Wednesday at </a:t>
             </a:r>
             <a:r>
               <a:rPr lang="en-GB" dirty="0" smtClean="0"/>
@@ -9442,11 +9455,7 @@
             </a:r>
             <a:r>
               <a:rPr lang="en-GB" dirty="0" smtClean="0"/>
-              <a:t>5.30pm</a:t>
-            </a:r>
-            <a:r>
-              <a:rPr lang="en-GB" dirty="0" smtClean="0"/>
-              <a:t>)</a:t>
+              <a:t>5.30pm)</a:t>
             </a:r>
           </a:p>
           <a:p>
@@ -9464,11 +9473,7 @@
             </a:r>
             <a:r>
               <a:rPr lang="en-GB" dirty="0" smtClean="0"/>
-              <a:t>(Thursday 4.30pm</a:t>
-            </a:r>
-            <a:r>
-              <a:rPr lang="en-GB" dirty="0" smtClean="0"/>
-              <a:t>)</a:t>
+              <a:t>(Thursday 4.30pm)</a:t>
             </a:r>
             <a:endParaRPr lang="en-GB" dirty="0"/>
           </a:p>
@@ -9511,18 +9516,18 @@
   <p:clrMapOvr>
     <a:masterClrMapping/>
   </p:clrMapOvr>
-  <mc:AlternateContent xmlns:mc="http://schemas.openxmlformats.org/markup-compatibility/2006">
-    <mc:Choice xmlns:p14="http://schemas.microsoft.com/office/powerpoint/2010/main" Requires="p14">
+  <mc:AlternateContent xmlns:mc="http://schemas.openxmlformats.org/markup-compatibility/2006" xmlns:p14="http://schemas.microsoft.com/office/powerpoint/2010/main">
+    <mc:Choice Requires="p14">
       <p:transition spd="slow" p14:dur="2000"/>
     </mc:Choice>
-    <mc:Fallback>
+    <mc:Fallback xmlns="">
       <p:transition spd="slow"/>
     </mc:Fallback>
   </mc:AlternateContent>
   <p:timing>
     <p:tnLst>
       <p:par>
-        <p:cTn id="1" dur="indefinite" restart="never" nodeType="tmRoot"/>
+        <p:cTn xmlns:p14="http://schemas.microsoft.com/office/powerpoint/2010/main" id="1" dur="indefinite" restart="never" nodeType="tmRoot"/>
       </p:par>
     </p:tnLst>
   </p:timing>
@@ -9716,7 +9721,7 @@
   <p:timing>
     <p:tnLst>
       <p:par>
-        <p:cTn id="1" dur="indefinite" restart="never" nodeType="tmRoot"/>
+        <p:cTn xmlns:p14="http://schemas.microsoft.com/office/powerpoint/2010/main" id="1" dur="indefinite" restart="never" nodeType="tmRoot"/>
       </p:par>
     </p:tnLst>
   </p:timing>

</xml_diff>

<commit_message>
Hid a few dated slides
Might want to update the slides on which subjects are being talked about at IWOCL 2018
</commit_message>
<xml_diff>
--- a/slides/advanced_outro.pptx
+++ b/slides/advanced_outro.pptx
@@ -168,7 +168,7 @@
       </p14:sectionLst>
     </p:ext>
     <p:ext uri="{EFAFB233-063F-42B5-8137-9DF3F51BA10A}">
-      <p15:sldGuideLst xmlns:p15="http://schemas.microsoft.com/office/powerpoint/2012/main" xmlns="">
+      <p15:sldGuideLst xmlns:p15="http://schemas.microsoft.com/office/powerpoint/2012/main">
         <p15:guide id="1" orient="horz" pos="2160">
           <p15:clr>
             <a:srgbClr val="A4A3A4"/>
@@ -274,7 +274,7 @@
             <a:fld id="{92597E5C-85BB-4669-9209-B5E04E6ED101}" type="datetimeFigureOut">
               <a:rPr lang="en-GB" smtClean="0"/>
               <a:pPr/>
-              <a:t>16/05/17</a:t>
+              <a:t>09/05/2018</a:t>
             </a:fld>
             <a:endParaRPr lang="en-GB"/>
           </a:p>
@@ -338,35 +338,35 @@
           <a:p>
             <a:pPr lvl="0"/>
             <a:r>
-              <a:rPr lang="en-US" smtClean="0"/>
+              <a:rPr lang="en-US"/>
               <a:t>Click to edit Master text styles</a:t>
             </a:r>
           </a:p>
           <a:p>
             <a:pPr lvl="1"/>
             <a:r>
-              <a:rPr lang="en-US" smtClean="0"/>
+              <a:rPr lang="en-US"/>
               <a:t>Second level</a:t>
             </a:r>
           </a:p>
           <a:p>
             <a:pPr lvl="2"/>
             <a:r>
-              <a:rPr lang="en-US" smtClean="0"/>
+              <a:rPr lang="en-US"/>
               <a:t>Third level</a:t>
             </a:r>
           </a:p>
           <a:p>
             <a:pPr lvl="3"/>
             <a:r>
-              <a:rPr lang="en-US" smtClean="0"/>
+              <a:rPr lang="en-US"/>
               <a:t>Fourth level</a:t>
             </a:r>
           </a:p>
           <a:p>
             <a:pPr lvl="4"/>
             <a:r>
-              <a:rPr lang="en-US" smtClean="0"/>
+              <a:rPr lang="en-US"/>
               <a:t>Fifth level</a:t>
             </a:r>
             <a:endParaRPr lang="en-GB"/>
@@ -678,10 +678,9 @@
           <a:lstStyle/>
           <a:p>
             <a:r>
-              <a:rPr lang="en-GB" dirty="0" smtClean="0"/>
+              <a:rPr lang="en-GB" dirty="0"/>
               <a:t>libraries</a:t>
             </a:r>
-            <a:endParaRPr lang="en-GB" dirty="0"/>
           </a:p>
         </p:txBody>
       </p:sp>
@@ -760,7 +759,7 @@
           <a:lstStyle/>
           <a:p>
             <a:r>
-              <a:rPr lang="en-US" smtClean="0"/>
+              <a:rPr lang="en-US"/>
               <a:t>Click to edit Master title style</a:t>
             </a:r>
             <a:endParaRPr lang="en-GB"/>
@@ -879,7 +878,7 @@
           </a:lstStyle>
           <a:p>
             <a:r>
-              <a:rPr lang="en-US" smtClean="0"/>
+              <a:rPr lang="en-US"/>
               <a:t>Click to edit Master subtitle style</a:t>
             </a:r>
             <a:endParaRPr lang="en-GB"/>
@@ -904,7 +903,7 @@
             <a:fld id="{19E03964-7D59-4BF8-AE10-3A215A42C3E4}" type="datetime1">
               <a:rPr lang="en-GB" smtClean="0"/>
               <a:pPr/>
-              <a:t>16/05/17</a:t>
+              <a:t>09/05/2018</a:t>
             </a:fld>
             <a:endParaRPr lang="en-GB"/>
           </a:p>
@@ -994,7 +993,7 @@
           <a:lstStyle/>
           <a:p>
             <a:r>
-              <a:rPr lang="en-US" smtClean="0"/>
+              <a:rPr lang="en-US"/>
               <a:t>Click to edit Master title style</a:t>
             </a:r>
             <a:endParaRPr lang="en-GB"/>
@@ -1018,35 +1017,35 @@
           <a:p>
             <a:pPr lvl="0"/>
             <a:r>
-              <a:rPr lang="en-US" smtClean="0"/>
+              <a:rPr lang="en-US"/>
               <a:t>Click to edit Master text styles</a:t>
             </a:r>
           </a:p>
           <a:p>
             <a:pPr lvl="1"/>
             <a:r>
-              <a:rPr lang="en-US" smtClean="0"/>
+              <a:rPr lang="en-US"/>
               <a:t>Second level</a:t>
             </a:r>
           </a:p>
           <a:p>
             <a:pPr lvl="2"/>
             <a:r>
-              <a:rPr lang="en-US" smtClean="0"/>
+              <a:rPr lang="en-US"/>
               <a:t>Third level</a:t>
             </a:r>
           </a:p>
           <a:p>
             <a:pPr lvl="3"/>
             <a:r>
-              <a:rPr lang="en-US" smtClean="0"/>
+              <a:rPr lang="en-US"/>
               <a:t>Fourth level</a:t>
             </a:r>
           </a:p>
           <a:p>
             <a:pPr lvl="4"/>
             <a:r>
-              <a:rPr lang="en-US" smtClean="0"/>
+              <a:rPr lang="en-US"/>
               <a:t>Fifth level</a:t>
             </a:r>
             <a:endParaRPr lang="en-GB"/>
@@ -1071,7 +1070,7 @@
             <a:fld id="{8E5ADEB7-8139-4AC1-94DC-FE9E54B1CCD2}" type="datetime1">
               <a:rPr lang="en-GB" smtClean="0"/>
               <a:pPr/>
-              <a:t>16/05/17</a:t>
+              <a:t>09/05/2018</a:t>
             </a:fld>
             <a:endParaRPr lang="en-GB"/>
           </a:p>
@@ -1166,7 +1165,7 @@
           <a:lstStyle/>
           <a:p>
             <a:r>
-              <a:rPr lang="en-US" smtClean="0"/>
+              <a:rPr lang="en-US"/>
               <a:t>Click to edit Master title style</a:t>
             </a:r>
             <a:endParaRPr lang="en-GB"/>
@@ -1195,35 +1194,35 @@
           <a:p>
             <a:pPr lvl="0"/>
             <a:r>
-              <a:rPr lang="en-US" smtClean="0"/>
+              <a:rPr lang="en-US"/>
               <a:t>Click to edit Master text styles</a:t>
             </a:r>
           </a:p>
           <a:p>
             <a:pPr lvl="1"/>
             <a:r>
-              <a:rPr lang="en-US" smtClean="0"/>
+              <a:rPr lang="en-US"/>
               <a:t>Second level</a:t>
             </a:r>
           </a:p>
           <a:p>
             <a:pPr lvl="2"/>
             <a:r>
-              <a:rPr lang="en-US" smtClean="0"/>
+              <a:rPr lang="en-US"/>
               <a:t>Third level</a:t>
             </a:r>
           </a:p>
           <a:p>
             <a:pPr lvl="3"/>
             <a:r>
-              <a:rPr lang="en-US" smtClean="0"/>
+              <a:rPr lang="en-US"/>
               <a:t>Fourth level</a:t>
             </a:r>
           </a:p>
           <a:p>
             <a:pPr lvl="4"/>
             <a:r>
-              <a:rPr lang="en-US" smtClean="0"/>
+              <a:rPr lang="en-US"/>
               <a:t>Fifth level</a:t>
             </a:r>
             <a:endParaRPr lang="en-GB"/>
@@ -1248,7 +1247,7 @@
             <a:fld id="{9C77A686-1785-49A1-B4C9-55A3C7EEADE4}" type="datetime1">
               <a:rPr lang="en-GB" smtClean="0"/>
               <a:pPr/>
-              <a:t>16/05/17</a:t>
+              <a:t>09/05/2018</a:t>
             </a:fld>
             <a:endParaRPr lang="en-GB"/>
           </a:p>
@@ -1350,10 +1349,9 @@
           </a:lstStyle>
           <a:p>
             <a:r>
-              <a:rPr lang="en-US" dirty="0" smtClean="0"/>
+              <a:rPr lang="en-US" dirty="0"/>
               <a:t>Click to edit Master title style</a:t>
             </a:r>
-            <a:endParaRPr lang="en-US" dirty="0"/>
           </a:p>
         </p:txBody>
       </p:sp>
@@ -1430,38 +1428,37 @@
           <a:p>
             <a:pPr lvl="0"/>
             <a:r>
-              <a:rPr lang="en-US" dirty="0" smtClean="0"/>
+              <a:rPr lang="en-US" dirty="0"/>
               <a:t>Click to edit Master text styles</a:t>
             </a:r>
           </a:p>
           <a:p>
             <a:pPr lvl="1"/>
             <a:r>
-              <a:rPr lang="en-US" dirty="0" smtClean="0"/>
+              <a:rPr lang="en-US" dirty="0"/>
               <a:t>Second level</a:t>
             </a:r>
           </a:p>
           <a:p>
             <a:pPr lvl="2"/>
             <a:r>
-              <a:rPr lang="en-US" dirty="0" smtClean="0"/>
+              <a:rPr lang="en-US" dirty="0"/>
               <a:t>Third level</a:t>
             </a:r>
           </a:p>
           <a:p>
             <a:pPr lvl="3"/>
             <a:r>
-              <a:rPr lang="en-US" dirty="0" smtClean="0"/>
+              <a:rPr lang="en-US" dirty="0"/>
               <a:t>Fourth level</a:t>
             </a:r>
           </a:p>
           <a:p>
             <a:pPr lvl="4"/>
             <a:r>
-              <a:rPr lang="en-US" dirty="0" smtClean="0"/>
+              <a:rPr lang="en-US" dirty="0"/>
               <a:t>Fifth level</a:t>
             </a:r>
-            <a:endParaRPr lang="en-US" dirty="0"/>
           </a:p>
         </p:txBody>
       </p:sp>
@@ -1550,7 +1547,7 @@
                 <a:tab pos="6553200" algn="l"/>
               </a:tabLst>
             </a:pPr>
-            <a:endParaRPr kumimoji="0" lang="en-US" sz="3600" b="0" i="0" u="none" strike="noStrike" cap="none" normalizeH="0" baseline="0" smtClean="0">
+            <a:endParaRPr kumimoji="0" lang="en-US" sz="3600" b="0" i="0" u="none" strike="noStrike" cap="none" normalizeH="0" baseline="0">
               <a:ln>
                 <a:noFill/>
               </a:ln>
@@ -1599,16 +1596,9 @@
   <p:clrMapOvr>
     <a:masterClrMapping/>
   </p:clrMapOvr>
-  <p:transition xmlns:p14="http://schemas.microsoft.com/office/powerpoint/2010/main">
+  <p:transition>
     <p:fade/>
   </p:transition>
-  <p:timing>
-    <p:tnLst>
-      <p:par>
-        <p:cTn xmlns:p14="http://schemas.microsoft.com/office/powerpoint/2010/main" id="1" dur="indefinite" restart="never" nodeType="tmRoot"/>
-      </p:par>
-    </p:tnLst>
-  </p:timing>
 </p:sldLayout>
 </file>
 
@@ -1645,7 +1635,7 @@
           <a:lstStyle/>
           <a:p>
             <a:r>
-              <a:rPr lang="en-US" smtClean="0"/>
+              <a:rPr lang="en-US"/>
               <a:t>Click to edit Master title style</a:t>
             </a:r>
             <a:endParaRPr lang="en-GB"/>
@@ -1669,35 +1659,35 @@
           <a:p>
             <a:pPr lvl="0"/>
             <a:r>
-              <a:rPr lang="en-US" smtClean="0"/>
+              <a:rPr lang="en-US"/>
               <a:t>Click to edit Master text styles</a:t>
             </a:r>
           </a:p>
           <a:p>
             <a:pPr lvl="1"/>
             <a:r>
-              <a:rPr lang="en-US" smtClean="0"/>
+              <a:rPr lang="en-US"/>
               <a:t>Second level</a:t>
             </a:r>
           </a:p>
           <a:p>
             <a:pPr lvl="2"/>
             <a:r>
-              <a:rPr lang="en-US" smtClean="0"/>
+              <a:rPr lang="en-US"/>
               <a:t>Third level</a:t>
             </a:r>
           </a:p>
           <a:p>
             <a:pPr lvl="3"/>
             <a:r>
-              <a:rPr lang="en-US" smtClean="0"/>
+              <a:rPr lang="en-US"/>
               <a:t>Fourth level</a:t>
             </a:r>
           </a:p>
           <a:p>
             <a:pPr lvl="4"/>
             <a:r>
-              <a:rPr lang="en-US" smtClean="0"/>
+              <a:rPr lang="en-US"/>
               <a:t>Fifth level</a:t>
             </a:r>
             <a:endParaRPr lang="en-GB"/>
@@ -1722,7 +1712,7 @@
             <a:fld id="{D65327FA-D1E5-40CA-8941-3DD0B6730F8A}" type="datetime1">
               <a:rPr lang="en-GB" smtClean="0"/>
               <a:pPr/>
-              <a:t>16/05/17</a:t>
+              <a:t>09/05/2018</a:t>
             </a:fld>
             <a:endParaRPr lang="en-GB"/>
           </a:p>
@@ -1821,7 +1811,7 @@
           </a:lstStyle>
           <a:p>
             <a:r>
-              <a:rPr lang="en-US" smtClean="0"/>
+              <a:rPr lang="en-US"/>
               <a:t>Click to edit Master title style</a:t>
             </a:r>
             <a:endParaRPr lang="en-GB"/>
@@ -1941,7 +1931,7 @@
           <a:p>
             <a:pPr lvl="0"/>
             <a:r>
-              <a:rPr lang="en-US" smtClean="0"/>
+              <a:rPr lang="en-US"/>
               <a:t>Click to edit Master text styles</a:t>
             </a:r>
           </a:p>
@@ -1965,7 +1955,7 @@
             <a:fld id="{DB33F153-90AC-449F-A303-26940247ABC8}" type="datetime1">
               <a:rPr lang="en-GB" smtClean="0"/>
               <a:pPr/>
-              <a:t>16/05/17</a:t>
+              <a:t>09/05/2018</a:t>
             </a:fld>
             <a:endParaRPr lang="en-GB"/>
           </a:p>
@@ -2055,7 +2045,7 @@
           <a:lstStyle/>
           <a:p>
             <a:r>
-              <a:rPr lang="en-US" smtClean="0"/>
+              <a:rPr lang="en-US"/>
               <a:t>Click to edit Master title style</a:t>
             </a:r>
             <a:endParaRPr lang="en-GB"/>
@@ -2112,35 +2102,35 @@
           <a:p>
             <a:pPr lvl="0"/>
             <a:r>
-              <a:rPr lang="en-US" smtClean="0"/>
+              <a:rPr lang="en-US"/>
               <a:t>Click to edit Master text styles</a:t>
             </a:r>
           </a:p>
           <a:p>
             <a:pPr lvl="1"/>
             <a:r>
-              <a:rPr lang="en-US" smtClean="0"/>
+              <a:rPr lang="en-US"/>
               <a:t>Second level</a:t>
             </a:r>
           </a:p>
           <a:p>
             <a:pPr lvl="2"/>
             <a:r>
-              <a:rPr lang="en-US" smtClean="0"/>
+              <a:rPr lang="en-US"/>
               <a:t>Third level</a:t>
             </a:r>
           </a:p>
           <a:p>
             <a:pPr lvl="3"/>
             <a:r>
-              <a:rPr lang="en-US" smtClean="0"/>
+              <a:rPr lang="en-US"/>
               <a:t>Fourth level</a:t>
             </a:r>
           </a:p>
           <a:p>
             <a:pPr lvl="4"/>
             <a:r>
-              <a:rPr lang="en-US" smtClean="0"/>
+              <a:rPr lang="en-US"/>
               <a:t>Fifth level</a:t>
             </a:r>
             <a:endParaRPr lang="en-GB"/>
@@ -2197,35 +2187,35 @@
           <a:p>
             <a:pPr lvl="0"/>
             <a:r>
-              <a:rPr lang="en-US" smtClean="0"/>
+              <a:rPr lang="en-US"/>
               <a:t>Click to edit Master text styles</a:t>
             </a:r>
           </a:p>
           <a:p>
             <a:pPr lvl="1"/>
             <a:r>
-              <a:rPr lang="en-US" smtClean="0"/>
+              <a:rPr lang="en-US"/>
               <a:t>Second level</a:t>
             </a:r>
           </a:p>
           <a:p>
             <a:pPr lvl="2"/>
             <a:r>
-              <a:rPr lang="en-US" smtClean="0"/>
+              <a:rPr lang="en-US"/>
               <a:t>Third level</a:t>
             </a:r>
           </a:p>
           <a:p>
             <a:pPr lvl="3"/>
             <a:r>
-              <a:rPr lang="en-US" smtClean="0"/>
+              <a:rPr lang="en-US"/>
               <a:t>Fourth level</a:t>
             </a:r>
           </a:p>
           <a:p>
             <a:pPr lvl="4"/>
             <a:r>
-              <a:rPr lang="en-US" smtClean="0"/>
+              <a:rPr lang="en-US"/>
               <a:t>Fifth level</a:t>
             </a:r>
             <a:endParaRPr lang="en-GB"/>
@@ -2250,7 +2240,7 @@
             <a:fld id="{84E24492-3EA5-478D-9F72-7B8FF369DDEB}" type="datetime1">
               <a:rPr lang="en-GB" smtClean="0"/>
               <a:pPr/>
-              <a:t>16/05/17</a:t>
+              <a:t>09/05/2018</a:t>
             </a:fld>
             <a:endParaRPr lang="en-GB"/>
           </a:p>
@@ -2344,7 +2334,7 @@
           </a:lstStyle>
           <a:p>
             <a:r>
-              <a:rPr lang="en-US" smtClean="0"/>
+              <a:rPr lang="en-US"/>
               <a:t>Click to edit Master title style</a:t>
             </a:r>
             <a:endParaRPr lang="en-GB"/>
@@ -2410,7 +2400,7 @@
           <a:p>
             <a:pPr lvl="0"/>
             <a:r>
-              <a:rPr lang="en-US" smtClean="0"/>
+              <a:rPr lang="en-US"/>
               <a:t>Click to edit Master text styles</a:t>
             </a:r>
           </a:p>
@@ -2466,35 +2456,35 @@
           <a:p>
             <a:pPr lvl="0"/>
             <a:r>
-              <a:rPr lang="en-US" smtClean="0"/>
+              <a:rPr lang="en-US"/>
               <a:t>Click to edit Master text styles</a:t>
             </a:r>
           </a:p>
           <a:p>
             <a:pPr lvl="1"/>
             <a:r>
-              <a:rPr lang="en-US" smtClean="0"/>
+              <a:rPr lang="en-US"/>
               <a:t>Second level</a:t>
             </a:r>
           </a:p>
           <a:p>
             <a:pPr lvl="2"/>
             <a:r>
-              <a:rPr lang="en-US" smtClean="0"/>
+              <a:rPr lang="en-US"/>
               <a:t>Third level</a:t>
             </a:r>
           </a:p>
           <a:p>
             <a:pPr lvl="3"/>
             <a:r>
-              <a:rPr lang="en-US" smtClean="0"/>
+              <a:rPr lang="en-US"/>
               <a:t>Fourth level</a:t>
             </a:r>
           </a:p>
           <a:p>
             <a:pPr lvl="4"/>
             <a:r>
-              <a:rPr lang="en-US" smtClean="0"/>
+              <a:rPr lang="en-US"/>
               <a:t>Fifth level</a:t>
             </a:r>
             <a:endParaRPr lang="en-GB"/>
@@ -2560,7 +2550,7 @@
           <a:p>
             <a:pPr lvl="0"/>
             <a:r>
-              <a:rPr lang="en-US" smtClean="0"/>
+              <a:rPr lang="en-US"/>
               <a:t>Click to edit Master text styles</a:t>
             </a:r>
           </a:p>
@@ -2616,35 +2606,35 @@
           <a:p>
             <a:pPr lvl="0"/>
             <a:r>
-              <a:rPr lang="en-US" smtClean="0"/>
+              <a:rPr lang="en-US"/>
               <a:t>Click to edit Master text styles</a:t>
             </a:r>
           </a:p>
           <a:p>
             <a:pPr lvl="1"/>
             <a:r>
-              <a:rPr lang="en-US" smtClean="0"/>
+              <a:rPr lang="en-US"/>
               <a:t>Second level</a:t>
             </a:r>
           </a:p>
           <a:p>
             <a:pPr lvl="2"/>
             <a:r>
-              <a:rPr lang="en-US" smtClean="0"/>
+              <a:rPr lang="en-US"/>
               <a:t>Third level</a:t>
             </a:r>
           </a:p>
           <a:p>
             <a:pPr lvl="3"/>
             <a:r>
-              <a:rPr lang="en-US" smtClean="0"/>
+              <a:rPr lang="en-US"/>
               <a:t>Fourth level</a:t>
             </a:r>
           </a:p>
           <a:p>
             <a:pPr lvl="4"/>
             <a:r>
-              <a:rPr lang="en-US" smtClean="0"/>
+              <a:rPr lang="en-US"/>
               <a:t>Fifth level</a:t>
             </a:r>
             <a:endParaRPr lang="en-GB"/>
@@ -2669,7 +2659,7 @@
             <a:fld id="{43976A03-596E-4490-AE35-AFB744E08901}" type="datetime1">
               <a:rPr lang="en-GB" smtClean="0"/>
               <a:pPr/>
-              <a:t>16/05/17</a:t>
+              <a:t>09/05/2018</a:t>
             </a:fld>
             <a:endParaRPr lang="en-GB"/>
           </a:p>
@@ -2759,7 +2749,7 @@
           <a:lstStyle/>
           <a:p>
             <a:r>
-              <a:rPr lang="en-US" smtClean="0"/>
+              <a:rPr lang="en-US"/>
               <a:t>Click to edit Master title style</a:t>
             </a:r>
             <a:endParaRPr lang="en-GB"/>
@@ -2784,7 +2774,7 @@
             <a:fld id="{4C8E3CB4-829C-4F19-9E86-B2AAEC36BD90}" type="datetime1">
               <a:rPr lang="en-GB" smtClean="0"/>
               <a:pPr/>
-              <a:t>16/05/17</a:t>
+              <a:t>09/05/2018</a:t>
             </a:fld>
             <a:endParaRPr lang="en-GB"/>
           </a:p>
@@ -2876,7 +2866,7 @@
             <a:fld id="{D4A6FE01-96D8-461F-B1B2-1F0C16D98900}" type="datetime1">
               <a:rPr lang="en-GB" smtClean="0"/>
               <a:pPr/>
-              <a:t>16/05/17</a:t>
+              <a:t>09/05/2018</a:t>
             </a:fld>
             <a:endParaRPr lang="en-GB"/>
           </a:p>
@@ -2975,7 +2965,7 @@
           </a:lstStyle>
           <a:p>
             <a:r>
-              <a:rPr lang="en-US" smtClean="0"/>
+              <a:rPr lang="en-US"/>
               <a:t>Click to edit Master title style</a:t>
             </a:r>
             <a:endParaRPr lang="en-GB"/>
@@ -3032,35 +3022,35 @@
           <a:p>
             <a:pPr lvl="0"/>
             <a:r>
-              <a:rPr lang="en-US" smtClean="0"/>
+              <a:rPr lang="en-US"/>
               <a:t>Click to edit Master text styles</a:t>
             </a:r>
           </a:p>
           <a:p>
             <a:pPr lvl="1"/>
             <a:r>
-              <a:rPr lang="en-US" smtClean="0"/>
+              <a:rPr lang="en-US"/>
               <a:t>Second level</a:t>
             </a:r>
           </a:p>
           <a:p>
             <a:pPr lvl="2"/>
             <a:r>
-              <a:rPr lang="en-US" smtClean="0"/>
+              <a:rPr lang="en-US"/>
               <a:t>Third level</a:t>
             </a:r>
           </a:p>
           <a:p>
             <a:pPr lvl="3"/>
             <a:r>
-              <a:rPr lang="en-US" smtClean="0"/>
+              <a:rPr lang="en-US"/>
               <a:t>Fourth level</a:t>
             </a:r>
           </a:p>
           <a:p>
             <a:pPr lvl="4"/>
             <a:r>
-              <a:rPr lang="en-US" smtClean="0"/>
+              <a:rPr lang="en-US"/>
               <a:t>Fifth level</a:t>
             </a:r>
             <a:endParaRPr lang="en-GB"/>
@@ -3126,7 +3116,7 @@
           <a:p>
             <a:pPr lvl="0"/>
             <a:r>
-              <a:rPr lang="en-US" smtClean="0"/>
+              <a:rPr lang="en-US"/>
               <a:t>Click to edit Master text styles</a:t>
             </a:r>
           </a:p>
@@ -3150,7 +3140,7 @@
             <a:fld id="{B24CB088-CFF7-44C4-9CCE-18845754E6D4}" type="datetime1">
               <a:rPr lang="en-GB" smtClean="0"/>
               <a:pPr/>
-              <a:t>16/05/17</a:t>
+              <a:t>09/05/2018</a:t>
             </a:fld>
             <a:endParaRPr lang="en-GB"/>
           </a:p>
@@ -3249,7 +3239,7 @@
           </a:lstStyle>
           <a:p>
             <a:r>
-              <a:rPr lang="en-US" smtClean="0"/>
+              <a:rPr lang="en-US"/>
               <a:t>Click to edit Master title style</a:t>
             </a:r>
             <a:endParaRPr lang="en-GB"/>
@@ -3314,7 +3304,7 @@
           </a:lstStyle>
           <a:p>
             <a:r>
-              <a:rPr lang="en-US" smtClean="0"/>
+              <a:rPr lang="en-US"/>
               <a:t>Click icon to add picture</a:t>
             </a:r>
             <a:endParaRPr lang="en-GB"/>
@@ -3380,7 +3370,7 @@
           <a:p>
             <a:pPr lvl="0"/>
             <a:r>
-              <a:rPr lang="en-US" smtClean="0"/>
+              <a:rPr lang="en-US"/>
               <a:t>Click to edit Master text styles</a:t>
             </a:r>
           </a:p>
@@ -3404,7 +3394,7 @@
             <a:fld id="{CD3A280C-4DEC-4EEC-BD59-A30886E06BA1}" type="datetime1">
               <a:rPr lang="en-GB" smtClean="0"/>
               <a:pPr/>
-              <a:t>16/05/17</a:t>
+              <a:t>09/05/2018</a:t>
             </a:fld>
             <a:endParaRPr lang="en-GB"/>
           </a:p>
@@ -3509,7 +3499,7 @@
           <a:lstStyle/>
           <a:p>
             <a:r>
-              <a:rPr lang="en-US" smtClean="0"/>
+              <a:rPr lang="en-US"/>
               <a:t>Click to edit Master title style</a:t>
             </a:r>
             <a:endParaRPr lang="en-GB"/>
@@ -3543,35 +3533,35 @@
           <a:p>
             <a:pPr lvl="0"/>
             <a:r>
-              <a:rPr lang="en-US" smtClean="0"/>
+              <a:rPr lang="en-US"/>
               <a:t>Click to edit Master text styles</a:t>
             </a:r>
           </a:p>
           <a:p>
             <a:pPr lvl="1"/>
             <a:r>
-              <a:rPr lang="en-US" smtClean="0"/>
+              <a:rPr lang="en-US"/>
               <a:t>Second level</a:t>
             </a:r>
           </a:p>
           <a:p>
             <a:pPr lvl="2"/>
             <a:r>
-              <a:rPr lang="en-US" smtClean="0"/>
+              <a:rPr lang="en-US"/>
               <a:t>Third level</a:t>
             </a:r>
           </a:p>
           <a:p>
             <a:pPr lvl="3"/>
             <a:r>
-              <a:rPr lang="en-US" smtClean="0"/>
+              <a:rPr lang="en-US"/>
               <a:t>Fourth level</a:t>
             </a:r>
           </a:p>
           <a:p>
             <a:pPr lvl="4"/>
             <a:r>
-              <a:rPr lang="en-US" smtClean="0"/>
+              <a:rPr lang="en-US"/>
               <a:t>Fifth level</a:t>
             </a:r>
             <a:endParaRPr lang="en-GB"/>
@@ -3614,7 +3604,7 @@
             <a:fld id="{E222BC38-3FAE-415B-AD1C-2D338E3D6B03}" type="datetime1">
               <a:rPr lang="en-GB" smtClean="0"/>
               <a:pPr/>
-              <a:t>16/05/17</a:t>
+              <a:t>09/05/2018</a:t>
             </a:fld>
             <a:endParaRPr lang="en-GB"/>
           </a:p>
@@ -4005,19 +3995,15 @@
           <a:lstStyle/>
           <a:p>
             <a:r>
-              <a:rPr lang="en-GB" dirty="0" smtClean="0"/>
+              <a:rPr lang="en-GB" dirty="0"/>
               <a:t>Advanced OpenCL Topics:</a:t>
             </a:r>
             <a:br>
-              <a:rPr lang="en-GB" dirty="0" smtClean="0"/>
+              <a:rPr lang="en-GB" dirty="0"/>
             </a:br>
             <a:r>
-              <a:rPr lang="en-GB" dirty="0" smtClean="0"/>
+              <a:rPr lang="en-GB" dirty="0"/>
               <a:t>The OPENCL ECOSYSTEM</a:t>
-            </a:r>
-            <a:r>
-              <a:rPr lang="en-GB" dirty="0"/>
-              <a:t/>
             </a:r>
             <a:br>
               <a:rPr lang="en-GB" dirty="0"/>
@@ -4059,13 +4045,6 @@
   <p:clrMapOvr>
     <a:masterClrMapping/>
   </p:clrMapOvr>
-  <p:timing>
-    <p:tnLst>
-      <p:par>
-        <p:cTn xmlns:p14="http://schemas.microsoft.com/office/powerpoint/2010/main" id="1" dur="indefinite" restart="never" nodeType="tmRoot"/>
-      </p:par>
-    </p:tnLst>
-  </p:timing>
 </p:sld>
 </file>
 
@@ -4109,19 +4088,15 @@
           <a:lstStyle/>
           <a:p>
             <a:r>
-              <a:rPr lang="en-GB" dirty="0" smtClean="0"/>
+              <a:rPr lang="en-GB" dirty="0"/>
               <a:t>Resources:</a:t>
             </a:r>
             <a:br>
-              <a:rPr lang="en-GB" dirty="0" smtClean="0"/>
+              <a:rPr lang="en-GB" dirty="0"/>
             </a:br>
             <a:r>
-              <a:rPr lang="en-GB" dirty="0" smtClean="0"/>
-              <a:t>https</a:t>
-            </a:r>
-            <a:r>
-              <a:rPr lang="en-GB" dirty="0"/>
-              <a:t>://www.khronos.org/opencl/</a:t>
+              <a:rPr lang="en-GB" dirty="0"/>
+              <a:t>https://www.khronos.org/opencl/</a:t>
             </a:r>
           </a:p>
         </p:txBody>
@@ -4149,7 +4124,7 @@
           <a:lstStyle/>
           <a:p>
             <a:r>
-              <a:rPr lang="en-US" sz="1800" b="1" dirty="0" smtClean="0">
+              <a:rPr lang="en-US" sz="1800" b="1" dirty="0">
                 <a:solidFill>
                   <a:schemeClr val="tx1"/>
                 </a:solidFill>
@@ -4158,7 +4133,7 @@
               <a:t>OpenCL Programming Guide</a:t>
             </a:r>
             <a:r>
-              <a:rPr lang="en-US" sz="1800" dirty="0" smtClean="0">
+              <a:rPr lang="en-US" sz="1800" dirty="0">
                 <a:solidFill>
                   <a:schemeClr val="tx1"/>
                 </a:solidFill>
@@ -4169,7 +4144,7 @@
           </a:p>
           <a:p>
             <a:r>
-              <a:rPr lang="en-US" sz="1800" dirty="0" smtClean="0">
+              <a:rPr lang="en-US" sz="1800" dirty="0">
                 <a:solidFill>
                   <a:schemeClr val="tx1"/>
                 </a:solidFill>
@@ -4177,12 +4152,6 @@
               </a:rPr>
               <a:t>Aaftab Munshi, Benedict Gaster, Timothy G. Mattson and James Fung, 2011 </a:t>
             </a:r>
-            <a:endParaRPr lang="en-US" sz="1800" dirty="0">
-              <a:solidFill>
-                <a:schemeClr val="tx1"/>
-              </a:solidFill>
-              <a:latin typeface="+mn-lt"/>
-            </a:endParaRPr>
           </a:p>
         </p:txBody>
       </p:sp>
@@ -4209,7 +4178,7 @@
           <a:lstStyle/>
           <a:p>
             <a:r>
-              <a:rPr lang="en-US" sz="1800" b="1" dirty="0" smtClean="0">
+              <a:rPr lang="en-US" sz="1800" b="1" dirty="0">
                 <a:solidFill>
                   <a:schemeClr val="tx1"/>
                 </a:solidFill>
@@ -4220,7 +4189,7 @@
           </a:p>
           <a:p>
             <a:r>
-              <a:rPr lang="en-US" sz="1800" dirty="0" smtClean="0">
+              <a:rPr lang="en-US" sz="1800" dirty="0">
                 <a:solidFill>
                   <a:schemeClr val="tx1"/>
                 </a:solidFill>
@@ -4229,7 +4198,7 @@
               <a:t>Benedict Gaster, Lee Howes, David R. </a:t>
             </a:r>
             <a:r>
-              <a:rPr lang="en-US" sz="1800" dirty="0" err="1" smtClean="0">
+              <a:rPr lang="en-US" sz="1800" dirty="0" err="1">
                 <a:solidFill>
                   <a:schemeClr val="tx1"/>
                 </a:solidFill>
@@ -4238,7 +4207,7 @@
               <a:t>Kaeli</a:t>
             </a:r>
             <a:r>
-              <a:rPr lang="en-US" sz="1800" dirty="0" smtClean="0">
+              <a:rPr lang="en-US" sz="1800" dirty="0">
                 <a:solidFill>
                   <a:schemeClr val="tx1"/>
                 </a:solidFill>
@@ -4247,7 +4216,7 @@
               <a:t>, </a:t>
             </a:r>
             <a:r>
-              <a:rPr lang="en-US" sz="1800" dirty="0" err="1" smtClean="0">
+              <a:rPr lang="en-US" sz="1800" dirty="0" err="1">
                 <a:solidFill>
                   <a:schemeClr val="tx1"/>
                 </a:solidFill>
@@ -4256,7 +4225,7 @@
               <a:t>Perhaad</a:t>
             </a:r>
             <a:r>
-              <a:rPr lang="en-US" sz="1800" dirty="0" smtClean="0">
+              <a:rPr lang="en-US" sz="1800" dirty="0">
                 <a:solidFill>
                   <a:schemeClr val="tx1"/>
                 </a:solidFill>
@@ -4265,7 +4234,7 @@
               <a:t> </a:t>
             </a:r>
             <a:r>
-              <a:rPr lang="en-US" sz="1800" dirty="0" err="1" smtClean="0">
+              <a:rPr lang="en-US" sz="1800" dirty="0" err="1">
                 <a:solidFill>
                   <a:schemeClr val="tx1"/>
                 </a:solidFill>
@@ -4274,7 +4243,7 @@
               <a:t>Mistry</a:t>
             </a:r>
             <a:r>
-              <a:rPr lang="en-US" sz="1800" dirty="0" smtClean="0">
+              <a:rPr lang="en-US" sz="1800" dirty="0">
                 <a:solidFill>
                   <a:schemeClr val="tx1"/>
                 </a:solidFill>
@@ -4283,7 +4252,7 @@
               <a:t> and Dana </a:t>
             </a:r>
             <a:r>
-              <a:rPr lang="en-US" sz="1800" dirty="0" err="1" smtClean="0">
+              <a:rPr lang="en-US" sz="1800" dirty="0" err="1">
                 <a:solidFill>
                   <a:schemeClr val="tx1"/>
                 </a:solidFill>
@@ -4292,7 +4261,7 @@
               <a:t>Schaa</a:t>
             </a:r>
             <a:r>
-              <a:rPr lang="en-US" sz="1800" dirty="0" smtClean="0">
+              <a:rPr lang="en-US" sz="1800" dirty="0">
                 <a:solidFill>
                   <a:schemeClr val="tx1"/>
                 </a:solidFill>
@@ -4300,12 +4269,6 @@
               </a:rPr>
               <a:t>, 2011</a:t>
             </a:r>
-            <a:endParaRPr lang="en-US" sz="1800" dirty="0">
-              <a:solidFill>
-                <a:schemeClr val="tx1"/>
-              </a:solidFill>
-              <a:latin typeface="+mn-lt"/>
-            </a:endParaRPr>
           </a:p>
         </p:txBody>
       </p:sp>
@@ -4625,7 +4588,7 @@
           <a:lstStyle/>
           <a:p>
             <a:r>
-              <a:rPr lang="en-US" sz="1800" b="1" dirty="0" smtClean="0">
+              <a:rPr lang="en-US" sz="1800" b="1" dirty="0">
                 <a:solidFill>
                   <a:schemeClr val="tx1"/>
                 </a:solidFill>
@@ -4633,7 +4596,7 @@
               </a:rPr>
               <a:t>The OpenCL specification</a:t>
             </a:r>
-            <a:endParaRPr lang="en-US" sz="1800" dirty="0" smtClean="0">
+            <a:endParaRPr lang="en-US" sz="1800" dirty="0">
               <a:solidFill>
                 <a:schemeClr val="tx1"/>
               </a:solidFill>
@@ -4642,7 +4605,7 @@
           </a:p>
           <a:p>
             <a:r>
-              <a:rPr lang="en-US" sz="1800" dirty="0" smtClean="0">
+              <a:rPr lang="en-US" sz="1800" dirty="0">
                 <a:solidFill>
                   <a:schemeClr val="tx1"/>
                 </a:solidFill>
@@ -4656,19 +4619,12 @@
               <a:rPr lang="en-US" dirty="0">
                 <a:hlinkClick r:id="rId5"/>
               </a:rPr>
-              <a:t>https://www.khronos.org/registry/cl</a:t>
-            </a:r>
-            <a:r>
-              <a:rPr lang="en-US" dirty="0" smtClean="0">
-                <a:hlinkClick r:id="rId5"/>
-              </a:rPr>
-              <a:t>/</a:t>
-            </a:r>
-            <a:r>
-              <a:rPr lang="en-US" dirty="0" smtClean="0"/>
+              <a:t>https://www.khronos.org/registry/cl/</a:t>
+            </a:r>
+            <a:r>
+              <a:rPr lang="en-US" dirty="0"/>
               <a:t> </a:t>
             </a:r>
-            <a:endParaRPr lang="en-US" dirty="0"/>
           </a:p>
         </p:txBody>
       </p:sp>
@@ -4728,7 +4684,7 @@
           <a:lstStyle/>
           <a:p>
             <a:r>
-              <a:rPr lang="en-US" sz="1800" b="1" dirty="0" smtClean="0">
+              <a:rPr lang="en-US" sz="1800" b="1" dirty="0">
                 <a:solidFill>
                   <a:schemeClr val="tx1"/>
                 </a:solidFill>
@@ -4736,7 +4692,7 @@
               </a:rPr>
               <a:t>OpenCL reference card</a:t>
             </a:r>
-            <a:endParaRPr lang="en-US" sz="1800" dirty="0" smtClean="0">
+            <a:endParaRPr lang="en-US" sz="1800" dirty="0">
               <a:solidFill>
                 <a:schemeClr val="tx1"/>
               </a:solidFill>
@@ -4745,7 +4701,7 @@
           </a:p>
           <a:p>
             <a:r>
-              <a:rPr lang="en-US" sz="1800" dirty="0" smtClean="0">
+              <a:rPr lang="en-US" sz="1800" dirty="0">
                 <a:solidFill>
                   <a:schemeClr val="tx1"/>
                 </a:solidFill>
@@ -4757,7 +4713,7 @@
           </a:p>
           <a:p>
             <a:r>
-              <a:rPr lang="en-US" sz="1800" dirty="0" smtClean="0">
+              <a:rPr lang="en-US" sz="1800" dirty="0">
                 <a:solidFill>
                   <a:schemeClr val="tx1"/>
                 </a:solidFill>
@@ -4765,12 +4721,6 @@
               </a:rPr>
               <a:t>Available on the same page as the spec.</a:t>
             </a:r>
-            <a:endParaRPr lang="en-US" sz="1800" dirty="0">
-              <a:solidFill>
-                <a:schemeClr val="tx1"/>
-              </a:solidFill>
-              <a:latin typeface="+mn-lt"/>
-            </a:endParaRPr>
           </a:p>
         </p:txBody>
       </p:sp>
@@ -4784,13 +4734,6 @@
   <p:clrMapOvr>
     <a:masterClrMapping/>
   </p:clrMapOvr>
-  <p:timing>
-    <p:tnLst>
-      <p:par>
-        <p:cTn xmlns:p14="http://schemas.microsoft.com/office/powerpoint/2010/main" id="1" dur="indefinite" restart="never" nodeType="tmRoot"/>
-      </p:par>
-    </p:tnLst>
-  </p:timing>
 </p:sld>
 </file>
 
@@ -4832,10 +4775,9 @@
           <a:lstStyle/>
           <a:p>
             <a:r>
-              <a:rPr lang="en-GB" dirty="0" smtClean="0"/>
+              <a:rPr lang="en-GB" dirty="0"/>
               <a:t>Hands On OpenCL</a:t>
             </a:r>
-            <a:endParaRPr lang="en-GB" dirty="0"/>
           </a:p>
         </p:txBody>
       </p:sp>
@@ -4862,37 +4804,37 @@
           <a:lstStyle/>
           <a:p>
             <a:r>
-              <a:rPr lang="en-GB" dirty="0" smtClean="0"/>
+              <a:rPr lang="en-GB" dirty="0"/>
               <a:t>One of the most popular OpenCL training courses on the web</a:t>
             </a:r>
           </a:p>
           <a:p>
             <a:r>
-              <a:rPr lang="en-GB" dirty="0" smtClean="0"/>
+              <a:rPr lang="en-GB" dirty="0"/>
               <a:t>Completely open source (creative commons attribution CC BY license)</a:t>
             </a:r>
           </a:p>
           <a:p>
             <a:r>
-              <a:rPr lang="en-GB" dirty="0" smtClean="0"/>
+              <a:rPr lang="en-GB" dirty="0"/>
               <a:t>Downloaded over 11,000 times so far!</a:t>
             </a:r>
           </a:p>
           <a:p>
             <a:r>
-              <a:rPr lang="en-GB" dirty="0" smtClean="0"/>
+              <a:rPr lang="en-GB" dirty="0"/>
               <a:t>Lots of training material, examples and solutions, source code etc.</a:t>
             </a:r>
           </a:p>
           <a:p>
             <a:r>
-              <a:rPr lang="en-GB" dirty="0" smtClean="0"/>
+              <a:rPr lang="en-GB" dirty="0"/>
               <a:t>Works on Linux, Windows, OSX etc.</a:t>
             </a:r>
           </a:p>
           <a:p>
             <a:pPr lvl="1"/>
-            <a:endParaRPr lang="en-GB" dirty="0" smtClean="0"/>
+            <a:endParaRPr lang="en-GB" dirty="0"/>
           </a:p>
           <a:p>
             <a:endParaRPr lang="en-GB" dirty="0"/>
@@ -4925,19 +4867,12 @@
               <a:rPr lang="en-GB" sz="3200" dirty="0">
                 <a:hlinkClick r:id="rId2"/>
               </a:rPr>
-              <a:t>http://</a:t>
-            </a:r>
-            <a:r>
-              <a:rPr lang="en-GB" sz="3200" dirty="0" smtClean="0">
-                <a:hlinkClick r:id="rId2"/>
-              </a:rPr>
-              <a:t>handsonopencl.github.io</a:t>
-            </a:r>
-            <a:r>
-              <a:rPr lang="en-GB" sz="3200" dirty="0" smtClean="0"/>
+              <a:t>http://handsonopencl.github.io</a:t>
+            </a:r>
+            <a:r>
+              <a:rPr lang="en-GB" sz="3200" dirty="0"/>
               <a:t> </a:t>
             </a:r>
-            <a:endParaRPr lang="en-GB" sz="3200" dirty="0"/>
           </a:p>
         </p:txBody>
       </p:sp>
@@ -4951,13 +4886,6 @@
   <p:clrMapOvr>
     <a:masterClrMapping/>
   </p:clrMapOvr>
-  <p:timing>
-    <p:tnLst>
-      <p:par>
-        <p:cTn xmlns:p14="http://schemas.microsoft.com/office/powerpoint/2010/main" id="1" dur="indefinite" restart="never" nodeType="tmRoot"/>
-      </p:par>
-    </p:tnLst>
-  </p:timing>
 </p:sld>
 </file>
 
@@ -4994,10 +4922,9 @@
           <a:lstStyle/>
           <a:p>
             <a:r>
-              <a:rPr lang="en-GB" dirty="0" smtClean="0"/>
+              <a:rPr lang="en-GB" dirty="0"/>
               <a:t>Other useful resources</a:t>
             </a:r>
-            <a:endParaRPr lang="en-GB" dirty="0"/>
           </a:p>
         </p:txBody>
       </p:sp>
@@ -5019,40 +4946,40 @@
           <a:lstStyle/>
           <a:p>
             <a:r>
-              <a:rPr lang="en-GB" dirty="0" smtClean="0"/>
+              <a:rPr lang="en-GB" dirty="0"/>
               <a:t>Lots of OpenCL examples in the SDKs from the vendors:</a:t>
             </a:r>
           </a:p>
           <a:p>
             <a:pPr lvl="1"/>
             <a:r>
-              <a:rPr lang="en-GB" dirty="0" smtClean="0"/>
+              <a:rPr lang="en-GB" dirty="0"/>
               <a:t> AMD, Intel, </a:t>
             </a:r>
             <a:r>
-              <a:rPr lang="en-GB" dirty="0" err="1" smtClean="0"/>
+              <a:rPr lang="en-GB" dirty="0" err="1"/>
               <a:t>Nvidia</a:t>
             </a:r>
             <a:r>
-              <a:rPr lang="en-GB" dirty="0" smtClean="0"/>
+              <a:rPr lang="en-GB" dirty="0"/>
               <a:t>, …</a:t>
             </a:r>
           </a:p>
           <a:p>
             <a:pPr lvl="1"/>
-            <a:endParaRPr lang="en-GB" dirty="0" smtClean="0"/>
-          </a:p>
-          <a:p>
-            <a:r>
-              <a:rPr lang="en-GB" dirty="0" smtClean="0"/>
+            <a:endParaRPr lang="en-GB" dirty="0"/>
+          </a:p>
+          <a:p>
+            <a:r>
+              <a:rPr lang="en-GB" dirty="0"/>
               <a:t>The </a:t>
             </a:r>
             <a:r>
-              <a:rPr lang="en-GB" dirty="0" err="1" smtClean="0"/>
+              <a:rPr lang="en-GB" dirty="0" err="1"/>
               <a:t>BabelStream</a:t>
             </a:r>
             <a:r>
-              <a:rPr lang="en-GB" dirty="0" smtClean="0"/>
+              <a:rPr lang="en-GB" dirty="0"/>
               <a:t> benchmark:</a:t>
             </a:r>
           </a:p>
@@ -5062,23 +4989,17 @@
               <a:rPr lang="en-GB" dirty="0">
                 <a:hlinkClick r:id="rId2"/>
               </a:rPr>
-              <a:t>http://uob-hpc.github.io/BabelStream</a:t>
-            </a:r>
-            <a:r>
-              <a:rPr lang="en-GB" dirty="0" smtClean="0">
-                <a:hlinkClick r:id="rId2"/>
-              </a:rPr>
-              <a:t>/</a:t>
-            </a:r>
-            <a:endParaRPr lang="en-GB" dirty="0" smtClean="0"/>
+              <a:t>http://uob-hpc.github.io/BabelStream/</a:t>
+            </a:r>
+            <a:endParaRPr lang="en-GB" dirty="0"/>
           </a:p>
           <a:p>
             <a:pPr lvl="1"/>
-            <a:endParaRPr lang="en-GB" dirty="0" smtClean="0"/>
-          </a:p>
-          <a:p>
-            <a:r>
-              <a:rPr lang="en-GB" dirty="0" smtClean="0"/>
+            <a:endParaRPr lang="en-GB" dirty="0"/>
+          </a:p>
+          <a:p>
+            <a:r>
+              <a:rPr lang="en-GB" dirty="0"/>
               <a:t>The SHOC OpenCL/CUDA benchmark suite (available as source code):</a:t>
             </a:r>
           </a:p>
@@ -5088,15 +5009,9 @@
               <a:rPr lang="en-GB" dirty="0">
                 <a:hlinkClick r:id="rId3"/>
               </a:rPr>
-              <a:t>https://github.com/vetter/shoc/</a:t>
-            </a:r>
-            <a:r>
-              <a:rPr lang="en-GB" dirty="0" smtClean="0">
-                <a:hlinkClick r:id="rId3"/>
-              </a:rPr>
-              <a:t>wiki</a:t>
-            </a:r>
-            <a:endParaRPr lang="en-GB" dirty="0" smtClean="0"/>
+              <a:t>https://github.com/vetter/shoc/wiki</a:t>
+            </a:r>
+            <a:endParaRPr lang="en-GB" dirty="0"/>
           </a:p>
           <a:p>
             <a:endParaRPr lang="en-GB" dirty="0"/>
@@ -5113,13 +5028,6 @@
   <p:clrMapOvr>
     <a:masterClrMapping/>
   </p:clrMapOvr>
-  <p:timing>
-    <p:tnLst>
-      <p:par>
-        <p:cTn xmlns:p14="http://schemas.microsoft.com/office/powerpoint/2010/main" id="1" dur="indefinite" restart="never" nodeType="tmRoot"/>
-      </p:par>
-    </p:tnLst>
-  </p:timing>
 </p:sld>
 </file>
 
@@ -5156,10 +5064,9 @@
           <a:lstStyle/>
           <a:p>
             <a:r>
-              <a:rPr lang="en-GB" dirty="0" smtClean="0"/>
+              <a:rPr lang="en-GB" dirty="0"/>
               <a:t>Other useful resources</a:t>
             </a:r>
-            <a:endParaRPr lang="en-GB" dirty="0"/>
           </a:p>
         </p:txBody>
       </p:sp>
@@ -5179,7 +5086,7 @@
           <a:lstStyle/>
           <a:p>
             <a:r>
-              <a:rPr lang="en-GB" dirty="0" smtClean="0"/>
+              <a:rPr lang="en-GB" dirty="0"/>
               <a:t>IWOCL webpage &amp; newsletter:</a:t>
             </a:r>
           </a:p>
@@ -5189,15 +5096,9 @@
               <a:rPr lang="en-GB" dirty="0">
                 <a:hlinkClick r:id="rId2"/>
               </a:rPr>
-              <a:t>http://</a:t>
-            </a:r>
-            <a:r>
-              <a:rPr lang="en-GB" dirty="0" smtClean="0">
-                <a:hlinkClick r:id="rId2"/>
-              </a:rPr>
-              <a:t>www.iwocl.org</a:t>
-            </a:r>
-            <a:endParaRPr lang="en-GB" dirty="0" smtClean="0"/>
+              <a:t>http://www.iwocl.org</a:t>
+            </a:r>
+            <a:endParaRPr lang="en-GB" dirty="0"/>
           </a:p>
           <a:p>
             <a:pPr lvl="1"/>
@@ -5205,15 +5106,9 @@
               <a:rPr lang="en-GB" dirty="0">
                 <a:hlinkClick r:id="rId3"/>
               </a:rPr>
-              <a:t>http://www.iwocl.org/signup-for-updates</a:t>
-            </a:r>
-            <a:r>
-              <a:rPr lang="en-GB" dirty="0" smtClean="0">
-                <a:hlinkClick r:id="rId3"/>
-              </a:rPr>
-              <a:t>/</a:t>
-            </a:r>
-            <a:endParaRPr lang="en-GB" dirty="0" smtClean="0"/>
+              <a:t>http://www.iwocl.org/signup-for-updates/</a:t>
+            </a:r>
+            <a:endParaRPr lang="en-GB" dirty="0"/>
           </a:p>
           <a:p>
             <a:pPr lvl="1"/>
@@ -5221,14 +5116,14 @@
           </a:p>
           <a:p>
             <a:r>
-              <a:rPr lang="en-GB" dirty="0" smtClean="0"/>
+              <a:rPr lang="en-GB" dirty="0"/>
               <a:t>IWOCL annual conference</a:t>
             </a:r>
           </a:p>
           <a:p>
             <a:pPr lvl="1"/>
             <a:r>
-              <a:rPr lang="en-GB" dirty="0" smtClean="0"/>
+              <a:rPr lang="en-GB" dirty="0"/>
               <a:t>May each year</a:t>
             </a:r>
           </a:p>
@@ -5247,13 +5142,6 @@
   <p:clrMapOvr>
     <a:masterClrMapping/>
   </p:clrMapOvr>
-  <p:timing>
-    <p:tnLst>
-      <p:par>
-        <p:cTn xmlns:p14="http://schemas.microsoft.com/office/powerpoint/2010/main" id="1" dur="indefinite" restart="never" nodeType="tmRoot"/>
-      </p:par>
-    </p:tnLst>
-  </p:timing>
 </p:sld>
 </file>
 
@@ -5290,10 +5178,9 @@
           <a:lstStyle/>
           <a:p>
             <a:r>
-              <a:rPr lang="en-GB" dirty="0" smtClean="0"/>
+              <a:rPr lang="en-GB" dirty="0"/>
               <a:t>Some Concluding remarks</a:t>
             </a:r>
-            <a:endParaRPr lang="en-GB" dirty="0"/>
           </a:p>
         </p:txBody>
       </p:sp>
@@ -5307,13 +5194,6 @@
   <p:clrMapOvr>
     <a:masterClrMapping/>
   </p:clrMapOvr>
-  <p:timing>
-    <p:tnLst>
-      <p:par>
-        <p:cTn xmlns:p14="http://schemas.microsoft.com/office/powerpoint/2010/main" id="1" dur="indefinite" restart="never" nodeType="tmRoot"/>
-      </p:par>
-    </p:tnLst>
-  </p:timing>
 </p:sld>
 </file>
 
@@ -5350,10 +5230,9 @@
           <a:lstStyle/>
           <a:p>
             <a:r>
-              <a:rPr lang="en-GB" dirty="0" smtClean="0"/>
+              <a:rPr lang="en-GB" dirty="0"/>
               <a:t>Conclusion</a:t>
             </a:r>
-            <a:endParaRPr lang="en-GB" dirty="0"/>
           </a:p>
         </p:txBody>
       </p:sp>
@@ -5386,11 +5265,7 @@
             </a:pPr>
             <a:r>
               <a:rPr lang="en-GB" dirty="0"/>
-              <a:t>OpenCL has </a:t>
-            </a:r>
-            <a:r>
-              <a:rPr lang="en-GB" dirty="0" smtClean="0"/>
-              <a:t>increasingly widespread industrial support</a:t>
+              <a:t>OpenCL has increasingly widespread industrial support</a:t>
             </a:r>
           </a:p>
           <a:p>
@@ -5409,15 +5284,7 @@
             </a:pPr>
             <a:r>
               <a:rPr lang="en-GB" dirty="0"/>
-              <a:t>OpenCL defines a platform-API/framework for heterogeneous </a:t>
-            </a:r>
-            <a:r>
-              <a:rPr lang="en-GB" dirty="0" smtClean="0"/>
-              <a:t>parallel computing, </a:t>
-            </a:r>
-            <a:r>
-              <a:rPr lang="en-GB" dirty="0"/>
-              <a:t>not just GPGPU or CPU-offload programming</a:t>
+              <a:t>OpenCL defines a platform-API/framework for heterogeneous parallel computing, not just GPGPU or CPU-offload programming</a:t>
             </a:r>
           </a:p>
           <a:p>
@@ -5463,23 +5330,7 @@
             </a:pPr>
             <a:r>
               <a:rPr lang="en-GB" dirty="0"/>
-              <a:t>The latest </a:t>
-            </a:r>
-            <a:r>
-              <a:rPr lang="en-GB" dirty="0" smtClean="0"/>
-              <a:t>APIs such as C</a:t>
-            </a:r>
-            <a:r>
-              <a:rPr lang="en-GB" dirty="0"/>
-              <a:t>++ </a:t>
-            </a:r>
-            <a:r>
-              <a:rPr lang="en-GB" dirty="0" smtClean="0"/>
-              <a:t>and Python make </a:t>
-            </a:r>
-            <a:r>
-              <a:rPr lang="en-GB" dirty="0"/>
-              <a:t>developing OpenCL programs much simpler than before</a:t>
+              <a:t>The latest APIs such as C++ and Python make developing OpenCL programs much simpler than before</a:t>
             </a:r>
           </a:p>
           <a:p>
@@ -5497,11 +5348,11 @@
               </a:lnSpc>
             </a:pPr>
             <a:r>
-              <a:rPr lang="en-GB" dirty="0" smtClean="0"/>
+              <a:rPr lang="en-GB" dirty="0"/>
               <a:t>OpenCL is the </a:t>
             </a:r>
             <a:r>
-              <a:rPr lang="en-GB" sz="3800" dirty="0" smtClean="0">
+              <a:rPr lang="en-GB" sz="3800" dirty="0">
                 <a:solidFill>
                   <a:schemeClr val="accent2"/>
                 </a:solidFill>
@@ -5509,19 +5360,11 @@
               <a:t>only </a:t>
             </a:r>
             <a:r>
-              <a:rPr lang="en-GB" dirty="0" smtClean="0"/>
-              <a:t>parallel programming standard that enables mixing </a:t>
-            </a:r>
-            <a:r>
-              <a:rPr lang="en-GB" dirty="0"/>
-              <a:t>task parallel and data parallel code in a single program </a:t>
-            </a:r>
-            <a:r>
-              <a:rPr lang="en-GB" dirty="0" smtClean="0"/>
-              <a:t>while load balancing across </a:t>
-            </a:r>
-            <a:r>
-              <a:rPr lang="en-GB" sz="3800" dirty="0" smtClean="0">
+              <a:rPr lang="en-GB" dirty="0"/>
+              <a:t>parallel programming standard that enables mixing task parallel and data parallel code in a single program while load balancing across </a:t>
+            </a:r>
+            <a:r>
+              <a:rPr lang="en-GB" sz="3800" dirty="0">
                 <a:solidFill>
                   <a:schemeClr val="accent4">
                     <a:lumMod val="50000"/>
@@ -5555,13 +5398,6 @@
   <p:clrMapOvr>
     <a:masterClrMapping/>
   </p:clrMapOvr>
-  <p:timing>
-    <p:tnLst>
-      <p:par>
-        <p:cTn xmlns:p14="http://schemas.microsoft.com/office/powerpoint/2010/main" id="1" dur="indefinite" restart="never" nodeType="tmRoot"/>
-      </p:par>
-    </p:tnLst>
-  </p:timing>
 </p:sld>
 </file>
 
@@ -5598,11 +5434,11 @@
           <a:lstStyle/>
           <a:p>
             <a:r>
-              <a:rPr lang="en-GB" dirty="0" smtClean="0"/>
+              <a:rPr lang="en-GB" dirty="0"/>
               <a:t>Versions of </a:t>
             </a:r>
             <a:r>
-              <a:rPr lang="en-GB" dirty="0" err="1" smtClean="0"/>
+              <a:rPr lang="en-GB" dirty="0" err="1"/>
               <a:t>opencl</a:t>
             </a:r>
             <a:endParaRPr lang="en-GB" dirty="0"/>
@@ -5638,13 +5474,6 @@
   <p:clrMapOvr>
     <a:masterClrMapping/>
   </p:clrMapOvr>
-  <p:timing>
-    <p:tnLst>
-      <p:par>
-        <p:cTn xmlns:p14="http://schemas.microsoft.com/office/powerpoint/2010/main" id="1" dur="indefinite" restart="never" nodeType="tmRoot"/>
-      </p:par>
-    </p:tnLst>
-  </p:timing>
 </p:sld>
 </file>
 
@@ -5681,10 +5510,9 @@
           <a:lstStyle/>
           <a:p>
             <a:r>
-              <a:rPr lang="en-GB" dirty="0" smtClean="0"/>
+              <a:rPr lang="en-GB" dirty="0"/>
               <a:t>OpenCL 1.0</a:t>
             </a:r>
-            <a:endParaRPr lang="en-GB" dirty="0"/>
           </a:p>
         </p:txBody>
       </p:sp>
@@ -5704,10 +5532,9 @@
           <a:lstStyle/>
           <a:p>
             <a:r>
-              <a:rPr lang="en-GB" dirty="0" smtClean="0"/>
+              <a:rPr lang="en-GB" dirty="0"/>
               <a:t>First public release, December 2008</a:t>
             </a:r>
-            <a:endParaRPr lang="en-GB" dirty="0"/>
           </a:p>
         </p:txBody>
       </p:sp>
@@ -5721,13 +5548,6 @@
   <p:clrMapOvr>
     <a:masterClrMapping/>
   </p:clrMapOvr>
-  <p:timing>
-    <p:tnLst>
-      <p:par>
-        <p:cTn xmlns:p14="http://schemas.microsoft.com/office/powerpoint/2010/main" id="1" dur="indefinite" restart="never" nodeType="tmRoot"/>
-      </p:par>
-    </p:tnLst>
-  </p:timing>
 </p:sld>
 </file>
 
@@ -5764,10 +5584,9 @@
           <a:lstStyle/>
           <a:p>
             <a:r>
-              <a:rPr lang="en-GB" dirty="0" smtClean="0"/>
+              <a:rPr lang="en-GB" dirty="0"/>
               <a:t>OpenCL 1.1</a:t>
             </a:r>
-            <a:endParaRPr lang="en-GB" dirty="0"/>
           </a:p>
         </p:txBody>
       </p:sp>
@@ -5787,41 +5606,41 @@
           <a:lstStyle/>
           <a:p>
             <a:r>
-              <a:rPr lang="en-GB" dirty="0" smtClean="0"/>
+              <a:rPr lang="en-GB" dirty="0"/>
               <a:t>Released June 2010</a:t>
             </a:r>
           </a:p>
           <a:p>
             <a:r>
-              <a:rPr lang="en-GB" dirty="0" smtClean="0"/>
+              <a:rPr lang="en-GB" dirty="0"/>
               <a:t>Major new features:</a:t>
             </a:r>
           </a:p>
           <a:p>
             <a:pPr lvl="1"/>
             <a:r>
-              <a:rPr lang="en-GB" dirty="0" smtClean="0"/>
+              <a:rPr lang="en-GB" dirty="0"/>
               <a:t>Sub buffers</a:t>
             </a:r>
           </a:p>
           <a:p>
             <a:pPr lvl="1"/>
             <a:r>
-              <a:rPr lang="en-GB" dirty="0" smtClean="0"/>
+              <a:rPr lang="en-GB" dirty="0"/>
               <a:t>User events</a:t>
             </a:r>
           </a:p>
           <a:p>
             <a:pPr lvl="1"/>
             <a:r>
-              <a:rPr lang="en-GB" dirty="0" smtClean="0"/>
+              <a:rPr lang="en-GB" dirty="0"/>
               <a:t>More built-in functions</a:t>
             </a:r>
           </a:p>
           <a:p>
             <a:pPr lvl="1"/>
             <a:r>
-              <a:rPr lang="en-GB" dirty="0" smtClean="0"/>
+              <a:rPr lang="en-GB" dirty="0"/>
               <a:t>32-bit atomics become core features</a:t>
             </a:r>
           </a:p>
@@ -5841,13 +5660,6 @@
   <p:clrMapOvr>
     <a:masterClrMapping/>
   </p:clrMapOvr>
-  <p:timing>
-    <p:tnLst>
-      <p:par>
-        <p:cTn xmlns:p14="http://schemas.microsoft.com/office/powerpoint/2010/main" id="1" dur="indefinite" restart="never" nodeType="tmRoot"/>
-      </p:par>
-    </p:tnLst>
-  </p:timing>
 </p:sld>
 </file>
 
@@ -5884,10 +5696,9 @@
           <a:lstStyle/>
           <a:p>
             <a:r>
-              <a:rPr lang="en-GB" dirty="0" smtClean="0"/>
+              <a:rPr lang="en-GB" dirty="0"/>
               <a:t>OpenCL 1.2</a:t>
             </a:r>
-            <a:endParaRPr lang="en-GB" dirty="0"/>
           </a:p>
         </p:txBody>
       </p:sp>
@@ -5907,13 +5718,13 @@
           <a:lstStyle/>
           <a:p>
             <a:r>
-              <a:rPr lang="en-GB" dirty="0" smtClean="0"/>
+              <a:rPr lang="en-GB" dirty="0"/>
               <a:t>Released November 2011</a:t>
             </a:r>
           </a:p>
           <a:p>
             <a:r>
-              <a:rPr lang="en-GB" dirty="0" smtClean="0"/>
+              <a:rPr lang="en-GB" dirty="0"/>
               <a:t>Major new features:</a:t>
             </a:r>
           </a:p>
@@ -5921,17 +5732,13 @@
             <a:pPr lvl="1"/>
             <a:r>
               <a:rPr lang="en-GB" dirty="0"/>
-              <a:t>Custom devices and built-in </a:t>
-            </a:r>
-            <a:r>
-              <a:rPr lang="en-GB" dirty="0" smtClean="0"/>
-              <a:t>kernels</a:t>
+              <a:t>Custom devices and built-in kernels</a:t>
             </a:r>
           </a:p>
           <a:p>
             <a:pPr lvl="1"/>
             <a:r>
-              <a:rPr lang="en-GB" dirty="0" smtClean="0"/>
+              <a:rPr lang="en-GB" dirty="0"/>
               <a:t>Device partitioning</a:t>
             </a:r>
           </a:p>
@@ -5939,21 +5746,15 @@
             <a:pPr lvl="1"/>
             <a:r>
               <a:rPr lang="en-GB" dirty="0"/>
-              <a:t>Support separate compilation and linking of </a:t>
-            </a:r>
-            <a:r>
-              <a:rPr lang="en-GB" dirty="0" smtClean="0"/>
-              <a:t>programs</a:t>
-            </a:r>
-            <a:endParaRPr lang="en-GB" dirty="0"/>
+              <a:t>Support separate compilation and linking of programs</a:t>
+            </a:r>
           </a:p>
           <a:p>
             <a:pPr lvl="1"/>
             <a:r>
-              <a:rPr lang="en-GB" dirty="0" smtClean="0"/>
+              <a:rPr lang="en-GB" dirty="0"/>
               <a:t>Greater support for OpenCL libraries</a:t>
             </a:r>
-            <a:endParaRPr lang="en-GB" dirty="0"/>
           </a:p>
         </p:txBody>
       </p:sp>
@@ -5967,13 +5768,6 @@
   <p:clrMapOvr>
     <a:masterClrMapping/>
   </p:clrMapOvr>
-  <p:timing>
-    <p:tnLst>
-      <p:par>
-        <p:cTn xmlns:p14="http://schemas.microsoft.com/office/powerpoint/2010/main" id="1" dur="indefinite" restart="never" nodeType="tmRoot"/>
-      </p:par>
-    </p:tnLst>
-  </p:timing>
 </p:sld>
 </file>
 
@@ -6012,11 +5806,11 @@
           <a:lstStyle/>
           <a:p>
             <a:r>
-              <a:rPr lang="en-US" dirty="0" smtClean="0"/>
+              <a:rPr lang="en-US" dirty="0"/>
               <a:t>OpenCL progress</a:t>
             </a:r>
             <a:br>
-              <a:rPr lang="en-US" dirty="0" smtClean="0"/>
+              <a:rPr lang="en-US" dirty="0"/>
             </a:br>
             <a:r>
               <a:rPr lang="en-US" dirty="0"/>
@@ -6635,25 +6429,8 @@
                 <a:latin typeface="Trebuchet MS" pitchFamily="34" charset="0"/>
                 <a:cs typeface="Tahoma" pitchFamily="34" charset="0"/>
               </a:rPr>
-              <a:t>Separate compilation </a:t>
-            </a:r>
-            <a:r>
-              <a:rPr lang="en-US" sz="900" b="1" dirty="0" smtClean="0">
-                <a:solidFill>
-                  <a:schemeClr val="tx2"/>
-                </a:solidFill>
-                <a:latin typeface="Trebuchet MS" pitchFamily="34" charset="0"/>
-                <a:cs typeface="Tahoma" pitchFamily="34" charset="0"/>
-              </a:rPr>
-              <a:t>&amp; linking</a:t>
-            </a:r>
-            <a:endParaRPr lang="en-US" sz="900" b="1" dirty="0">
-              <a:solidFill>
-                <a:schemeClr val="tx2"/>
-              </a:solidFill>
-              <a:latin typeface="Trebuchet MS" pitchFamily="34" charset="0"/>
-              <a:cs typeface="Tahoma" pitchFamily="34" charset="0"/>
-            </a:endParaRPr>
+              <a:t>Separate compilation &amp; linking</a:t>
+            </a:r>
           </a:p>
           <a:p>
             <a:pPr algn="ctr"/>
@@ -6691,27 +6468,7 @@
                 <a:latin typeface="Trebuchet MS" pitchFamily="34" charset="0"/>
                 <a:cs typeface="Tahoma" pitchFamily="34" charset="0"/>
               </a:rPr>
-              <a:t>Enhanced DX </a:t>
-            </a:r>
-            <a:r>
-              <a:rPr lang="en-US" sz="900" b="1" dirty="0" smtClean="0">
-                <a:solidFill>
-                  <a:schemeClr val="tx2"/>
-                </a:solidFill>
-                <a:latin typeface="Trebuchet MS" pitchFamily="34" charset="0"/>
-                <a:cs typeface="Tahoma" pitchFamily="34" charset="0"/>
-              </a:rPr>
-              <a:t>&amp; GL </a:t>
-            </a:r>
-            <a:r>
-              <a:rPr lang="en-US" sz="900" b="1" dirty="0">
-                <a:solidFill>
-                  <a:schemeClr val="tx2"/>
-                </a:solidFill>
-                <a:latin typeface="Trebuchet MS" pitchFamily="34" charset="0"/>
-                <a:cs typeface="Tahoma" pitchFamily="34" charset="0"/>
-              </a:rPr>
-              <a:t>Interop</a:t>
+              <a:t>Enhanced DX &amp; GL Interop</a:t>
             </a:r>
           </a:p>
         </p:txBody>
@@ -7891,14 +7648,14 @@
           <a:effectLst/>
           <a:extLst>
             <a:ext uri="{909E8E84-426E-40dd-AFC4-6F175D3DCCD1}">
-              <a14:hiddenFill xmlns:a14="http://schemas.microsoft.com/office/drawing/2010/main">
+              <a14:hiddenFill xmlns:a14="http://schemas.microsoft.com/office/drawing/2010/main" xmlns="">
                 <a:solidFill>
                   <a:schemeClr val="accent1"/>
                 </a:solidFill>
               </a14:hiddenFill>
             </a:ext>
             <a:ext uri="{91240B29-F687-4f45-9708-019B960494DF}">
-              <a14:hiddenLine xmlns:a14="http://schemas.microsoft.com/office/drawing/2010/main" w="9525">
+              <a14:hiddenLine xmlns:a14="http://schemas.microsoft.com/office/drawing/2010/main" xmlns="" w="9525">
                 <a:solidFill>
                   <a:schemeClr val="tx1"/>
                 </a:solidFill>
@@ -7908,7 +7665,7 @@
               </a14:hiddenLine>
             </a:ext>
             <a:ext uri="{AF507438-7753-43e0-B8FC-AC1667EBCBE1}">
-              <a14:hiddenEffects xmlns:a14="http://schemas.microsoft.com/office/drawing/2010/main">
+              <a14:hiddenEffects xmlns:a14="http://schemas.microsoft.com/office/drawing/2010/main" xmlns="">
                 <a:effectLst>
                   <a:outerShdw dist="35921" dir="2700000" algn="ctr" rotWithShape="0">
                     <a:schemeClr val="bg2"/>
@@ -8044,16 +7801,9 @@
   <p:clrMapOvr>
     <a:masterClrMapping/>
   </p:clrMapOvr>
-  <p:transition xmlns:p14="http://schemas.microsoft.com/office/powerpoint/2010/main" spd="slow">
+  <p:transition spd="slow">
     <p:strips dir="rd"/>
   </p:transition>
-  <p:timing>
-    <p:tnLst>
-      <p:par>
-        <p:cTn xmlns:p14="http://schemas.microsoft.com/office/powerpoint/2010/main" id="1" dur="indefinite" restart="never" nodeType="tmRoot"/>
-      </p:par>
-    </p:tnLst>
-  </p:timing>
 </p:sld>
 </file>
 
@@ -8090,10 +7840,9 @@
           <a:lstStyle/>
           <a:p>
             <a:r>
-              <a:rPr lang="en-GB" dirty="0" smtClean="0"/>
+              <a:rPr lang="en-GB" dirty="0"/>
               <a:t>OpenCL 2.0</a:t>
             </a:r>
-            <a:endParaRPr lang="en-GB" dirty="0"/>
           </a:p>
         </p:txBody>
       </p:sp>
@@ -8115,102 +7864,70 @@
           <a:lstStyle/>
           <a:p>
             <a:r>
-              <a:rPr lang="en-GB" dirty="0" smtClean="0"/>
+              <a:rPr lang="en-GB" dirty="0"/>
               <a:t>Released November 2013</a:t>
             </a:r>
           </a:p>
           <a:p>
             <a:r>
-              <a:rPr lang="en-GB" dirty="0" smtClean="0"/>
+              <a:rPr lang="en-GB" dirty="0"/>
               <a:t>Major new features:</a:t>
             </a:r>
           </a:p>
           <a:p>
             <a:pPr lvl="1"/>
             <a:r>
-              <a:rPr lang="en-GB" dirty="0" smtClean="0"/>
+              <a:rPr lang="en-GB" dirty="0"/>
               <a:t>Shared virtual memory (SVM)</a:t>
             </a:r>
           </a:p>
           <a:p>
             <a:pPr lvl="1"/>
             <a:r>
-              <a:rPr lang="en-GB" dirty="0" smtClean="0"/>
+              <a:rPr lang="en-GB" dirty="0"/>
               <a:t>Dynamic parallelism</a:t>
             </a:r>
           </a:p>
           <a:p>
             <a:pPr lvl="1"/>
             <a:r>
-              <a:rPr lang="en-GB" dirty="0" smtClean="0"/>
+              <a:rPr lang="en-GB" dirty="0"/>
               <a:t>Pipes</a:t>
             </a:r>
           </a:p>
           <a:p>
             <a:pPr lvl="1"/>
             <a:r>
-              <a:rPr lang="en-GB" dirty="0" smtClean="0"/>
-              <a:t>Built</a:t>
-            </a:r>
-            <a:r>
-              <a:rPr lang="en-GB" dirty="0"/>
-              <a:t>-in reductions/</a:t>
-            </a:r>
-            <a:r>
-              <a:rPr lang="en-GB" dirty="0" smtClean="0"/>
-              <a:t>broadcasts</a:t>
-            </a:r>
-            <a:endParaRPr lang="en-GB" dirty="0"/>
+              <a:rPr lang="en-GB" dirty="0"/>
+              <a:t>Built-in reductions/broadcasts</a:t>
+            </a:r>
           </a:p>
           <a:p>
             <a:pPr lvl="1"/>
             <a:r>
-              <a:rPr lang="en-GB" dirty="0" smtClean="0"/>
-              <a:t>Sub</a:t>
-            </a:r>
-            <a:r>
-              <a:rPr lang="en-GB" dirty="0"/>
-              <a:t>-</a:t>
-            </a:r>
-            <a:r>
-              <a:rPr lang="en-GB" dirty="0" smtClean="0"/>
-              <a:t>groups</a:t>
-            </a:r>
-            <a:endParaRPr lang="en-GB" dirty="0"/>
+              <a:rPr lang="en-GB" dirty="0"/>
+              <a:t>Sub-groups</a:t>
+            </a:r>
           </a:p>
           <a:p>
             <a:pPr lvl="1"/>
             <a:r>
-              <a:rPr lang="en-GB" dirty="0" smtClean="0"/>
-              <a:t>"</a:t>
-            </a:r>
-            <a:r>
-              <a:rPr lang="en-GB" dirty="0"/>
-              <a:t>generic" address </a:t>
-            </a:r>
-            <a:r>
-              <a:rPr lang="en-GB" dirty="0" smtClean="0"/>
-              <a:t>space</a:t>
-            </a:r>
-            <a:endParaRPr lang="en-GB" dirty="0"/>
+              <a:rPr lang="en-GB" dirty="0"/>
+              <a:t>"generic" address space</a:t>
+            </a:r>
           </a:p>
           <a:p>
             <a:pPr lvl="1"/>
             <a:r>
-              <a:rPr lang="en-GB" dirty="0" smtClean="0"/>
+              <a:rPr lang="en-GB" dirty="0"/>
               <a:t>C11 atomics</a:t>
             </a:r>
-            <a:endParaRPr lang="en-GB" dirty="0"/>
           </a:p>
           <a:p>
             <a:pPr lvl="1"/>
             <a:r>
-              <a:rPr lang="en-GB" dirty="0" smtClean="0"/>
-              <a:t>More </a:t>
-            </a:r>
-            <a:r>
-              <a:rPr lang="en-GB" dirty="0"/>
-              <a:t>image support</a:t>
+              <a:rPr lang="en-GB" dirty="0"/>
+              <a:t>More image support</a:t>
             </a:r>
           </a:p>
         </p:txBody>
@@ -8225,13 +7942,6 @@
   <p:clrMapOvr>
     <a:masterClrMapping/>
   </p:clrMapOvr>
-  <p:timing>
-    <p:tnLst>
-      <p:par>
-        <p:cTn xmlns:p14="http://schemas.microsoft.com/office/powerpoint/2010/main" id="1" dur="indefinite" restart="never" nodeType="tmRoot"/>
-      </p:par>
-    </p:tnLst>
-  </p:timing>
 </p:sld>
 </file>
 
@@ -8268,10 +7978,9 @@
           <a:lstStyle/>
           <a:p>
             <a:r>
-              <a:rPr lang="en-GB" dirty="0" smtClean="0"/>
+              <a:rPr lang="en-GB" dirty="0"/>
               <a:t>OpenCL 2.1</a:t>
             </a:r>
-            <a:endParaRPr lang="en-GB" dirty="0"/>
           </a:p>
         </p:txBody>
       </p:sp>
@@ -8303,7 +8012,7 @@
               </a:lnSpc>
             </a:pPr>
             <a:r>
-              <a:rPr lang="en-GB" dirty="0" smtClean="0"/>
+              <a:rPr lang="en-GB" dirty="0"/>
               <a:t>OpenCL 2.1 was released in Nov’15</a:t>
             </a:r>
           </a:p>
@@ -8314,7 +8023,7 @@
               </a:lnSpc>
             </a:pPr>
             <a:r>
-              <a:rPr lang="en-GB" dirty="0" smtClean="0"/>
+              <a:rPr lang="en-GB" dirty="0"/>
               <a:t>Brings several important new features:</a:t>
             </a:r>
           </a:p>
@@ -8325,7 +8034,7 @@
               </a:lnSpc>
             </a:pPr>
             <a:r>
-              <a:rPr lang="en-GB" dirty="0" smtClean="0"/>
+              <a:rPr lang="en-GB" dirty="0"/>
               <a:t>SPIR-V in core</a:t>
             </a:r>
           </a:p>
@@ -8336,7 +8045,7 @@
               </a:lnSpc>
             </a:pPr>
             <a:r>
-              <a:rPr lang="en-GB" dirty="0" smtClean="0"/>
+              <a:rPr lang="en-GB" dirty="0"/>
               <a:t>Subgroups in core</a:t>
             </a:r>
           </a:p>
@@ -8347,10 +8056,10 @@
               </a:lnSpc>
             </a:pPr>
             <a:r>
-              <a:rPr lang="en-GB" dirty="0" err="1" smtClean="0"/>
+              <a:rPr lang="en-GB" dirty="0" err="1"/>
               <a:t>clCloneKernel</a:t>
             </a:r>
-            <a:endParaRPr lang="en-GB" dirty="0" smtClean="0"/>
+            <a:endParaRPr lang="en-GB" dirty="0"/>
           </a:p>
           <a:p>
             <a:pPr lvl="1">
@@ -8359,7 +8068,7 @@
               </a:lnSpc>
             </a:pPr>
             <a:r>
-              <a:rPr lang="en-GB" dirty="0" smtClean="0"/>
+              <a:rPr lang="en-GB" dirty="0"/>
               <a:t>Low-latency device timers</a:t>
             </a:r>
           </a:p>
@@ -8370,16 +8079,16 @@
               </a:lnSpc>
             </a:pPr>
             <a:r>
-              <a:rPr lang="en-GB" dirty="0" smtClean="0"/>
+              <a:rPr lang="en-GB" dirty="0"/>
               <a:t>Specification and headers available </a:t>
             </a:r>
             <a:r>
-              <a:rPr lang="en-GB" dirty="0" smtClean="0">
+              <a:rPr lang="en-GB" dirty="0">
                 <a:hlinkClick r:id="rId2"/>
               </a:rPr>
               <a:t>here</a:t>
             </a:r>
-            <a:endParaRPr lang="en-GB" dirty="0" smtClean="0"/>
+            <a:endParaRPr lang="en-GB" dirty="0"/>
           </a:p>
           <a:p>
             <a:pPr>
@@ -8388,7 +8097,7 @@
               </a:lnSpc>
             </a:pPr>
             <a:r>
-              <a:rPr lang="en-GB" dirty="0" smtClean="0"/>
+              <a:rPr lang="en-GB" dirty="0"/>
               <a:t>Drivers starting to appear, with more expected to follow</a:t>
             </a:r>
           </a:p>
@@ -8404,13 +8113,6 @@
   <p:clrMapOvr>
     <a:masterClrMapping/>
   </p:clrMapOvr>
-  <p:timing>
-    <p:tnLst>
-      <p:par>
-        <p:cTn xmlns:p14="http://schemas.microsoft.com/office/powerpoint/2010/main" id="1" dur="indefinite" restart="never" nodeType="tmRoot"/>
-      </p:par>
-    </p:tnLst>
-  </p:timing>
 </p:sld>
 </file>
 
@@ -8447,10 +8149,9 @@
           <a:lstStyle/>
           <a:p>
             <a:r>
-              <a:rPr lang="en-GB" dirty="0" smtClean="0"/>
+              <a:rPr lang="en-GB" dirty="0"/>
               <a:t>OpenCL progression</a:t>
             </a:r>
-            <a:endParaRPr lang="en-GB" dirty="0"/>
           </a:p>
         </p:txBody>
       </p:sp>
@@ -8524,41 +8225,47 @@
           <a:lstStyle/>
           <a:p>
             <a:r>
-              <a:rPr lang="en-US" dirty="0" smtClean="0"/>
+              <a:rPr lang="en-US" dirty="0"/>
               <a:t>OpenCL 2.2</a:t>
             </a:r>
+          </a:p>
+        </p:txBody>
+      </p:sp>
+      <p:sp>
+        <p:nvSpPr>
+          <p:cNvPr id="3" name="Content Placeholder 2"/>
+          <p:cNvSpPr>
+            <a:spLocks noGrp="1"/>
+          </p:cNvSpPr>
+          <p:nvPr>
+            <p:ph idx="1"/>
+          </p:nvPr>
+        </p:nvSpPr>
+        <p:spPr/>
+        <p:txBody>
+          <a:bodyPr>
+            <a:normAutofit fontScale="92500" lnSpcReduction="20000"/>
+          </a:bodyPr>
+          <a:lstStyle/>
+          <a:p>
+            <a:r>
+              <a:rPr lang="en-US" dirty="0"/>
+              <a:t>Released at IWOCL 2017</a:t>
+            </a:r>
+          </a:p>
+          <a:p>
+            <a:pPr lvl="1"/>
+            <a:r>
+              <a:rPr lang="en-US" dirty="0"/>
+              <a:t>Maintenance release at IWOCL 2018</a:t>
+            </a:r>
+          </a:p>
+          <a:p>
             <a:endParaRPr lang="en-US" dirty="0"/>
           </a:p>
-        </p:txBody>
-      </p:sp>
-      <p:sp>
-        <p:nvSpPr>
-          <p:cNvPr id="3" name="Content Placeholder 2"/>
-          <p:cNvSpPr>
-            <a:spLocks noGrp="1"/>
-          </p:cNvSpPr>
-          <p:nvPr>
-            <p:ph idx="1"/>
-          </p:nvPr>
-        </p:nvSpPr>
-        <p:spPr/>
-        <p:txBody>
-          <a:bodyPr>
-            <a:normAutofit lnSpcReduction="10000"/>
-          </a:bodyPr>
-          <a:lstStyle/>
-          <a:p>
-            <a:r>
-              <a:rPr lang="en-US" dirty="0" smtClean="0"/>
-              <a:t>Being released at IWOCL 2017</a:t>
-            </a:r>
-          </a:p>
-          <a:p>
-            <a:endParaRPr lang="en-US" dirty="0" smtClean="0"/>
-          </a:p>
-          <a:p>
-            <a:r>
-              <a:rPr lang="en-US" dirty="0" smtClean="0"/>
+          <a:p>
+            <a:r>
+              <a:rPr lang="en-US" dirty="0"/>
               <a:t>Big changes:</a:t>
             </a:r>
           </a:p>
@@ -8579,16 +8286,8 @@
           <a:p>
             <a:pPr lvl="1"/>
             <a:r>
-              <a:rPr lang="en-US" dirty="0" smtClean="0"/>
-              <a:t>SYCL </a:t>
-            </a:r>
-            <a:r>
               <a:rPr lang="en-US" dirty="0"/>
-              <a:t>2.2 for single source C+</a:t>
-            </a:r>
-            <a:r>
-              <a:rPr lang="en-US" dirty="0" smtClean="0"/>
-              <a:t>+</a:t>
+              <a:t>SYCL 2.2 for single source C++</a:t>
             </a:r>
           </a:p>
           <a:p>
@@ -8596,14 +8295,9 @@
           </a:p>
           <a:p>
             <a:r>
-              <a:rPr lang="en-US" dirty="0" smtClean="0"/>
-              <a:t>Specification and conformance tests now available on </a:t>
-            </a:r>
-            <a:r>
-              <a:rPr lang="en-US" dirty="0" err="1" smtClean="0"/>
-              <a:t>GitHub</a:t>
-            </a:r>
-            <a:endParaRPr lang="en-US" dirty="0" smtClean="0"/>
+              <a:rPr lang="en-US" dirty="0"/>
+              <a:t>Specification and conformance tests available on GitHub</a:t>
+            </a:r>
           </a:p>
           <a:p>
             <a:endParaRPr lang="en-US" dirty="0"/>
@@ -8624,7 +8318,7 @@
 </file>
 
 <file path=ppt/slides/slide4.xml><?xml version="1.0" encoding="utf-8"?>
-<p:sld xmlns:a="http://schemas.openxmlformats.org/drawingml/2006/main" xmlns:r="http://schemas.openxmlformats.org/officeDocument/2006/relationships" xmlns:p="http://schemas.openxmlformats.org/presentationml/2006/main">
+<p:sld xmlns:a="http://schemas.openxmlformats.org/drawingml/2006/main" xmlns:r="http://schemas.openxmlformats.org/officeDocument/2006/relationships" xmlns:p="http://schemas.openxmlformats.org/presentationml/2006/main" show="0">
   <p:cSld>
     <p:spTree>
       <p:nvGrpSpPr>
@@ -8656,10 +8350,9 @@
           <a:lstStyle/>
           <a:p>
             <a:r>
-              <a:rPr lang="en-GB" dirty="0" smtClean="0"/>
+              <a:rPr lang="en-GB" dirty="0"/>
               <a:t>OpenCL 2.x talks</a:t>
             </a:r>
-            <a:endParaRPr lang="en-GB" dirty="0"/>
           </a:p>
         </p:txBody>
       </p:sp>
@@ -8686,58 +8379,26 @@
           <a:lstStyle/>
           <a:p>
             <a:r>
-              <a:rPr lang="en-GB" dirty="0" smtClean="0"/>
-              <a:t>Tutorial: Heterogeneous </a:t>
-            </a:r>
-            <a:r>
-              <a:rPr lang="en-GB" dirty="0"/>
-              <a:t>Computing Using Modern C++ with OpenCL Devices </a:t>
-            </a:r>
-            <a:r>
-              <a:rPr lang="en-GB" dirty="0" smtClean="0"/>
-              <a:t>(Wednesday 9am)</a:t>
-            </a:r>
-          </a:p>
-          <a:p>
-            <a:r>
-              <a:rPr lang="en-GB" dirty="0" smtClean="0"/>
-              <a:t>Keynote: OpenCL </a:t>
-            </a:r>
-            <a:r>
-              <a:rPr lang="en-GB" dirty="0"/>
-              <a:t>– A State of the </a:t>
-            </a:r>
-            <a:r>
-              <a:rPr lang="en-GB" dirty="0" smtClean="0"/>
-              <a:t>Union</a:t>
-            </a:r>
-            <a:r>
-              <a:rPr lang="en-GB" dirty="0"/>
-              <a:t> (Wednesday </a:t>
-            </a:r>
-            <a:r>
-              <a:rPr lang="en-GB" dirty="0" smtClean="0"/>
-              <a:t>2pm)</a:t>
-            </a:r>
-          </a:p>
-          <a:p>
-            <a:r>
-              <a:rPr lang="en-GB" dirty="0" smtClean="0"/>
-              <a:t>Panel: What </a:t>
-            </a:r>
-            <a:r>
-              <a:rPr lang="en-GB" dirty="0"/>
-              <a:t>Next for </a:t>
-            </a:r>
-            <a:r>
-              <a:rPr lang="en-GB" dirty="0" smtClean="0"/>
-              <a:t>OpenCL? A session with the Khronos OpenCL WG</a:t>
+              <a:rPr lang="en-GB" dirty="0"/>
+              <a:t>Tutorial: Heterogeneous Computing Using Modern C++ with OpenCL Devices (Wednesday 9am)</a:t>
+            </a:r>
+          </a:p>
+          <a:p>
+            <a:r>
+              <a:rPr lang="en-GB" dirty="0"/>
+              <a:t>Keynote: OpenCL – A State of the Union (Wednesday 2pm)</a:t>
+            </a:r>
+          </a:p>
+          <a:p>
+            <a:r>
+              <a:rPr lang="en-GB" dirty="0"/>
+              <a:t>Panel: What Next for OpenCL? A session with the Khronos OpenCL WG</a:t>
             </a:r>
             <a:br>
-              <a:rPr lang="en-GB" dirty="0" smtClean="0"/>
+              <a:rPr lang="en-GB" dirty="0"/>
             </a:br>
             <a:r>
-              <a:rPr lang="en-GB" dirty="0" smtClean="0"/>
+              <a:rPr lang="en-GB" dirty="0"/>
               <a:t>(Wednesday 5pm)</a:t>
             </a:r>
           </a:p>
@@ -8753,13 +8414,6 @@
   <p:clrMapOvr>
     <a:masterClrMapping/>
   </p:clrMapOvr>
-  <p:timing>
-    <p:tnLst>
-      <p:par>
-        <p:cTn xmlns:p14="http://schemas.microsoft.com/office/powerpoint/2010/main" id="1" dur="indefinite" restart="never" nodeType="tmRoot"/>
-      </p:par>
-    </p:tnLst>
-  </p:timing>
 </p:sld>
 </file>
 
@@ -8796,10 +8450,9 @@
           <a:lstStyle/>
           <a:p>
             <a:r>
-              <a:rPr lang="en-GB" dirty="0" smtClean="0"/>
+              <a:rPr lang="en-GB" dirty="0"/>
               <a:t>SPIR</a:t>
             </a:r>
-            <a:endParaRPr lang="en-GB" dirty="0"/>
           </a:p>
         </p:txBody>
       </p:sp>
@@ -8831,12 +8484,12 @@
               </a:lnSpc>
             </a:pPr>
             <a:r>
-              <a:rPr lang="en-GB" dirty="0" smtClean="0">
+              <a:rPr lang="en-GB" dirty="0">
                 <a:hlinkClick r:id="rId2"/>
               </a:rPr>
               <a:t>Standard Portable Intermediate Representation</a:t>
             </a:r>
-            <a:endParaRPr lang="en-GB" dirty="0" smtClean="0"/>
+            <a:endParaRPr lang="en-GB" dirty="0"/>
           </a:p>
           <a:p>
             <a:pPr>
@@ -8845,7 +8498,7 @@
               </a:lnSpc>
             </a:pPr>
             <a:r>
-              <a:rPr lang="en-GB" dirty="0" smtClean="0"/>
+              <a:rPr lang="en-GB" dirty="0"/>
               <a:t>Defines an IR for OpenCL programs</a:t>
             </a:r>
           </a:p>
@@ -8856,7 +8509,7 @@
               </a:lnSpc>
             </a:pPr>
             <a:r>
-              <a:rPr lang="en-GB" dirty="0" smtClean="0"/>
+              <a:rPr lang="en-GB" dirty="0"/>
               <a:t>Means that developers can ship portable binaries instead of their OpenCL source</a:t>
             </a:r>
           </a:p>
@@ -8867,15 +8520,15 @@
               </a:lnSpc>
             </a:pPr>
             <a:r>
-              <a:rPr lang="en-GB" dirty="0" smtClean="0"/>
+              <a:rPr lang="en-GB" dirty="0"/>
               <a:t>Also intended to be a target for other languages/programming models (C++ AMP, SYCL, </a:t>
             </a:r>
             <a:r>
-              <a:rPr lang="en-GB" dirty="0" err="1" smtClean="0"/>
+              <a:rPr lang="en-GB" dirty="0" err="1"/>
               <a:t>OpenACC</a:t>
             </a:r>
             <a:r>
-              <a:rPr lang="en-GB" dirty="0" smtClean="0"/>
+              <a:rPr lang="en-GB" dirty="0"/>
               <a:t>, DSLs)</a:t>
             </a:r>
           </a:p>
@@ -8886,7 +8539,7 @@
               </a:lnSpc>
             </a:pPr>
             <a:r>
-              <a:rPr lang="en-GB" dirty="0" smtClean="0"/>
+              <a:rPr lang="en-GB" dirty="0"/>
               <a:t>SPIR-V ratified March 2016</a:t>
             </a:r>
           </a:p>
@@ -8897,10 +8550,9 @@
               </a:lnSpc>
             </a:pPr>
             <a:r>
-              <a:rPr lang="en-GB" dirty="0" smtClean="0"/>
+              <a:rPr lang="en-GB" dirty="0"/>
               <a:t>Open source SPIR-V tools on Khronos website</a:t>
             </a:r>
-            <a:endParaRPr lang="en-GB" dirty="0"/>
           </a:p>
         </p:txBody>
       </p:sp>
@@ -8941,21 +8593,6 @@
   <p:clrMapOvr>
     <a:masterClrMapping/>
   </p:clrMapOvr>
-  <mc:AlternateContent xmlns:mc="http://schemas.openxmlformats.org/markup-compatibility/2006" xmlns:p14="http://schemas.microsoft.com/office/powerpoint/2010/main">
-    <mc:Choice Requires="p14">
-      <p:transition spd="slow" p14:dur="2000"/>
-    </mc:Choice>
-    <mc:Fallback xmlns="">
-      <p:transition spd="slow"/>
-    </mc:Fallback>
-  </mc:AlternateContent>
-  <p:timing>
-    <p:tnLst>
-      <p:par>
-        <p:cTn xmlns:p14="http://schemas.microsoft.com/office/powerpoint/2010/main" id="1" dur="indefinite" restart="never" nodeType="tmRoot"/>
-      </p:par>
-    </p:tnLst>
-  </p:timing>
 </p:sld>
 </file>
 
@@ -8992,10 +8629,9 @@
           <a:lstStyle/>
           <a:p>
             <a:r>
-              <a:rPr lang="en-GB" dirty="0" smtClean="0"/>
+              <a:rPr lang="en-GB" dirty="0"/>
               <a:t>SPIR</a:t>
             </a:r>
-            <a:endParaRPr lang="en-GB" dirty="0"/>
           </a:p>
         </p:txBody>
       </p:sp>
@@ -9060,21 +8696,6 @@
   <p:clrMapOvr>
     <a:masterClrMapping/>
   </p:clrMapOvr>
-  <mc:AlternateContent xmlns:mc="http://schemas.openxmlformats.org/markup-compatibility/2006" xmlns:p14="http://schemas.microsoft.com/office/powerpoint/2010/main">
-    <mc:Choice Requires="p14">
-      <p:transition spd="slow" p14:dur="2000"/>
-    </mc:Choice>
-    <mc:Fallback xmlns="">
-      <p:transition spd="slow"/>
-    </mc:Fallback>
-  </mc:AlternateContent>
-  <p:timing>
-    <p:tnLst>
-      <p:par>
-        <p:cTn xmlns:p14="http://schemas.microsoft.com/office/powerpoint/2010/main" id="1" dur="indefinite" restart="never" nodeType="tmRoot"/>
-      </p:par>
-    </p:tnLst>
-  </p:timing>
 </p:sld>
 </file>
 
@@ -9111,10 +8732,9 @@
           <a:lstStyle/>
           <a:p>
             <a:r>
-              <a:rPr lang="en-GB" dirty="0" smtClean="0"/>
+              <a:rPr lang="en-GB" dirty="0"/>
               <a:t>SYCL</a:t>
             </a:r>
-            <a:endParaRPr lang="en-GB" dirty="0"/>
           </a:p>
         </p:txBody>
       </p:sp>
@@ -9146,7 +8766,7 @@
               </a:lnSpc>
             </a:pPr>
             <a:r>
-              <a:rPr lang="en-GB" dirty="0" smtClean="0"/>
+              <a:rPr lang="en-GB" dirty="0"/>
               <a:t>Single source C++ abstraction layer for OpenCL</a:t>
             </a:r>
           </a:p>
@@ -9157,7 +8777,7 @@
               </a:lnSpc>
             </a:pPr>
             <a:r>
-              <a:rPr lang="en-GB" dirty="0" smtClean="0"/>
+              <a:rPr lang="en-GB" dirty="0"/>
               <a:t>Goal is to enable the creation of C++ libraries and frameworks that utilize OpenCL</a:t>
             </a:r>
           </a:p>
@@ -9168,7 +8788,7 @@
               </a:lnSpc>
             </a:pPr>
             <a:r>
-              <a:rPr lang="en-GB" dirty="0" smtClean="0"/>
+              <a:rPr lang="en-GB" dirty="0"/>
               <a:t>Can utilize SPIR to target OpenCL platform</a:t>
             </a:r>
           </a:p>
@@ -9179,15 +8799,15 @@
               </a:lnSpc>
             </a:pPr>
             <a:r>
-              <a:rPr lang="en-GB" dirty="0" smtClean="0"/>
+              <a:rPr lang="en-GB" dirty="0"/>
               <a:t>Supports ‘host-</a:t>
             </a:r>
             <a:r>
-              <a:rPr lang="en-GB" dirty="0" err="1" smtClean="0"/>
+              <a:rPr lang="en-GB" dirty="0" err="1"/>
               <a:t>fallback</a:t>
             </a:r>
             <a:r>
-              <a:rPr lang="en-GB" dirty="0" smtClean="0"/>
+              <a:rPr lang="en-GB" dirty="0"/>
               <a:t>’ (CPU) when no OpenCL devices available</a:t>
             </a:r>
           </a:p>
@@ -9198,13 +8818,13 @@
               </a:lnSpc>
             </a:pPr>
             <a:r>
-              <a:rPr lang="en-GB" dirty="0" smtClean="0">
+              <a:rPr lang="en-GB" dirty="0">
                 <a:hlinkClick r:id="rId2"/>
               </a:rPr>
               <a:t>Provisional specification</a:t>
             </a:r>
             <a:r>
-              <a:rPr lang="en-GB" dirty="0" smtClean="0"/>
+              <a:rPr lang="en-GB" dirty="0"/>
               <a:t> released Mar’14, v1.2 final released at IWOCL 2015</a:t>
             </a:r>
           </a:p>
@@ -9215,7 +8835,7 @@
               </a:lnSpc>
             </a:pPr>
             <a:r>
-              <a:rPr lang="en-GB" dirty="0" smtClean="0"/>
+              <a:rPr lang="en-GB" dirty="0"/>
               <a:t>Implementations:</a:t>
             </a:r>
           </a:p>
@@ -9226,19 +8846,19 @@
               </a:lnSpc>
             </a:pPr>
             <a:r>
-              <a:rPr lang="en-GB" dirty="0" err="1" smtClean="0"/>
+              <a:rPr lang="en-GB" dirty="0" err="1"/>
               <a:t>Codeplay</a:t>
             </a:r>
             <a:r>
-              <a:rPr lang="en-GB" dirty="0" smtClean="0"/>
+              <a:rPr lang="en-GB" dirty="0"/>
               <a:t> </a:t>
             </a:r>
             <a:r>
-              <a:rPr lang="en-GB" dirty="0" err="1" smtClean="0"/>
+              <a:rPr lang="en-GB" dirty="0" err="1"/>
               <a:t>ComputeCpp</a:t>
             </a:r>
             <a:r>
-              <a:rPr lang="en-GB" dirty="0" smtClean="0"/>
+              <a:rPr lang="en-GB" dirty="0"/>
               <a:t> Community Edition (free)</a:t>
             </a:r>
           </a:p>
@@ -9249,19 +8869,19 @@
               </a:lnSpc>
             </a:pPr>
             <a:r>
-              <a:rPr lang="en-GB" dirty="0" err="1" smtClean="0"/>
+              <a:rPr lang="en-GB" dirty="0" err="1"/>
               <a:t>triSYCL</a:t>
             </a:r>
             <a:r>
-              <a:rPr lang="en-GB" dirty="0" smtClean="0"/>
+              <a:rPr lang="en-GB" dirty="0"/>
               <a:t> (open source on </a:t>
             </a:r>
             <a:r>
-              <a:rPr lang="en-GB" dirty="0" err="1" smtClean="0"/>
+              <a:rPr lang="en-GB" dirty="0" err="1"/>
               <a:t>GitHub</a:t>
             </a:r>
             <a:r>
-              <a:rPr lang="en-GB" dirty="0" smtClean="0"/>
+              <a:rPr lang="en-GB" dirty="0"/>
               <a:t>)</a:t>
             </a:r>
           </a:p>
@@ -9316,20 +8936,14 @@
           <a:lstStyle/>
           <a:p>
             <a:r>
-              <a:rPr lang="en-GB" dirty="0" smtClean="0"/>
+              <a:rPr lang="en-GB" dirty="0"/>
               <a:t>More info: </a:t>
-            </a:r>
-            <a:r>
-              <a:rPr lang="en-GB" dirty="0" smtClean="0">
-                <a:hlinkClick r:id="rId4"/>
-              </a:rPr>
-              <a:t>http</a:t>
             </a:r>
             <a:r>
               <a:rPr lang="en-GB" dirty="0">
                 <a:hlinkClick r:id="rId4"/>
               </a:rPr>
-              <a:t>://</a:t>
+              <a:t>http://</a:t>
             </a:r>
             <a:r>
               <a:rPr lang="en-GB" dirty="0" err="1">
@@ -9351,18 +8965,11 @@
   <p:clrMapOvr>
     <a:masterClrMapping/>
   </p:clrMapOvr>
-  <p:timing>
-    <p:tnLst>
-      <p:par>
-        <p:cTn xmlns:p14="http://schemas.microsoft.com/office/powerpoint/2010/main" id="1" dur="indefinite" restart="never" nodeType="tmRoot"/>
-      </p:par>
-    </p:tnLst>
-  </p:timing>
 </p:sld>
 </file>
 
 <file path=ppt/slides/slide8.xml><?xml version="1.0" encoding="utf-8"?>
-<p:sld xmlns:a="http://schemas.openxmlformats.org/drawingml/2006/main" xmlns:r="http://schemas.openxmlformats.org/officeDocument/2006/relationships" xmlns:p="http://schemas.openxmlformats.org/presentationml/2006/main">
+<p:sld xmlns:a="http://schemas.openxmlformats.org/drawingml/2006/main" xmlns:r="http://schemas.openxmlformats.org/officeDocument/2006/relationships" xmlns:p="http://schemas.openxmlformats.org/presentationml/2006/main" show="0">
   <p:cSld>
     <p:spTree>
       <p:nvGrpSpPr>
@@ -9394,10 +9001,9 @@
           <a:lstStyle/>
           <a:p>
             <a:r>
-              <a:rPr lang="en-GB" dirty="0" smtClean="0"/>
+              <a:rPr lang="en-GB" dirty="0"/>
               <a:t>SYCL talks at IWOCL</a:t>
             </a:r>
-            <a:endParaRPr lang="en-GB" dirty="0"/>
           </a:p>
         </p:txBody>
       </p:sp>
@@ -9420,42 +9026,13 @@
           <a:p>
             <a:r>
               <a:rPr lang="en-GB" dirty="0"/>
-              <a:t>Heterogeneous Computing Using Modern C++ with OpenCL </a:t>
-            </a:r>
-            <a:r>
-              <a:rPr lang="en-GB" dirty="0" smtClean="0"/>
-              <a:t>Devices (</a:t>
-            </a:r>
-            <a:r>
-              <a:rPr lang="en-GB" dirty="0"/>
-              <a:t>Wednesday at </a:t>
-            </a:r>
-            <a:r>
-              <a:rPr lang="en-GB" dirty="0" smtClean="0"/>
-              <a:t>9am)</a:t>
-            </a:r>
-            <a:endParaRPr lang="en-GB" dirty="0"/>
-          </a:p>
-          <a:p>
-            <a:r>
-              <a:rPr lang="en-GB" dirty="0" smtClean="0"/>
-              <a:t>Developer </a:t>
-            </a:r>
-            <a:r>
-              <a:rPr lang="en-GB" dirty="0"/>
-              <a:t>Feedback Session on OpenCL 2</a:t>
-            </a:r>
-            <a:r>
-              <a:rPr lang="en-GB" dirty="0" smtClean="0"/>
-              <a:t>.x, </a:t>
-            </a:r>
-            <a:r>
-              <a:rPr lang="en-GB" dirty="0"/>
-              <a:t>SYCL and SPIR with the Khronos OpenCL working group (Wednesday </a:t>
-            </a:r>
-            <a:r>
-              <a:rPr lang="en-GB" dirty="0" smtClean="0"/>
-              <a:t>5.30pm)</a:t>
+              <a:t>Heterogeneous Computing Using Modern C++ with OpenCL Devices (Wednesday at 9am)</a:t>
+            </a:r>
+          </a:p>
+          <a:p>
+            <a:r>
+              <a:rPr lang="en-GB" dirty="0"/>
+              <a:t>Developer Feedback Session on OpenCL 2.x, SYCL and SPIR with the Khronos OpenCL working group (Wednesday 5.30pm)</a:t>
             </a:r>
           </a:p>
           <a:p>
@@ -9469,13 +9046,8 @@
             </a:r>
             <a:r>
               <a:rPr lang="en-GB" dirty="0"/>
-              <a:t> and SYCL on OpenCL Devices </a:t>
-            </a:r>
-            <a:r>
-              <a:rPr lang="en-GB" dirty="0" smtClean="0"/>
-              <a:t>(Thursday 4.30pm)</a:t>
-            </a:r>
-            <a:endParaRPr lang="en-GB" dirty="0"/>
+              <a:t> and SYCL on OpenCL Devices (Thursday 4.30pm)</a:t>
+            </a:r>
           </a:p>
         </p:txBody>
       </p:sp>
@@ -9516,21 +9088,6 @@
   <p:clrMapOvr>
     <a:masterClrMapping/>
   </p:clrMapOvr>
-  <mc:AlternateContent xmlns:mc="http://schemas.openxmlformats.org/markup-compatibility/2006" xmlns:p14="http://schemas.microsoft.com/office/powerpoint/2010/main">
-    <mc:Choice Requires="p14">
-      <p:transition spd="slow" p14:dur="2000"/>
-    </mc:Choice>
-    <mc:Fallback xmlns="">
-      <p:transition spd="slow"/>
-    </mc:Fallback>
-  </mc:AlternateContent>
-  <p:timing>
-    <p:tnLst>
-      <p:par>
-        <p:cTn xmlns:p14="http://schemas.microsoft.com/office/powerpoint/2010/main" id="1" dur="indefinite" restart="never" nodeType="tmRoot"/>
-      </p:par>
-    </p:tnLst>
-  </p:timing>
 </p:sld>
 </file>
 
@@ -9567,10 +9124,9 @@
           <a:lstStyle/>
           <a:p>
             <a:r>
-              <a:rPr lang="en-GB" dirty="0" smtClean="0"/>
+              <a:rPr lang="en-GB" dirty="0"/>
               <a:t>Libraries</a:t>
             </a:r>
-            <a:endParaRPr lang="en-GB" dirty="0"/>
           </a:p>
         </p:txBody>
       </p:sp>
@@ -9600,27 +9156,23 @@
               <a:t>/</a:t>
             </a:r>
             <a:r>
-              <a:rPr lang="en-GB" dirty="0" err="1" smtClean="0"/>
+              <a:rPr lang="en-GB" dirty="0" err="1"/>
               <a:t>clBLAS</a:t>
             </a:r>
             <a:r>
-              <a:rPr lang="en-GB" dirty="0" smtClean="0"/>
+              <a:rPr lang="en-GB" dirty="0"/>
               <a:t>/</a:t>
             </a:r>
             <a:r>
-              <a:rPr lang="en-GB" dirty="0" err="1" smtClean="0"/>
+              <a:rPr lang="en-GB" dirty="0" err="1"/>
               <a:t>clRNG</a:t>
             </a:r>
             <a:r>
-              <a:rPr lang="en-GB" dirty="0" smtClean="0"/>
-              <a:t> </a:t>
-            </a:r>
-            <a:r>
-              <a:rPr lang="en-GB" dirty="0"/>
-              <a:t>(all on </a:t>
-            </a:r>
-            <a:r>
-              <a:rPr lang="en-GB" dirty="0" err="1" smtClean="0"/>
+              <a:rPr lang="en-GB" dirty="0"/>
+              <a:t> (all on </a:t>
+            </a:r>
+            <a:r>
+              <a:rPr lang="en-GB" dirty="0" err="1"/>
               <a:t>GitHub</a:t>
             </a:r>
             <a:r>
@@ -9630,79 +9182,67 @@
           </a:p>
           <a:p>
             <a:r>
-              <a:rPr lang="en-GB" dirty="0" err="1" smtClean="0"/>
+              <a:rPr lang="en-GB" dirty="0" err="1"/>
               <a:t>Arrayfire</a:t>
             </a:r>
             <a:r>
-              <a:rPr lang="en-GB" dirty="0" smtClean="0"/>
+              <a:rPr lang="en-GB" dirty="0"/>
               <a:t> (on </a:t>
             </a:r>
             <a:r>
-              <a:rPr lang="en-GB" dirty="0" err="1" smtClean="0"/>
+              <a:rPr lang="en-GB" dirty="0" err="1"/>
               <a:t>GitHub</a:t>
             </a:r>
             <a:r>
-              <a:rPr lang="en-GB" dirty="0" smtClean="0"/>
+              <a:rPr lang="en-GB" dirty="0"/>
               <a:t>)</a:t>
             </a:r>
           </a:p>
           <a:p>
             <a:r>
-              <a:rPr lang="en-GB" dirty="0" smtClean="0"/>
+              <a:rPr lang="en-GB" dirty="0"/>
               <a:t>Boost compute with </a:t>
             </a:r>
             <a:r>
-              <a:rPr lang="en-GB" dirty="0" err="1" smtClean="0"/>
+              <a:rPr lang="en-GB" dirty="0" err="1"/>
               <a:t>VexCL</a:t>
             </a:r>
-            <a:endParaRPr lang="en-GB" dirty="0" smtClean="0"/>
-          </a:p>
-          <a:p>
-            <a:r>
-              <a:rPr lang="en-GB" dirty="0" err="1" smtClean="0"/>
+            <a:endParaRPr lang="en-GB" dirty="0"/>
+          </a:p>
+          <a:p>
+            <a:r>
+              <a:rPr lang="en-GB" dirty="0" err="1"/>
               <a:t>ViennaCL</a:t>
             </a:r>
             <a:r>
-              <a:rPr lang="en-GB" dirty="0" smtClean="0"/>
+              <a:rPr lang="en-GB" dirty="0"/>
               <a:t> (</a:t>
             </a:r>
             <a:r>
-              <a:rPr lang="en-GB" dirty="0" err="1" smtClean="0"/>
+              <a:rPr lang="en-GB" dirty="0" err="1"/>
               <a:t>PETSc</a:t>
             </a:r>
             <a:r>
-              <a:rPr lang="en-GB" dirty="0" smtClean="0"/>
+              <a:rPr lang="en-GB" dirty="0"/>
               <a:t>), PARALUTION</a:t>
             </a:r>
           </a:p>
           <a:p>
             <a:r>
-              <a:rPr lang="en-GB" dirty="0" smtClean="0"/>
+              <a:rPr lang="en-GB" dirty="0"/>
               <a:t>Lots more - see the Khronos OpenCL pages: </a:t>
             </a:r>
           </a:p>
           <a:p>
             <a:pPr lvl="1"/>
-            <a:r>
-              <a:rPr lang="en-GB" dirty="0" smtClean="0">
-                <a:hlinkClick r:id="rId3"/>
-              </a:rPr>
-              <a:t>https</a:t>
-            </a:r>
             <a:r>
               <a:rPr lang="en-GB" dirty="0">
                 <a:hlinkClick r:id="rId3"/>
               </a:rPr>
-              <a:t>://www.khronos.org/opencl/</a:t>
-            </a:r>
-            <a:r>
-              <a:rPr lang="en-GB" dirty="0" smtClean="0">
-                <a:hlinkClick r:id="rId3"/>
-              </a:rPr>
-              <a:t>resources</a:t>
-            </a:r>
-            <a:r>
-              <a:rPr lang="en-GB" dirty="0" smtClean="0"/>
+              <a:t>https://www.khronos.org/opencl/resources</a:t>
+            </a:r>
+            <a:r>
+              <a:rPr lang="en-GB" dirty="0"/>
               <a:t> </a:t>
             </a:r>
           </a:p>
@@ -9718,13 +9258,6 @@
   <p:clrMapOvr>
     <a:masterClrMapping/>
   </p:clrMapOvr>
-  <p:timing>
-    <p:tnLst>
-      <p:par>
-        <p:cTn xmlns:p14="http://schemas.microsoft.com/office/powerpoint/2010/main" id="1" dur="indefinite" restart="never" nodeType="tmRoot"/>
-      </p:par>
-    </p:tnLst>
-  </p:timing>
 </p:sld>
 </file>
 

</xml_diff>

<commit_message>
Tweaks post IWOCL 2018
</commit_message>
<xml_diff>
--- a/slides/advanced_outro.pptx
+++ b/slides/advanced_outro.pptx
@@ -10,8 +10,8 @@
   <p:sldIdLst>
     <p:sldId id="703" r:id="rId2"/>
     <p:sldId id="775" r:id="rId3"/>
-    <p:sldId id="776" r:id="rId4"/>
-    <p:sldId id="769" r:id="rId5"/>
+    <p:sldId id="769" r:id="rId4"/>
+    <p:sldId id="776" r:id="rId5"/>
     <p:sldId id="678" r:id="rId6"/>
     <p:sldId id="770" r:id="rId7"/>
     <p:sldId id="679" r:id="rId8"/>
@@ -135,8 +135,8 @@
           <p14:sldIdLst>
             <p14:sldId id="703"/>
             <p14:sldId id="775"/>
+            <p14:sldId id="769"/>
             <p14:sldId id="776"/>
-            <p14:sldId id="769"/>
             <p14:sldId id="678"/>
             <p14:sldId id="770"/>
             <p14:sldId id="679"/>
@@ -274,7 +274,7 @@
             <a:fld id="{92597E5C-85BB-4669-9209-B5E04E6ED101}" type="datetimeFigureOut">
               <a:rPr lang="en-GB" smtClean="0"/>
               <a:pPr/>
-              <a:t>09/05/2018</a:t>
+              <a:t>14/05/2018</a:t>
             </a:fld>
             <a:endParaRPr lang="en-GB"/>
           </a:p>
@@ -903,7 +903,7 @@
             <a:fld id="{19E03964-7D59-4BF8-AE10-3A215A42C3E4}" type="datetime1">
               <a:rPr lang="en-GB" smtClean="0"/>
               <a:pPr/>
-              <a:t>09/05/2018</a:t>
+              <a:t>14/05/2018</a:t>
             </a:fld>
             <a:endParaRPr lang="en-GB"/>
           </a:p>
@@ -1070,7 +1070,7 @@
             <a:fld id="{8E5ADEB7-8139-4AC1-94DC-FE9E54B1CCD2}" type="datetime1">
               <a:rPr lang="en-GB" smtClean="0"/>
               <a:pPr/>
-              <a:t>09/05/2018</a:t>
+              <a:t>14/05/2018</a:t>
             </a:fld>
             <a:endParaRPr lang="en-GB"/>
           </a:p>
@@ -1247,7 +1247,7 @@
             <a:fld id="{9C77A686-1785-49A1-B4C9-55A3C7EEADE4}" type="datetime1">
               <a:rPr lang="en-GB" smtClean="0"/>
               <a:pPr/>
-              <a:t>09/05/2018</a:t>
+              <a:t>14/05/2018</a:t>
             </a:fld>
             <a:endParaRPr lang="en-GB"/>
           </a:p>
@@ -1712,7 +1712,7 @@
             <a:fld id="{D65327FA-D1E5-40CA-8941-3DD0B6730F8A}" type="datetime1">
               <a:rPr lang="en-GB" smtClean="0"/>
               <a:pPr/>
-              <a:t>09/05/2018</a:t>
+              <a:t>14/05/2018</a:t>
             </a:fld>
             <a:endParaRPr lang="en-GB"/>
           </a:p>
@@ -1955,7 +1955,7 @@
             <a:fld id="{DB33F153-90AC-449F-A303-26940247ABC8}" type="datetime1">
               <a:rPr lang="en-GB" smtClean="0"/>
               <a:pPr/>
-              <a:t>09/05/2018</a:t>
+              <a:t>14/05/2018</a:t>
             </a:fld>
             <a:endParaRPr lang="en-GB"/>
           </a:p>
@@ -2240,7 +2240,7 @@
             <a:fld id="{84E24492-3EA5-478D-9F72-7B8FF369DDEB}" type="datetime1">
               <a:rPr lang="en-GB" smtClean="0"/>
               <a:pPr/>
-              <a:t>09/05/2018</a:t>
+              <a:t>14/05/2018</a:t>
             </a:fld>
             <a:endParaRPr lang="en-GB"/>
           </a:p>
@@ -2659,7 +2659,7 @@
             <a:fld id="{43976A03-596E-4490-AE35-AFB744E08901}" type="datetime1">
               <a:rPr lang="en-GB" smtClean="0"/>
               <a:pPr/>
-              <a:t>09/05/2018</a:t>
+              <a:t>14/05/2018</a:t>
             </a:fld>
             <a:endParaRPr lang="en-GB"/>
           </a:p>
@@ -2774,7 +2774,7 @@
             <a:fld id="{4C8E3CB4-829C-4F19-9E86-B2AAEC36BD90}" type="datetime1">
               <a:rPr lang="en-GB" smtClean="0"/>
               <a:pPr/>
-              <a:t>09/05/2018</a:t>
+              <a:t>14/05/2018</a:t>
             </a:fld>
             <a:endParaRPr lang="en-GB"/>
           </a:p>
@@ -2866,7 +2866,7 @@
             <a:fld id="{D4A6FE01-96D8-461F-B1B2-1F0C16D98900}" type="datetime1">
               <a:rPr lang="en-GB" smtClean="0"/>
               <a:pPr/>
-              <a:t>09/05/2018</a:t>
+              <a:t>14/05/2018</a:t>
             </a:fld>
             <a:endParaRPr lang="en-GB"/>
           </a:p>
@@ -3140,7 +3140,7 @@
             <a:fld id="{B24CB088-CFF7-44C4-9CCE-18845754E6D4}" type="datetime1">
               <a:rPr lang="en-GB" smtClean="0"/>
               <a:pPr/>
-              <a:t>09/05/2018</a:t>
+              <a:t>14/05/2018</a:t>
             </a:fld>
             <a:endParaRPr lang="en-GB"/>
           </a:p>
@@ -3394,7 +3394,7 @@
             <a:fld id="{CD3A280C-4DEC-4EEC-BD59-A30886E06BA1}" type="datetime1">
               <a:rPr lang="en-GB" smtClean="0"/>
               <a:pPr/>
-              <a:t>09/05/2018</a:t>
+              <a:t>14/05/2018</a:t>
             </a:fld>
             <a:endParaRPr lang="en-GB"/>
           </a:p>
@@ -3604,7 +3604,7 @@
             <a:fld id="{E222BC38-3FAE-415B-AD1C-2D338E3D6B03}" type="datetime1">
               <a:rPr lang="en-GB" smtClean="0"/>
               <a:pPr/>
-              <a:t>09/05/2018</a:t>
+              <a:t>14/05/2018</a:t>
             </a:fld>
             <a:endParaRPr lang="en-GB"/>
           </a:p>
@@ -7648,14 +7648,14 @@
           <a:effectLst/>
           <a:extLst>
             <a:ext uri="{909E8E84-426E-40dd-AFC4-6F175D3DCCD1}">
-              <a14:hiddenFill xmlns:a14="http://schemas.microsoft.com/office/drawing/2010/main" xmlns="">
+              <a14:hiddenFill xmlns="" xmlns:a14="http://schemas.microsoft.com/office/drawing/2010/main">
                 <a:solidFill>
                   <a:schemeClr val="accent1"/>
                 </a:solidFill>
               </a14:hiddenFill>
             </a:ext>
             <a:ext uri="{91240B29-F687-4f45-9708-019B960494DF}">
-              <a14:hiddenLine xmlns:a14="http://schemas.microsoft.com/office/drawing/2010/main" xmlns="" w="9525">
+              <a14:hiddenLine xmlns="" xmlns:a14="http://schemas.microsoft.com/office/drawing/2010/main" w="9525">
                 <a:solidFill>
                   <a:schemeClr val="tx1"/>
                 </a:solidFill>
@@ -7665,7 +7665,7 @@
               </a14:hiddenLine>
             </a:ext>
             <a:ext uri="{AF507438-7753-43e0-B8FC-AC1667EBCBE1}">
-              <a14:hiddenEffects xmlns:a14="http://schemas.microsoft.com/office/drawing/2010/main" xmlns="">
+              <a14:hiddenEffects xmlns="" xmlns:a14="http://schemas.microsoft.com/office/drawing/2010/main">
                 <a:effectLst>
                   <a:outerShdw dist="35921" dir="2700000" algn="ctr" rotWithShape="0">
                     <a:schemeClr val="bg2"/>
@@ -8193,6 +8193,106 @@
 </file>
 
 <file path=ppt/slides/slide3.xml><?xml version="1.0" encoding="utf-8"?>
+<p:sld xmlns:a="http://schemas.openxmlformats.org/drawingml/2006/main" xmlns:r="http://schemas.openxmlformats.org/officeDocument/2006/relationships" xmlns:p="http://schemas.openxmlformats.org/presentationml/2006/main" show="0">
+  <p:cSld>
+    <p:spTree>
+      <p:nvGrpSpPr>
+        <p:cNvPr id="1" name=""/>
+        <p:cNvGrpSpPr/>
+        <p:nvPr/>
+      </p:nvGrpSpPr>
+      <p:grpSpPr>
+        <a:xfrm>
+          <a:off x="0" y="0"/>
+          <a:ext cx="0" cy="0"/>
+          <a:chOff x="0" y="0"/>
+          <a:chExt cx="0" cy="0"/>
+        </a:xfrm>
+      </p:grpSpPr>
+      <p:sp>
+        <p:nvSpPr>
+          <p:cNvPr id="2" name="Title 1"/>
+          <p:cNvSpPr>
+            <a:spLocks noGrp="1"/>
+          </p:cNvSpPr>
+          <p:nvPr>
+            <p:ph type="title"/>
+          </p:nvPr>
+        </p:nvSpPr>
+        <p:spPr/>
+        <p:txBody>
+          <a:bodyPr/>
+          <a:lstStyle/>
+          <a:p>
+            <a:r>
+              <a:rPr lang="en-GB" dirty="0"/>
+              <a:t>OpenCL 2.x talks</a:t>
+            </a:r>
+          </a:p>
+        </p:txBody>
+      </p:sp>
+      <p:sp>
+        <p:nvSpPr>
+          <p:cNvPr id="3" name="Content Placeholder 2"/>
+          <p:cNvSpPr>
+            <a:spLocks noGrp="1"/>
+          </p:cNvSpPr>
+          <p:nvPr>
+            <p:ph idx="1"/>
+          </p:nvPr>
+        </p:nvSpPr>
+        <p:spPr>
+          <a:xfrm>
+            <a:off x="457200" y="1600200"/>
+            <a:ext cx="8229600" cy="5141168"/>
+          </a:xfrm>
+        </p:spPr>
+        <p:txBody>
+          <a:bodyPr>
+            <a:normAutofit/>
+          </a:bodyPr>
+          <a:lstStyle/>
+          <a:p>
+            <a:r>
+              <a:rPr lang="en-GB" dirty="0"/>
+              <a:t>Tutorial: Heterogeneous Computing Using Modern C++ with OpenCL Devices (Wednesday 9am)</a:t>
+            </a:r>
+          </a:p>
+          <a:p>
+            <a:r>
+              <a:rPr lang="en-GB" dirty="0"/>
+              <a:t>Keynote: OpenCL – A State of the Union (Wednesday 2pm)</a:t>
+            </a:r>
+          </a:p>
+          <a:p>
+            <a:r>
+              <a:rPr lang="en-GB" dirty="0"/>
+              <a:t>Panel: What Next for OpenCL? A session with the Khronos OpenCL WG</a:t>
+            </a:r>
+            <a:br>
+              <a:rPr lang="en-GB" dirty="0"/>
+            </a:br>
+            <a:r>
+              <a:rPr lang="en-GB" dirty="0"/>
+              <a:t>(Wednesday 5pm)</a:t>
+            </a:r>
+          </a:p>
+        </p:txBody>
+      </p:sp>
+    </p:spTree>
+    <p:extLst>
+      <p:ext uri="{BB962C8B-B14F-4D97-AF65-F5344CB8AC3E}">
+        <p14:creationId xmlns:p14="http://schemas.microsoft.com/office/powerpoint/2010/main" val="1161641088"/>
+      </p:ext>
+    </p:extLst>
+  </p:cSld>
+  <p:clrMapOvr>
+    <a:masterClrMapping/>
+  </p:clrMapOvr>
+</p:sld>
+</file>
+
+<file path=ppt/slides/slide4.xml><?xml version="1.0" encoding="utf-8"?>
 <p:sld xmlns:a="http://schemas.openxmlformats.org/drawingml/2006/main" xmlns:r="http://schemas.openxmlformats.org/officeDocument/2006/relationships" xmlns:p="http://schemas.openxmlformats.org/presentationml/2006/main">
   <p:cSld>
     <p:spTree>
@@ -8308,106 +8408,6 @@
     <p:extLst>
       <p:ext uri="{BB962C8B-B14F-4D97-AF65-F5344CB8AC3E}">
         <p14:creationId xmlns:p14="http://schemas.microsoft.com/office/powerpoint/2010/main" val="96163439"/>
-      </p:ext>
-    </p:extLst>
-  </p:cSld>
-  <p:clrMapOvr>
-    <a:masterClrMapping/>
-  </p:clrMapOvr>
-</p:sld>
-</file>
-
-<file path=ppt/slides/slide4.xml><?xml version="1.0" encoding="utf-8"?>
-<p:sld xmlns:a="http://schemas.openxmlformats.org/drawingml/2006/main" xmlns:r="http://schemas.openxmlformats.org/officeDocument/2006/relationships" xmlns:p="http://schemas.openxmlformats.org/presentationml/2006/main" show="0">
-  <p:cSld>
-    <p:spTree>
-      <p:nvGrpSpPr>
-        <p:cNvPr id="1" name=""/>
-        <p:cNvGrpSpPr/>
-        <p:nvPr/>
-      </p:nvGrpSpPr>
-      <p:grpSpPr>
-        <a:xfrm>
-          <a:off x="0" y="0"/>
-          <a:ext cx="0" cy="0"/>
-          <a:chOff x="0" y="0"/>
-          <a:chExt cx="0" cy="0"/>
-        </a:xfrm>
-      </p:grpSpPr>
-      <p:sp>
-        <p:nvSpPr>
-          <p:cNvPr id="2" name="Title 1"/>
-          <p:cNvSpPr>
-            <a:spLocks noGrp="1"/>
-          </p:cNvSpPr>
-          <p:nvPr>
-            <p:ph type="title"/>
-          </p:nvPr>
-        </p:nvSpPr>
-        <p:spPr/>
-        <p:txBody>
-          <a:bodyPr/>
-          <a:lstStyle/>
-          <a:p>
-            <a:r>
-              <a:rPr lang="en-GB" dirty="0"/>
-              <a:t>OpenCL 2.x talks</a:t>
-            </a:r>
-          </a:p>
-        </p:txBody>
-      </p:sp>
-      <p:sp>
-        <p:nvSpPr>
-          <p:cNvPr id="3" name="Content Placeholder 2"/>
-          <p:cNvSpPr>
-            <a:spLocks noGrp="1"/>
-          </p:cNvSpPr>
-          <p:nvPr>
-            <p:ph idx="1"/>
-          </p:nvPr>
-        </p:nvSpPr>
-        <p:spPr>
-          <a:xfrm>
-            <a:off x="457200" y="1600200"/>
-            <a:ext cx="8229600" cy="5141168"/>
-          </a:xfrm>
-        </p:spPr>
-        <p:txBody>
-          <a:bodyPr>
-            <a:normAutofit/>
-          </a:bodyPr>
-          <a:lstStyle/>
-          <a:p>
-            <a:r>
-              <a:rPr lang="en-GB" dirty="0"/>
-              <a:t>Tutorial: Heterogeneous Computing Using Modern C++ with OpenCL Devices (Wednesday 9am)</a:t>
-            </a:r>
-          </a:p>
-          <a:p>
-            <a:r>
-              <a:rPr lang="en-GB" dirty="0"/>
-              <a:t>Keynote: OpenCL – A State of the Union (Wednesday 2pm)</a:t>
-            </a:r>
-          </a:p>
-          <a:p>
-            <a:r>
-              <a:rPr lang="en-GB" dirty="0"/>
-              <a:t>Panel: What Next for OpenCL? A session with the Khronos OpenCL WG</a:t>
-            </a:r>
-            <a:br>
-              <a:rPr lang="en-GB" dirty="0"/>
-            </a:br>
-            <a:r>
-              <a:rPr lang="en-GB" dirty="0"/>
-              <a:t>(Wednesday 5pm)</a:t>
-            </a:r>
-          </a:p>
-        </p:txBody>
-      </p:sp>
-    </p:spTree>
-    <p:extLst>
-      <p:ext uri="{BB962C8B-B14F-4D97-AF65-F5344CB8AC3E}">
-        <p14:creationId xmlns:p14="http://schemas.microsoft.com/office/powerpoint/2010/main" val="1161641088"/>
       </p:ext>
     </p:extLst>
   </p:cSld>

</xml_diff>